<commit_message>
Use nicer fonts in Info.*
</commit_message>
<xml_diff>
--- a/Info.pptx
+++ b/Info.pptx
@@ -3,11 +3,10 @@
 <p:presentation xmlns:a="http://schemas.openxmlformats.org/drawingml/2006/main" xmlns:p="http://schemas.openxmlformats.org/presentationml/2006/main" xmlns:r="http://schemas.openxmlformats.org/officeDocument/2006/relationships" xmlns:p14="http://schemas.microsoft.com/office/powerpoint/2010/main" xmlns:p15="http://schemas.microsoft.com/office/powerpoint/2012/main" xmlns:mc="http://schemas.openxmlformats.org/markup-compatibility/2006">
   <p:sldMasterIdLst>
     <p:sldMasterId id="2147483648" r:id="rId2"/>
-    <p:sldMasterId id="2147483661" r:id="rId3"/>
   </p:sldMasterIdLst>
   <p:sldIdLst>
-    <p:sldId id="256" r:id="rId4"/>
-    <p:sldId id="257" r:id="rId5"/>
+    <p:sldId id="256" r:id="rId3"/>
+    <p:sldId id="257" r:id="rId4"/>
   </p:sldIdLst>
   <p:sldSz cx="10080625" cy="5670550"/>
   <p:notesSz cx="7772400" cy="10058400"/>
@@ -621,623 +620,6 @@
 </p:sldLayout>
 </file>
 
-<file path=ppt/slideLayouts/slideLayout13.xml><?xml version="1.0" encoding="utf-8"?>
-<p:sldLayout xmlns:a="http://schemas.openxmlformats.org/drawingml/2006/main" xmlns:p="http://schemas.openxmlformats.org/presentationml/2006/main" xmlns:r="http://schemas.openxmlformats.org/officeDocument/2006/relationships" xmlns:p14="http://schemas.microsoft.com/office/powerpoint/2010/main" xmlns:p15="http://schemas.microsoft.com/office/powerpoint/2012/main" xmlns:mc="http://schemas.openxmlformats.org/markup-compatibility/2006" type="blank" preserve="1">
-  <p:cSld name="Blank Slide">
-    <p:spTree>
-      <p:nvGrpSpPr>
-        <p:cNvPr id="1" name=""/>
-        <p:cNvGrpSpPr/>
-        <p:nvPr/>
-      </p:nvGrpSpPr>
-      <p:grpSpPr>
-        <a:xfrm>
-          <a:off x="0" y="0"/>
-          <a:ext cx="0" cy="0"/>
-          <a:chOff x="0" y="0"/>
-          <a:chExt cx="0" cy="0"/>
-        </a:xfrm>
-      </p:grpSpPr>
-    </p:spTree>
-  </p:cSld>
-</p:sldLayout>
-</file>
-
-<file path=ppt/slideLayouts/slideLayout14.xml><?xml version="1.0" encoding="utf-8"?>
-<p:sldLayout xmlns:a="http://schemas.openxmlformats.org/drawingml/2006/main" xmlns:p="http://schemas.openxmlformats.org/presentationml/2006/main" xmlns:r="http://schemas.openxmlformats.org/officeDocument/2006/relationships" xmlns:p14="http://schemas.microsoft.com/office/powerpoint/2010/main" xmlns:p15="http://schemas.microsoft.com/office/powerpoint/2012/main" xmlns:mc="http://schemas.openxmlformats.org/markup-compatibility/2006" type="tx" preserve="1">
-  <p:cSld name="Title Slide">
-    <p:spTree>
-      <p:nvGrpSpPr>
-        <p:cNvPr id="1" name=""/>
-        <p:cNvGrpSpPr/>
-        <p:nvPr/>
-      </p:nvGrpSpPr>
-      <p:grpSpPr>
-        <a:xfrm>
-          <a:off x="0" y="0"/>
-          <a:ext cx="0" cy="0"/>
-          <a:chOff x="0" y="0"/>
-          <a:chExt cx="0" cy="0"/>
-        </a:xfrm>
-      </p:grpSpPr>
-      <p:sp>
-        <p:nvSpPr>
-          <p:cNvPr id="148" name="PlaceHolder 1"/>
-          <p:cNvSpPr>
-            <a:spLocks noGrp="1"/>
-          </p:cNvSpPr>
-          <p:nvPr>
-            <p:ph type="title"/>
-          </p:nvPr>
-        </p:nvSpPr>
-        <p:spPr>
-          <a:xfrm>
-            <a:off x="504000" y="226080"/>
-            <a:ext cx="9072000" cy="946440"/>
-          </a:xfrm>
-          <a:prstGeom prst="rect">
-            <a:avLst/>
-          </a:prstGeom>
-          <a:noFill/>
-          <a:ln w="0">
-            <a:noFill/>
-          </a:ln>
-        </p:spPr>
-        <p:txBody>
-          <a:bodyPr lIns="0" rIns="0" tIns="0" bIns="0" anchor="ctr">
-            <a:noAutofit/>
-          </a:bodyPr>
-          <a:p>
-            <a:pPr algn="ctr">
-              <a:buNone/>
-            </a:pPr>
-            <a:endParaRPr b="0" lang="en-US" sz="4400" spc="-1" strike="noStrike">
-              <a:latin typeface="Arial"/>
-            </a:endParaRPr>
-          </a:p>
-        </p:txBody>
-      </p:sp>
-      <p:sp>
-        <p:nvSpPr>
-          <p:cNvPr id="149" name="PlaceHolder 2"/>
-          <p:cNvSpPr>
-            <a:spLocks noGrp="1"/>
-          </p:cNvSpPr>
-          <p:nvPr>
-            <p:ph type="subTitle"/>
-          </p:nvPr>
-        </p:nvSpPr>
-        <p:spPr>
-          <a:xfrm>
-            <a:off x="504000" y="1326600"/>
-            <a:ext cx="9072000" cy="3288600"/>
-          </a:xfrm>
-          <a:prstGeom prst="rect">
-            <a:avLst/>
-          </a:prstGeom>
-          <a:noFill/>
-          <a:ln w="0">
-            <a:noFill/>
-          </a:ln>
-        </p:spPr>
-        <p:txBody>
-          <a:bodyPr lIns="0" rIns="0" tIns="0" bIns="0" anchor="ctr">
-            <a:noAutofit/>
-          </a:bodyPr>
-          <a:p>
-            <a:pPr algn="ctr">
-              <a:buNone/>
-            </a:pPr>
-            <a:endParaRPr b="0" lang="en-US" sz="3200" spc="-1" strike="noStrike">
-              <a:latin typeface="Arial"/>
-            </a:endParaRPr>
-          </a:p>
-        </p:txBody>
-      </p:sp>
-    </p:spTree>
-  </p:cSld>
-</p:sldLayout>
-</file>
-
-<file path=ppt/slideLayouts/slideLayout15.xml><?xml version="1.0" encoding="utf-8"?>
-<p:sldLayout xmlns:a="http://schemas.openxmlformats.org/drawingml/2006/main" xmlns:p="http://schemas.openxmlformats.org/presentationml/2006/main" xmlns:r="http://schemas.openxmlformats.org/officeDocument/2006/relationships" xmlns:p14="http://schemas.microsoft.com/office/powerpoint/2010/main" xmlns:p15="http://schemas.microsoft.com/office/powerpoint/2012/main" xmlns:mc="http://schemas.openxmlformats.org/markup-compatibility/2006" type="obj" preserve="1">
-  <p:cSld name="Title, Content">
-    <p:spTree>
-      <p:nvGrpSpPr>
-        <p:cNvPr id="1" name=""/>
-        <p:cNvGrpSpPr/>
-        <p:nvPr/>
-      </p:nvGrpSpPr>
-      <p:grpSpPr>
-        <a:xfrm>
-          <a:off x="0" y="0"/>
-          <a:ext cx="0" cy="0"/>
-          <a:chOff x="0" y="0"/>
-          <a:chExt cx="0" cy="0"/>
-        </a:xfrm>
-      </p:grpSpPr>
-      <p:sp>
-        <p:nvSpPr>
-          <p:cNvPr id="150" name="PlaceHolder 1"/>
-          <p:cNvSpPr>
-            <a:spLocks noGrp="1"/>
-          </p:cNvSpPr>
-          <p:nvPr>
-            <p:ph type="title"/>
-          </p:nvPr>
-        </p:nvSpPr>
-        <p:spPr>
-          <a:xfrm>
-            <a:off x="504000" y="226080"/>
-            <a:ext cx="9072000" cy="946440"/>
-          </a:xfrm>
-          <a:prstGeom prst="rect">
-            <a:avLst/>
-          </a:prstGeom>
-          <a:noFill/>
-          <a:ln w="0">
-            <a:noFill/>
-          </a:ln>
-        </p:spPr>
-        <p:txBody>
-          <a:bodyPr lIns="0" rIns="0" tIns="0" bIns="0" anchor="ctr">
-            <a:noAutofit/>
-          </a:bodyPr>
-          <a:p>
-            <a:pPr algn="ctr">
-              <a:buNone/>
-            </a:pPr>
-            <a:endParaRPr b="0" lang="en-US" sz="4400" spc="-1" strike="noStrike">
-              <a:latin typeface="Arial"/>
-            </a:endParaRPr>
-          </a:p>
-        </p:txBody>
-      </p:sp>
-      <p:sp>
-        <p:nvSpPr>
-          <p:cNvPr id="151" name="PlaceHolder 2"/>
-          <p:cNvSpPr>
-            <a:spLocks noGrp="1"/>
-          </p:cNvSpPr>
-          <p:nvPr>
-            <p:ph/>
-          </p:nvPr>
-        </p:nvSpPr>
-        <p:spPr>
-          <a:xfrm>
-            <a:off x="504000" y="1326600"/>
-            <a:ext cx="9072000" cy="3288600"/>
-          </a:xfrm>
-          <a:prstGeom prst="rect">
-            <a:avLst/>
-          </a:prstGeom>
-          <a:noFill/>
-          <a:ln w="0">
-            <a:noFill/>
-          </a:ln>
-        </p:spPr>
-        <p:txBody>
-          <a:bodyPr lIns="0" rIns="0" tIns="0" bIns="0" anchor="t">
-            <a:normAutofit/>
-          </a:bodyPr>
-          <a:p>
-            <a:endParaRPr b="0" lang="en-US" sz="3200" spc="-1" strike="noStrike">
-              <a:latin typeface="Arial"/>
-            </a:endParaRPr>
-          </a:p>
-        </p:txBody>
-      </p:sp>
-    </p:spTree>
-  </p:cSld>
-</p:sldLayout>
-</file>
-
-<file path=ppt/slideLayouts/slideLayout16.xml><?xml version="1.0" encoding="utf-8"?>
-<p:sldLayout xmlns:a="http://schemas.openxmlformats.org/drawingml/2006/main" xmlns:p="http://schemas.openxmlformats.org/presentationml/2006/main" xmlns:r="http://schemas.openxmlformats.org/officeDocument/2006/relationships" xmlns:p14="http://schemas.microsoft.com/office/powerpoint/2010/main" xmlns:p15="http://schemas.microsoft.com/office/powerpoint/2012/main" xmlns:mc="http://schemas.openxmlformats.org/markup-compatibility/2006" type="twoObj" preserve="1">
-  <p:cSld name="Title, 2 Content">
-    <p:spTree>
-      <p:nvGrpSpPr>
-        <p:cNvPr id="1" name=""/>
-        <p:cNvGrpSpPr/>
-        <p:nvPr/>
-      </p:nvGrpSpPr>
-      <p:grpSpPr>
-        <a:xfrm>
-          <a:off x="0" y="0"/>
-          <a:ext cx="0" cy="0"/>
-          <a:chOff x="0" y="0"/>
-          <a:chExt cx="0" cy="0"/>
-        </a:xfrm>
-      </p:grpSpPr>
-      <p:sp>
-        <p:nvSpPr>
-          <p:cNvPr id="152" name="PlaceHolder 1"/>
-          <p:cNvSpPr>
-            <a:spLocks noGrp="1"/>
-          </p:cNvSpPr>
-          <p:nvPr>
-            <p:ph type="title"/>
-          </p:nvPr>
-        </p:nvSpPr>
-        <p:spPr>
-          <a:xfrm>
-            <a:off x="504000" y="226080"/>
-            <a:ext cx="9072000" cy="946440"/>
-          </a:xfrm>
-          <a:prstGeom prst="rect">
-            <a:avLst/>
-          </a:prstGeom>
-          <a:noFill/>
-          <a:ln w="0">
-            <a:noFill/>
-          </a:ln>
-        </p:spPr>
-        <p:txBody>
-          <a:bodyPr lIns="0" rIns="0" tIns="0" bIns="0" anchor="ctr">
-            <a:noAutofit/>
-          </a:bodyPr>
-          <a:p>
-            <a:pPr algn="ctr">
-              <a:buNone/>
-            </a:pPr>
-            <a:endParaRPr b="0" lang="en-US" sz="4400" spc="-1" strike="noStrike">
-              <a:latin typeface="Arial"/>
-            </a:endParaRPr>
-          </a:p>
-        </p:txBody>
-      </p:sp>
-      <p:sp>
-        <p:nvSpPr>
-          <p:cNvPr id="153" name="PlaceHolder 2"/>
-          <p:cNvSpPr>
-            <a:spLocks noGrp="1"/>
-          </p:cNvSpPr>
-          <p:nvPr>
-            <p:ph/>
-          </p:nvPr>
-        </p:nvSpPr>
-        <p:spPr>
-          <a:xfrm>
-            <a:off x="504000" y="1326600"/>
-            <a:ext cx="4426920" cy="3288600"/>
-          </a:xfrm>
-          <a:prstGeom prst="rect">
-            <a:avLst/>
-          </a:prstGeom>
-          <a:noFill/>
-          <a:ln w="0">
-            <a:noFill/>
-          </a:ln>
-        </p:spPr>
-        <p:txBody>
-          <a:bodyPr lIns="0" rIns="0" tIns="0" bIns="0" anchor="t">
-            <a:normAutofit/>
-          </a:bodyPr>
-          <a:p>
-            <a:endParaRPr b="0" lang="en-US" sz="3200" spc="-1" strike="noStrike">
-              <a:latin typeface="Arial"/>
-            </a:endParaRPr>
-          </a:p>
-        </p:txBody>
-      </p:sp>
-      <p:sp>
-        <p:nvSpPr>
-          <p:cNvPr id="154" name="PlaceHolder 3"/>
-          <p:cNvSpPr>
-            <a:spLocks noGrp="1"/>
-          </p:cNvSpPr>
-          <p:nvPr>
-            <p:ph/>
-          </p:nvPr>
-        </p:nvSpPr>
-        <p:spPr>
-          <a:xfrm>
-            <a:off x="5152680" y="1326600"/>
-            <a:ext cx="4426920" cy="3288600"/>
-          </a:xfrm>
-          <a:prstGeom prst="rect">
-            <a:avLst/>
-          </a:prstGeom>
-          <a:noFill/>
-          <a:ln w="0">
-            <a:noFill/>
-          </a:ln>
-        </p:spPr>
-        <p:txBody>
-          <a:bodyPr lIns="0" rIns="0" tIns="0" bIns="0" anchor="t">
-            <a:normAutofit/>
-          </a:bodyPr>
-          <a:p>
-            <a:endParaRPr b="0" lang="en-US" sz="3200" spc="-1" strike="noStrike">
-              <a:latin typeface="Arial"/>
-            </a:endParaRPr>
-          </a:p>
-        </p:txBody>
-      </p:sp>
-    </p:spTree>
-  </p:cSld>
-</p:sldLayout>
-</file>
-
-<file path=ppt/slideLayouts/slideLayout17.xml><?xml version="1.0" encoding="utf-8"?>
-<p:sldLayout xmlns:a="http://schemas.openxmlformats.org/drawingml/2006/main" xmlns:p="http://schemas.openxmlformats.org/presentationml/2006/main" xmlns:r="http://schemas.openxmlformats.org/officeDocument/2006/relationships" xmlns:p14="http://schemas.microsoft.com/office/powerpoint/2010/main" xmlns:p15="http://schemas.microsoft.com/office/powerpoint/2012/main" xmlns:mc="http://schemas.openxmlformats.org/markup-compatibility/2006" type="titleOnly" preserve="1">
-  <p:cSld name="Title Only">
-    <p:spTree>
-      <p:nvGrpSpPr>
-        <p:cNvPr id="1" name=""/>
-        <p:cNvGrpSpPr/>
-        <p:nvPr/>
-      </p:nvGrpSpPr>
-      <p:grpSpPr>
-        <a:xfrm>
-          <a:off x="0" y="0"/>
-          <a:ext cx="0" cy="0"/>
-          <a:chOff x="0" y="0"/>
-          <a:chExt cx="0" cy="0"/>
-        </a:xfrm>
-      </p:grpSpPr>
-      <p:sp>
-        <p:nvSpPr>
-          <p:cNvPr id="155" name="PlaceHolder 1"/>
-          <p:cNvSpPr>
-            <a:spLocks noGrp="1"/>
-          </p:cNvSpPr>
-          <p:nvPr>
-            <p:ph type="title"/>
-          </p:nvPr>
-        </p:nvSpPr>
-        <p:spPr>
-          <a:xfrm>
-            <a:off x="504000" y="226080"/>
-            <a:ext cx="9072000" cy="946440"/>
-          </a:xfrm>
-          <a:prstGeom prst="rect">
-            <a:avLst/>
-          </a:prstGeom>
-          <a:noFill/>
-          <a:ln w="0">
-            <a:noFill/>
-          </a:ln>
-        </p:spPr>
-        <p:txBody>
-          <a:bodyPr lIns="0" rIns="0" tIns="0" bIns="0" anchor="ctr">
-            <a:noAutofit/>
-          </a:bodyPr>
-          <a:p>
-            <a:pPr algn="ctr">
-              <a:buNone/>
-            </a:pPr>
-            <a:endParaRPr b="0" lang="en-US" sz="4400" spc="-1" strike="noStrike">
-              <a:latin typeface="Arial"/>
-            </a:endParaRPr>
-          </a:p>
-        </p:txBody>
-      </p:sp>
-    </p:spTree>
-  </p:cSld>
-</p:sldLayout>
-</file>
-
-<file path=ppt/slideLayouts/slideLayout18.xml><?xml version="1.0" encoding="utf-8"?>
-<p:sldLayout xmlns:a="http://schemas.openxmlformats.org/drawingml/2006/main" xmlns:p="http://schemas.openxmlformats.org/presentationml/2006/main" xmlns:r="http://schemas.openxmlformats.org/officeDocument/2006/relationships" xmlns:p14="http://schemas.microsoft.com/office/powerpoint/2010/main" xmlns:p15="http://schemas.microsoft.com/office/powerpoint/2012/main" xmlns:mc="http://schemas.openxmlformats.org/markup-compatibility/2006" type="objOnly" preserve="1">
-  <p:cSld name="Centered Text">
-    <p:spTree>
-      <p:nvGrpSpPr>
-        <p:cNvPr id="1" name=""/>
-        <p:cNvGrpSpPr/>
-        <p:nvPr/>
-      </p:nvGrpSpPr>
-      <p:grpSpPr>
-        <a:xfrm>
-          <a:off x="0" y="0"/>
-          <a:ext cx="0" cy="0"/>
-          <a:chOff x="0" y="0"/>
-          <a:chExt cx="0" cy="0"/>
-        </a:xfrm>
-      </p:grpSpPr>
-      <p:sp>
-        <p:nvSpPr>
-          <p:cNvPr id="156" name="PlaceHolder 1"/>
-          <p:cNvSpPr>
-            <a:spLocks noGrp="1"/>
-          </p:cNvSpPr>
-          <p:nvPr>
-            <p:ph type="subTitle"/>
-          </p:nvPr>
-        </p:nvSpPr>
-        <p:spPr>
-          <a:xfrm>
-            <a:off x="504000" y="226080"/>
-            <a:ext cx="9072000" cy="4388400"/>
-          </a:xfrm>
-          <a:prstGeom prst="rect">
-            <a:avLst/>
-          </a:prstGeom>
-          <a:noFill/>
-          <a:ln w="0">
-            <a:noFill/>
-          </a:ln>
-        </p:spPr>
-        <p:txBody>
-          <a:bodyPr lIns="0" rIns="0" tIns="0" bIns="0" anchor="ctr">
-            <a:noAutofit/>
-          </a:bodyPr>
-          <a:p>
-            <a:pPr algn="ctr">
-              <a:buNone/>
-            </a:pPr>
-            <a:endParaRPr b="0" lang="en-US" sz="3200" spc="-1" strike="noStrike">
-              <a:latin typeface="Arial"/>
-            </a:endParaRPr>
-          </a:p>
-        </p:txBody>
-      </p:sp>
-    </p:spTree>
-  </p:cSld>
-</p:sldLayout>
-</file>
-
-<file path=ppt/slideLayouts/slideLayout19.xml><?xml version="1.0" encoding="utf-8"?>
-<p:sldLayout xmlns:a="http://schemas.openxmlformats.org/drawingml/2006/main" xmlns:p="http://schemas.openxmlformats.org/presentationml/2006/main" xmlns:r="http://schemas.openxmlformats.org/officeDocument/2006/relationships" xmlns:p14="http://schemas.microsoft.com/office/powerpoint/2010/main" xmlns:p15="http://schemas.microsoft.com/office/powerpoint/2012/main" xmlns:mc="http://schemas.openxmlformats.org/markup-compatibility/2006" type="twoObjAndObj" preserve="1">
-  <p:cSld name="Title, 2 Content and Content">
-    <p:spTree>
-      <p:nvGrpSpPr>
-        <p:cNvPr id="1" name=""/>
-        <p:cNvGrpSpPr/>
-        <p:nvPr/>
-      </p:nvGrpSpPr>
-      <p:grpSpPr>
-        <a:xfrm>
-          <a:off x="0" y="0"/>
-          <a:ext cx="0" cy="0"/>
-          <a:chOff x="0" y="0"/>
-          <a:chExt cx="0" cy="0"/>
-        </a:xfrm>
-      </p:grpSpPr>
-      <p:sp>
-        <p:nvSpPr>
-          <p:cNvPr id="157" name="PlaceHolder 1"/>
-          <p:cNvSpPr>
-            <a:spLocks noGrp="1"/>
-          </p:cNvSpPr>
-          <p:nvPr>
-            <p:ph type="title"/>
-          </p:nvPr>
-        </p:nvSpPr>
-        <p:spPr>
-          <a:xfrm>
-            <a:off x="504000" y="226080"/>
-            <a:ext cx="9072000" cy="946440"/>
-          </a:xfrm>
-          <a:prstGeom prst="rect">
-            <a:avLst/>
-          </a:prstGeom>
-          <a:noFill/>
-          <a:ln w="0">
-            <a:noFill/>
-          </a:ln>
-        </p:spPr>
-        <p:txBody>
-          <a:bodyPr lIns="0" rIns="0" tIns="0" bIns="0" anchor="ctr">
-            <a:noAutofit/>
-          </a:bodyPr>
-          <a:p>
-            <a:pPr algn="ctr">
-              <a:buNone/>
-            </a:pPr>
-            <a:endParaRPr b="0" lang="en-US" sz="4400" spc="-1" strike="noStrike">
-              <a:latin typeface="Arial"/>
-            </a:endParaRPr>
-          </a:p>
-        </p:txBody>
-      </p:sp>
-      <p:sp>
-        <p:nvSpPr>
-          <p:cNvPr id="158" name="PlaceHolder 2"/>
-          <p:cNvSpPr>
-            <a:spLocks noGrp="1"/>
-          </p:cNvSpPr>
-          <p:nvPr>
-            <p:ph/>
-          </p:nvPr>
-        </p:nvSpPr>
-        <p:spPr>
-          <a:xfrm>
-            <a:off x="504000" y="1326600"/>
-            <a:ext cx="4426920" cy="1568520"/>
-          </a:xfrm>
-          <a:prstGeom prst="rect">
-            <a:avLst/>
-          </a:prstGeom>
-          <a:noFill/>
-          <a:ln w="0">
-            <a:noFill/>
-          </a:ln>
-        </p:spPr>
-        <p:txBody>
-          <a:bodyPr lIns="0" rIns="0" tIns="0" bIns="0" anchor="t">
-            <a:normAutofit/>
-          </a:bodyPr>
-          <a:p>
-            <a:endParaRPr b="0" lang="en-US" sz="3200" spc="-1" strike="noStrike">
-              <a:latin typeface="Arial"/>
-            </a:endParaRPr>
-          </a:p>
-        </p:txBody>
-      </p:sp>
-      <p:sp>
-        <p:nvSpPr>
-          <p:cNvPr id="159" name="PlaceHolder 3"/>
-          <p:cNvSpPr>
-            <a:spLocks noGrp="1"/>
-          </p:cNvSpPr>
-          <p:nvPr>
-            <p:ph/>
-          </p:nvPr>
-        </p:nvSpPr>
-        <p:spPr>
-          <a:xfrm>
-            <a:off x="5152680" y="1326600"/>
-            <a:ext cx="4426920" cy="3288600"/>
-          </a:xfrm>
-          <a:prstGeom prst="rect">
-            <a:avLst/>
-          </a:prstGeom>
-          <a:noFill/>
-          <a:ln w="0">
-            <a:noFill/>
-          </a:ln>
-        </p:spPr>
-        <p:txBody>
-          <a:bodyPr lIns="0" rIns="0" tIns="0" bIns="0" anchor="t">
-            <a:normAutofit/>
-          </a:bodyPr>
-          <a:p>
-            <a:endParaRPr b="0" lang="en-US" sz="3200" spc="-1" strike="noStrike">
-              <a:latin typeface="Arial"/>
-            </a:endParaRPr>
-          </a:p>
-        </p:txBody>
-      </p:sp>
-      <p:sp>
-        <p:nvSpPr>
-          <p:cNvPr id="160" name="PlaceHolder 4"/>
-          <p:cNvSpPr>
-            <a:spLocks noGrp="1"/>
-          </p:cNvSpPr>
-          <p:nvPr>
-            <p:ph/>
-          </p:nvPr>
-        </p:nvSpPr>
-        <p:spPr>
-          <a:xfrm>
-            <a:off x="504000" y="3044520"/>
-            <a:ext cx="4426920" cy="1568520"/>
-          </a:xfrm>
-          <a:prstGeom prst="rect">
-            <a:avLst/>
-          </a:prstGeom>
-          <a:noFill/>
-          <a:ln w="0">
-            <a:noFill/>
-          </a:ln>
-        </p:spPr>
-        <p:txBody>
-          <a:bodyPr lIns="0" rIns="0" tIns="0" bIns="0" anchor="t">
-            <a:normAutofit/>
-          </a:bodyPr>
-          <a:p>
-            <a:endParaRPr b="0" lang="en-US" sz="3200" spc="-1" strike="noStrike">
-              <a:latin typeface="Arial"/>
-            </a:endParaRPr>
-          </a:p>
-        </p:txBody>
-      </p:sp>
-    </p:spTree>
-  </p:cSld>
-</p:sldLayout>
-</file>
-
 <file path=ppt/slideLayouts/slideLayout2.xml><?xml version="1.0" encoding="utf-8"?>
 <p:sldLayout xmlns:a="http://schemas.openxmlformats.org/drawingml/2006/main" xmlns:p="http://schemas.openxmlformats.org/presentationml/2006/main" xmlns:r="http://schemas.openxmlformats.org/officeDocument/2006/relationships" xmlns:p14="http://schemas.microsoft.com/office/powerpoint/2010/main" xmlns:p15="http://schemas.microsoft.com/office/powerpoint/2012/main" xmlns:mc="http://schemas.openxmlformats.org/markup-compatibility/2006" type="tx" preserve="1">
   <p:cSld name="Title Slide">
@@ -1323,913 +705,6 @@
             <a:pPr algn="ctr">
               <a:buNone/>
             </a:pPr>
-            <a:endParaRPr b="0" lang="en-US" sz="3200" spc="-1" strike="noStrike">
-              <a:latin typeface="Arial"/>
-            </a:endParaRPr>
-          </a:p>
-        </p:txBody>
-      </p:sp>
-    </p:spTree>
-  </p:cSld>
-</p:sldLayout>
-</file>
-
-<file path=ppt/slideLayouts/slideLayout20.xml><?xml version="1.0" encoding="utf-8"?>
-<p:sldLayout xmlns:a="http://schemas.openxmlformats.org/drawingml/2006/main" xmlns:p="http://schemas.openxmlformats.org/presentationml/2006/main" xmlns:r="http://schemas.openxmlformats.org/officeDocument/2006/relationships" xmlns:p14="http://schemas.microsoft.com/office/powerpoint/2010/main" xmlns:p15="http://schemas.microsoft.com/office/powerpoint/2012/main" xmlns:mc="http://schemas.openxmlformats.org/markup-compatibility/2006" type="objAndTwoObj" preserve="1">
-  <p:cSld name="Title Content and 2 Content">
-    <p:spTree>
-      <p:nvGrpSpPr>
-        <p:cNvPr id="1" name=""/>
-        <p:cNvGrpSpPr/>
-        <p:nvPr/>
-      </p:nvGrpSpPr>
-      <p:grpSpPr>
-        <a:xfrm>
-          <a:off x="0" y="0"/>
-          <a:ext cx="0" cy="0"/>
-          <a:chOff x="0" y="0"/>
-          <a:chExt cx="0" cy="0"/>
-        </a:xfrm>
-      </p:grpSpPr>
-      <p:sp>
-        <p:nvSpPr>
-          <p:cNvPr id="161" name="PlaceHolder 1"/>
-          <p:cNvSpPr>
-            <a:spLocks noGrp="1"/>
-          </p:cNvSpPr>
-          <p:nvPr>
-            <p:ph type="title"/>
-          </p:nvPr>
-        </p:nvSpPr>
-        <p:spPr>
-          <a:xfrm>
-            <a:off x="504000" y="226080"/>
-            <a:ext cx="9072000" cy="946440"/>
-          </a:xfrm>
-          <a:prstGeom prst="rect">
-            <a:avLst/>
-          </a:prstGeom>
-          <a:noFill/>
-          <a:ln w="0">
-            <a:noFill/>
-          </a:ln>
-        </p:spPr>
-        <p:txBody>
-          <a:bodyPr lIns="0" rIns="0" tIns="0" bIns="0" anchor="ctr">
-            <a:noAutofit/>
-          </a:bodyPr>
-          <a:p>
-            <a:pPr algn="ctr">
-              <a:buNone/>
-            </a:pPr>
-            <a:endParaRPr b="0" lang="en-US" sz="4400" spc="-1" strike="noStrike">
-              <a:latin typeface="Arial"/>
-            </a:endParaRPr>
-          </a:p>
-        </p:txBody>
-      </p:sp>
-      <p:sp>
-        <p:nvSpPr>
-          <p:cNvPr id="162" name="PlaceHolder 2"/>
-          <p:cNvSpPr>
-            <a:spLocks noGrp="1"/>
-          </p:cNvSpPr>
-          <p:nvPr>
-            <p:ph/>
-          </p:nvPr>
-        </p:nvSpPr>
-        <p:spPr>
-          <a:xfrm>
-            <a:off x="504000" y="1326600"/>
-            <a:ext cx="4426920" cy="3288600"/>
-          </a:xfrm>
-          <a:prstGeom prst="rect">
-            <a:avLst/>
-          </a:prstGeom>
-          <a:noFill/>
-          <a:ln w="0">
-            <a:noFill/>
-          </a:ln>
-        </p:spPr>
-        <p:txBody>
-          <a:bodyPr lIns="0" rIns="0" tIns="0" bIns="0" anchor="t">
-            <a:normAutofit/>
-          </a:bodyPr>
-          <a:p>
-            <a:endParaRPr b="0" lang="en-US" sz="3200" spc="-1" strike="noStrike">
-              <a:latin typeface="Arial"/>
-            </a:endParaRPr>
-          </a:p>
-        </p:txBody>
-      </p:sp>
-      <p:sp>
-        <p:nvSpPr>
-          <p:cNvPr id="163" name="PlaceHolder 3"/>
-          <p:cNvSpPr>
-            <a:spLocks noGrp="1"/>
-          </p:cNvSpPr>
-          <p:nvPr>
-            <p:ph/>
-          </p:nvPr>
-        </p:nvSpPr>
-        <p:spPr>
-          <a:xfrm>
-            <a:off x="5152680" y="1326600"/>
-            <a:ext cx="4426920" cy="1568520"/>
-          </a:xfrm>
-          <a:prstGeom prst="rect">
-            <a:avLst/>
-          </a:prstGeom>
-          <a:noFill/>
-          <a:ln w="0">
-            <a:noFill/>
-          </a:ln>
-        </p:spPr>
-        <p:txBody>
-          <a:bodyPr lIns="0" rIns="0" tIns="0" bIns="0" anchor="t">
-            <a:normAutofit/>
-          </a:bodyPr>
-          <a:p>
-            <a:endParaRPr b="0" lang="en-US" sz="3200" spc="-1" strike="noStrike">
-              <a:latin typeface="Arial"/>
-            </a:endParaRPr>
-          </a:p>
-        </p:txBody>
-      </p:sp>
-      <p:sp>
-        <p:nvSpPr>
-          <p:cNvPr id="164" name="PlaceHolder 4"/>
-          <p:cNvSpPr>
-            <a:spLocks noGrp="1"/>
-          </p:cNvSpPr>
-          <p:nvPr>
-            <p:ph/>
-          </p:nvPr>
-        </p:nvSpPr>
-        <p:spPr>
-          <a:xfrm>
-            <a:off x="5152680" y="3044520"/>
-            <a:ext cx="4426920" cy="1568520"/>
-          </a:xfrm>
-          <a:prstGeom prst="rect">
-            <a:avLst/>
-          </a:prstGeom>
-          <a:noFill/>
-          <a:ln w="0">
-            <a:noFill/>
-          </a:ln>
-        </p:spPr>
-        <p:txBody>
-          <a:bodyPr lIns="0" rIns="0" tIns="0" bIns="0" anchor="t">
-            <a:normAutofit/>
-          </a:bodyPr>
-          <a:p>
-            <a:endParaRPr b="0" lang="en-US" sz="3200" spc="-1" strike="noStrike">
-              <a:latin typeface="Arial"/>
-            </a:endParaRPr>
-          </a:p>
-        </p:txBody>
-      </p:sp>
-    </p:spTree>
-  </p:cSld>
-</p:sldLayout>
-</file>
-
-<file path=ppt/slideLayouts/slideLayout21.xml><?xml version="1.0" encoding="utf-8"?>
-<p:sldLayout xmlns:a="http://schemas.openxmlformats.org/drawingml/2006/main" xmlns:p="http://schemas.openxmlformats.org/presentationml/2006/main" xmlns:r="http://schemas.openxmlformats.org/officeDocument/2006/relationships" xmlns:p14="http://schemas.microsoft.com/office/powerpoint/2010/main" xmlns:p15="http://schemas.microsoft.com/office/powerpoint/2012/main" xmlns:mc="http://schemas.openxmlformats.org/markup-compatibility/2006" type="twoObjOverTx" preserve="1">
-  <p:cSld name="Title, 2 Content over Content">
-    <p:spTree>
-      <p:nvGrpSpPr>
-        <p:cNvPr id="1" name=""/>
-        <p:cNvGrpSpPr/>
-        <p:nvPr/>
-      </p:nvGrpSpPr>
-      <p:grpSpPr>
-        <a:xfrm>
-          <a:off x="0" y="0"/>
-          <a:ext cx="0" cy="0"/>
-          <a:chOff x="0" y="0"/>
-          <a:chExt cx="0" cy="0"/>
-        </a:xfrm>
-      </p:grpSpPr>
-      <p:sp>
-        <p:nvSpPr>
-          <p:cNvPr id="165" name="PlaceHolder 1"/>
-          <p:cNvSpPr>
-            <a:spLocks noGrp="1"/>
-          </p:cNvSpPr>
-          <p:nvPr>
-            <p:ph type="title"/>
-          </p:nvPr>
-        </p:nvSpPr>
-        <p:spPr>
-          <a:xfrm>
-            <a:off x="504000" y="226080"/>
-            <a:ext cx="9072000" cy="946440"/>
-          </a:xfrm>
-          <a:prstGeom prst="rect">
-            <a:avLst/>
-          </a:prstGeom>
-          <a:noFill/>
-          <a:ln w="0">
-            <a:noFill/>
-          </a:ln>
-        </p:spPr>
-        <p:txBody>
-          <a:bodyPr lIns="0" rIns="0" tIns="0" bIns="0" anchor="ctr">
-            <a:noAutofit/>
-          </a:bodyPr>
-          <a:p>
-            <a:pPr algn="ctr">
-              <a:buNone/>
-            </a:pPr>
-            <a:endParaRPr b="0" lang="en-US" sz="4400" spc="-1" strike="noStrike">
-              <a:latin typeface="Arial"/>
-            </a:endParaRPr>
-          </a:p>
-        </p:txBody>
-      </p:sp>
-      <p:sp>
-        <p:nvSpPr>
-          <p:cNvPr id="166" name="PlaceHolder 2"/>
-          <p:cNvSpPr>
-            <a:spLocks noGrp="1"/>
-          </p:cNvSpPr>
-          <p:nvPr>
-            <p:ph/>
-          </p:nvPr>
-        </p:nvSpPr>
-        <p:spPr>
-          <a:xfrm>
-            <a:off x="504000" y="1326600"/>
-            <a:ext cx="4426920" cy="1568520"/>
-          </a:xfrm>
-          <a:prstGeom prst="rect">
-            <a:avLst/>
-          </a:prstGeom>
-          <a:noFill/>
-          <a:ln w="0">
-            <a:noFill/>
-          </a:ln>
-        </p:spPr>
-        <p:txBody>
-          <a:bodyPr lIns="0" rIns="0" tIns="0" bIns="0" anchor="t">
-            <a:normAutofit/>
-          </a:bodyPr>
-          <a:p>
-            <a:endParaRPr b="0" lang="en-US" sz="3200" spc="-1" strike="noStrike">
-              <a:latin typeface="Arial"/>
-            </a:endParaRPr>
-          </a:p>
-        </p:txBody>
-      </p:sp>
-      <p:sp>
-        <p:nvSpPr>
-          <p:cNvPr id="167" name="PlaceHolder 3"/>
-          <p:cNvSpPr>
-            <a:spLocks noGrp="1"/>
-          </p:cNvSpPr>
-          <p:nvPr>
-            <p:ph/>
-          </p:nvPr>
-        </p:nvSpPr>
-        <p:spPr>
-          <a:xfrm>
-            <a:off x="5152680" y="1326600"/>
-            <a:ext cx="4426920" cy="1568520"/>
-          </a:xfrm>
-          <a:prstGeom prst="rect">
-            <a:avLst/>
-          </a:prstGeom>
-          <a:noFill/>
-          <a:ln w="0">
-            <a:noFill/>
-          </a:ln>
-        </p:spPr>
-        <p:txBody>
-          <a:bodyPr lIns="0" rIns="0" tIns="0" bIns="0" anchor="t">
-            <a:normAutofit/>
-          </a:bodyPr>
-          <a:p>
-            <a:endParaRPr b="0" lang="en-US" sz="3200" spc="-1" strike="noStrike">
-              <a:latin typeface="Arial"/>
-            </a:endParaRPr>
-          </a:p>
-        </p:txBody>
-      </p:sp>
-      <p:sp>
-        <p:nvSpPr>
-          <p:cNvPr id="168" name="PlaceHolder 4"/>
-          <p:cNvSpPr>
-            <a:spLocks noGrp="1"/>
-          </p:cNvSpPr>
-          <p:nvPr>
-            <p:ph/>
-          </p:nvPr>
-        </p:nvSpPr>
-        <p:spPr>
-          <a:xfrm>
-            <a:off x="504000" y="3044520"/>
-            <a:ext cx="9072000" cy="1568520"/>
-          </a:xfrm>
-          <a:prstGeom prst="rect">
-            <a:avLst/>
-          </a:prstGeom>
-          <a:noFill/>
-          <a:ln w="0">
-            <a:noFill/>
-          </a:ln>
-        </p:spPr>
-        <p:txBody>
-          <a:bodyPr lIns="0" rIns="0" tIns="0" bIns="0" anchor="t">
-            <a:normAutofit/>
-          </a:bodyPr>
-          <a:p>
-            <a:endParaRPr b="0" lang="en-US" sz="3200" spc="-1" strike="noStrike">
-              <a:latin typeface="Arial"/>
-            </a:endParaRPr>
-          </a:p>
-        </p:txBody>
-      </p:sp>
-    </p:spTree>
-  </p:cSld>
-</p:sldLayout>
-</file>
-
-<file path=ppt/slideLayouts/slideLayout22.xml><?xml version="1.0" encoding="utf-8"?>
-<p:sldLayout xmlns:a="http://schemas.openxmlformats.org/drawingml/2006/main" xmlns:p="http://schemas.openxmlformats.org/presentationml/2006/main" xmlns:r="http://schemas.openxmlformats.org/officeDocument/2006/relationships" xmlns:p14="http://schemas.microsoft.com/office/powerpoint/2010/main" xmlns:p15="http://schemas.microsoft.com/office/powerpoint/2012/main" xmlns:mc="http://schemas.openxmlformats.org/markup-compatibility/2006" type="objOverTx" preserve="1">
-  <p:cSld name="Title, Content over Content">
-    <p:spTree>
-      <p:nvGrpSpPr>
-        <p:cNvPr id="1" name=""/>
-        <p:cNvGrpSpPr/>
-        <p:nvPr/>
-      </p:nvGrpSpPr>
-      <p:grpSpPr>
-        <a:xfrm>
-          <a:off x="0" y="0"/>
-          <a:ext cx="0" cy="0"/>
-          <a:chOff x="0" y="0"/>
-          <a:chExt cx="0" cy="0"/>
-        </a:xfrm>
-      </p:grpSpPr>
-      <p:sp>
-        <p:nvSpPr>
-          <p:cNvPr id="169" name="PlaceHolder 1"/>
-          <p:cNvSpPr>
-            <a:spLocks noGrp="1"/>
-          </p:cNvSpPr>
-          <p:nvPr>
-            <p:ph type="title"/>
-          </p:nvPr>
-        </p:nvSpPr>
-        <p:spPr>
-          <a:xfrm>
-            <a:off x="504000" y="226080"/>
-            <a:ext cx="9072000" cy="946440"/>
-          </a:xfrm>
-          <a:prstGeom prst="rect">
-            <a:avLst/>
-          </a:prstGeom>
-          <a:noFill/>
-          <a:ln w="0">
-            <a:noFill/>
-          </a:ln>
-        </p:spPr>
-        <p:txBody>
-          <a:bodyPr lIns="0" rIns="0" tIns="0" bIns="0" anchor="ctr">
-            <a:noAutofit/>
-          </a:bodyPr>
-          <a:p>
-            <a:pPr algn="ctr">
-              <a:buNone/>
-            </a:pPr>
-            <a:endParaRPr b="0" lang="en-US" sz="4400" spc="-1" strike="noStrike">
-              <a:latin typeface="Arial"/>
-            </a:endParaRPr>
-          </a:p>
-        </p:txBody>
-      </p:sp>
-      <p:sp>
-        <p:nvSpPr>
-          <p:cNvPr id="170" name="PlaceHolder 2"/>
-          <p:cNvSpPr>
-            <a:spLocks noGrp="1"/>
-          </p:cNvSpPr>
-          <p:nvPr>
-            <p:ph/>
-          </p:nvPr>
-        </p:nvSpPr>
-        <p:spPr>
-          <a:xfrm>
-            <a:off x="504000" y="1326600"/>
-            <a:ext cx="9072000" cy="1568520"/>
-          </a:xfrm>
-          <a:prstGeom prst="rect">
-            <a:avLst/>
-          </a:prstGeom>
-          <a:noFill/>
-          <a:ln w="0">
-            <a:noFill/>
-          </a:ln>
-        </p:spPr>
-        <p:txBody>
-          <a:bodyPr lIns="0" rIns="0" tIns="0" bIns="0" anchor="t">
-            <a:normAutofit/>
-          </a:bodyPr>
-          <a:p>
-            <a:endParaRPr b="0" lang="en-US" sz="3200" spc="-1" strike="noStrike">
-              <a:latin typeface="Arial"/>
-            </a:endParaRPr>
-          </a:p>
-        </p:txBody>
-      </p:sp>
-      <p:sp>
-        <p:nvSpPr>
-          <p:cNvPr id="171" name="PlaceHolder 3"/>
-          <p:cNvSpPr>
-            <a:spLocks noGrp="1"/>
-          </p:cNvSpPr>
-          <p:nvPr>
-            <p:ph/>
-          </p:nvPr>
-        </p:nvSpPr>
-        <p:spPr>
-          <a:xfrm>
-            <a:off x="504000" y="3044520"/>
-            <a:ext cx="9072000" cy="1568520"/>
-          </a:xfrm>
-          <a:prstGeom prst="rect">
-            <a:avLst/>
-          </a:prstGeom>
-          <a:noFill/>
-          <a:ln w="0">
-            <a:noFill/>
-          </a:ln>
-        </p:spPr>
-        <p:txBody>
-          <a:bodyPr lIns="0" rIns="0" tIns="0" bIns="0" anchor="t">
-            <a:normAutofit/>
-          </a:bodyPr>
-          <a:p>
-            <a:endParaRPr b="0" lang="en-US" sz="3200" spc="-1" strike="noStrike">
-              <a:latin typeface="Arial"/>
-            </a:endParaRPr>
-          </a:p>
-        </p:txBody>
-      </p:sp>
-    </p:spTree>
-  </p:cSld>
-</p:sldLayout>
-</file>
-
-<file path=ppt/slideLayouts/slideLayout23.xml><?xml version="1.0" encoding="utf-8"?>
-<p:sldLayout xmlns:a="http://schemas.openxmlformats.org/drawingml/2006/main" xmlns:p="http://schemas.openxmlformats.org/presentationml/2006/main" xmlns:r="http://schemas.openxmlformats.org/officeDocument/2006/relationships" xmlns:p14="http://schemas.microsoft.com/office/powerpoint/2010/main" xmlns:p15="http://schemas.microsoft.com/office/powerpoint/2012/main" xmlns:mc="http://schemas.openxmlformats.org/markup-compatibility/2006" type="fourObj" preserve="1">
-  <p:cSld name="Title, 4 Content">
-    <p:spTree>
-      <p:nvGrpSpPr>
-        <p:cNvPr id="1" name=""/>
-        <p:cNvGrpSpPr/>
-        <p:nvPr/>
-      </p:nvGrpSpPr>
-      <p:grpSpPr>
-        <a:xfrm>
-          <a:off x="0" y="0"/>
-          <a:ext cx="0" cy="0"/>
-          <a:chOff x="0" y="0"/>
-          <a:chExt cx="0" cy="0"/>
-        </a:xfrm>
-      </p:grpSpPr>
-      <p:sp>
-        <p:nvSpPr>
-          <p:cNvPr id="172" name="PlaceHolder 1"/>
-          <p:cNvSpPr>
-            <a:spLocks noGrp="1"/>
-          </p:cNvSpPr>
-          <p:nvPr>
-            <p:ph type="title"/>
-          </p:nvPr>
-        </p:nvSpPr>
-        <p:spPr>
-          <a:xfrm>
-            <a:off x="504000" y="226080"/>
-            <a:ext cx="9072000" cy="946440"/>
-          </a:xfrm>
-          <a:prstGeom prst="rect">
-            <a:avLst/>
-          </a:prstGeom>
-          <a:noFill/>
-          <a:ln w="0">
-            <a:noFill/>
-          </a:ln>
-        </p:spPr>
-        <p:txBody>
-          <a:bodyPr lIns="0" rIns="0" tIns="0" bIns="0" anchor="ctr">
-            <a:noAutofit/>
-          </a:bodyPr>
-          <a:p>
-            <a:pPr algn="ctr">
-              <a:buNone/>
-            </a:pPr>
-            <a:endParaRPr b="0" lang="en-US" sz="4400" spc="-1" strike="noStrike">
-              <a:latin typeface="Arial"/>
-            </a:endParaRPr>
-          </a:p>
-        </p:txBody>
-      </p:sp>
-      <p:sp>
-        <p:nvSpPr>
-          <p:cNvPr id="173" name="PlaceHolder 2"/>
-          <p:cNvSpPr>
-            <a:spLocks noGrp="1"/>
-          </p:cNvSpPr>
-          <p:nvPr>
-            <p:ph/>
-          </p:nvPr>
-        </p:nvSpPr>
-        <p:spPr>
-          <a:xfrm>
-            <a:off x="504000" y="1326600"/>
-            <a:ext cx="4426920" cy="1568520"/>
-          </a:xfrm>
-          <a:prstGeom prst="rect">
-            <a:avLst/>
-          </a:prstGeom>
-          <a:noFill/>
-          <a:ln w="0">
-            <a:noFill/>
-          </a:ln>
-        </p:spPr>
-        <p:txBody>
-          <a:bodyPr lIns="0" rIns="0" tIns="0" bIns="0" anchor="t">
-            <a:normAutofit/>
-          </a:bodyPr>
-          <a:p>
-            <a:endParaRPr b="0" lang="en-US" sz="3200" spc="-1" strike="noStrike">
-              <a:latin typeface="Arial"/>
-            </a:endParaRPr>
-          </a:p>
-        </p:txBody>
-      </p:sp>
-      <p:sp>
-        <p:nvSpPr>
-          <p:cNvPr id="174" name="PlaceHolder 3"/>
-          <p:cNvSpPr>
-            <a:spLocks noGrp="1"/>
-          </p:cNvSpPr>
-          <p:nvPr>
-            <p:ph/>
-          </p:nvPr>
-        </p:nvSpPr>
-        <p:spPr>
-          <a:xfrm>
-            <a:off x="5152680" y="1326600"/>
-            <a:ext cx="4426920" cy="1568520"/>
-          </a:xfrm>
-          <a:prstGeom prst="rect">
-            <a:avLst/>
-          </a:prstGeom>
-          <a:noFill/>
-          <a:ln w="0">
-            <a:noFill/>
-          </a:ln>
-        </p:spPr>
-        <p:txBody>
-          <a:bodyPr lIns="0" rIns="0" tIns="0" bIns="0" anchor="t">
-            <a:normAutofit/>
-          </a:bodyPr>
-          <a:p>
-            <a:endParaRPr b="0" lang="en-US" sz="3200" spc="-1" strike="noStrike">
-              <a:latin typeface="Arial"/>
-            </a:endParaRPr>
-          </a:p>
-        </p:txBody>
-      </p:sp>
-      <p:sp>
-        <p:nvSpPr>
-          <p:cNvPr id="175" name="PlaceHolder 4"/>
-          <p:cNvSpPr>
-            <a:spLocks noGrp="1"/>
-          </p:cNvSpPr>
-          <p:nvPr>
-            <p:ph/>
-          </p:nvPr>
-        </p:nvSpPr>
-        <p:spPr>
-          <a:xfrm>
-            <a:off x="504000" y="3044520"/>
-            <a:ext cx="4426920" cy="1568520"/>
-          </a:xfrm>
-          <a:prstGeom prst="rect">
-            <a:avLst/>
-          </a:prstGeom>
-          <a:noFill/>
-          <a:ln w="0">
-            <a:noFill/>
-          </a:ln>
-        </p:spPr>
-        <p:txBody>
-          <a:bodyPr lIns="0" rIns="0" tIns="0" bIns="0" anchor="t">
-            <a:normAutofit/>
-          </a:bodyPr>
-          <a:p>
-            <a:endParaRPr b="0" lang="en-US" sz="3200" spc="-1" strike="noStrike">
-              <a:latin typeface="Arial"/>
-            </a:endParaRPr>
-          </a:p>
-        </p:txBody>
-      </p:sp>
-      <p:sp>
-        <p:nvSpPr>
-          <p:cNvPr id="176" name="PlaceHolder 5"/>
-          <p:cNvSpPr>
-            <a:spLocks noGrp="1"/>
-          </p:cNvSpPr>
-          <p:nvPr>
-            <p:ph/>
-          </p:nvPr>
-        </p:nvSpPr>
-        <p:spPr>
-          <a:xfrm>
-            <a:off x="5152680" y="3044520"/>
-            <a:ext cx="4426920" cy="1568520"/>
-          </a:xfrm>
-          <a:prstGeom prst="rect">
-            <a:avLst/>
-          </a:prstGeom>
-          <a:noFill/>
-          <a:ln w="0">
-            <a:noFill/>
-          </a:ln>
-        </p:spPr>
-        <p:txBody>
-          <a:bodyPr lIns="0" rIns="0" tIns="0" bIns="0" anchor="t">
-            <a:normAutofit/>
-          </a:bodyPr>
-          <a:p>
-            <a:endParaRPr b="0" lang="en-US" sz="3200" spc="-1" strike="noStrike">
-              <a:latin typeface="Arial"/>
-            </a:endParaRPr>
-          </a:p>
-        </p:txBody>
-      </p:sp>
-    </p:spTree>
-  </p:cSld>
-</p:sldLayout>
-</file>
-
-<file path=ppt/slideLayouts/slideLayout24.xml><?xml version="1.0" encoding="utf-8"?>
-<p:sldLayout xmlns:a="http://schemas.openxmlformats.org/drawingml/2006/main" xmlns:p="http://schemas.openxmlformats.org/presentationml/2006/main" xmlns:r="http://schemas.openxmlformats.org/officeDocument/2006/relationships" xmlns:p14="http://schemas.microsoft.com/office/powerpoint/2010/main" xmlns:p15="http://schemas.microsoft.com/office/powerpoint/2012/main" xmlns:mc="http://schemas.openxmlformats.org/markup-compatibility/2006" type="blank" preserve="1">
-  <p:cSld name="Title, 6 Content">
-    <p:spTree>
-      <p:nvGrpSpPr>
-        <p:cNvPr id="1" name=""/>
-        <p:cNvGrpSpPr/>
-        <p:nvPr/>
-      </p:nvGrpSpPr>
-      <p:grpSpPr>
-        <a:xfrm>
-          <a:off x="0" y="0"/>
-          <a:ext cx="0" cy="0"/>
-          <a:chOff x="0" y="0"/>
-          <a:chExt cx="0" cy="0"/>
-        </a:xfrm>
-      </p:grpSpPr>
-      <p:sp>
-        <p:nvSpPr>
-          <p:cNvPr id="177" name="PlaceHolder 1"/>
-          <p:cNvSpPr>
-            <a:spLocks noGrp="1"/>
-          </p:cNvSpPr>
-          <p:nvPr>
-            <p:ph type="title"/>
-          </p:nvPr>
-        </p:nvSpPr>
-        <p:spPr>
-          <a:xfrm>
-            <a:off x="504000" y="226080"/>
-            <a:ext cx="9072000" cy="946440"/>
-          </a:xfrm>
-          <a:prstGeom prst="rect">
-            <a:avLst/>
-          </a:prstGeom>
-          <a:noFill/>
-          <a:ln w="0">
-            <a:noFill/>
-          </a:ln>
-        </p:spPr>
-        <p:txBody>
-          <a:bodyPr lIns="0" rIns="0" tIns="0" bIns="0" anchor="ctr">
-            <a:noAutofit/>
-          </a:bodyPr>
-          <a:p>
-            <a:pPr algn="ctr">
-              <a:buNone/>
-            </a:pPr>
-            <a:endParaRPr b="0" lang="en-US" sz="4400" spc="-1" strike="noStrike">
-              <a:latin typeface="Arial"/>
-            </a:endParaRPr>
-          </a:p>
-        </p:txBody>
-      </p:sp>
-      <p:sp>
-        <p:nvSpPr>
-          <p:cNvPr id="178" name="PlaceHolder 2"/>
-          <p:cNvSpPr>
-            <a:spLocks noGrp="1"/>
-          </p:cNvSpPr>
-          <p:nvPr>
-            <p:ph/>
-          </p:nvPr>
-        </p:nvSpPr>
-        <p:spPr>
-          <a:xfrm>
-            <a:off x="504000" y="1326600"/>
-            <a:ext cx="2921040" cy="1568520"/>
-          </a:xfrm>
-          <a:prstGeom prst="rect">
-            <a:avLst/>
-          </a:prstGeom>
-          <a:noFill/>
-          <a:ln w="0">
-            <a:noFill/>
-          </a:ln>
-        </p:spPr>
-        <p:txBody>
-          <a:bodyPr lIns="0" rIns="0" tIns="0" bIns="0" anchor="t">
-            <a:normAutofit/>
-          </a:bodyPr>
-          <a:p>
-            <a:endParaRPr b="0" lang="en-US" sz="3200" spc="-1" strike="noStrike">
-              <a:latin typeface="Arial"/>
-            </a:endParaRPr>
-          </a:p>
-        </p:txBody>
-      </p:sp>
-      <p:sp>
-        <p:nvSpPr>
-          <p:cNvPr id="179" name="PlaceHolder 3"/>
-          <p:cNvSpPr>
-            <a:spLocks noGrp="1"/>
-          </p:cNvSpPr>
-          <p:nvPr>
-            <p:ph/>
-          </p:nvPr>
-        </p:nvSpPr>
-        <p:spPr>
-          <a:xfrm>
-            <a:off x="3571560" y="1326600"/>
-            <a:ext cx="2921040" cy="1568520"/>
-          </a:xfrm>
-          <a:prstGeom prst="rect">
-            <a:avLst/>
-          </a:prstGeom>
-          <a:noFill/>
-          <a:ln w="0">
-            <a:noFill/>
-          </a:ln>
-        </p:spPr>
-        <p:txBody>
-          <a:bodyPr lIns="0" rIns="0" tIns="0" bIns="0" anchor="t">
-            <a:normAutofit/>
-          </a:bodyPr>
-          <a:p>
-            <a:endParaRPr b="0" lang="en-US" sz="3200" spc="-1" strike="noStrike">
-              <a:latin typeface="Arial"/>
-            </a:endParaRPr>
-          </a:p>
-        </p:txBody>
-      </p:sp>
-      <p:sp>
-        <p:nvSpPr>
-          <p:cNvPr id="180" name="PlaceHolder 4"/>
-          <p:cNvSpPr>
-            <a:spLocks noGrp="1"/>
-          </p:cNvSpPr>
-          <p:nvPr>
-            <p:ph/>
-          </p:nvPr>
-        </p:nvSpPr>
-        <p:spPr>
-          <a:xfrm>
-            <a:off x="6639120" y="1326600"/>
-            <a:ext cx="2921040" cy="1568520"/>
-          </a:xfrm>
-          <a:prstGeom prst="rect">
-            <a:avLst/>
-          </a:prstGeom>
-          <a:noFill/>
-          <a:ln w="0">
-            <a:noFill/>
-          </a:ln>
-        </p:spPr>
-        <p:txBody>
-          <a:bodyPr lIns="0" rIns="0" tIns="0" bIns="0" anchor="t">
-            <a:normAutofit/>
-          </a:bodyPr>
-          <a:p>
-            <a:endParaRPr b="0" lang="en-US" sz="3200" spc="-1" strike="noStrike">
-              <a:latin typeface="Arial"/>
-            </a:endParaRPr>
-          </a:p>
-        </p:txBody>
-      </p:sp>
-      <p:sp>
-        <p:nvSpPr>
-          <p:cNvPr id="181" name="PlaceHolder 5"/>
-          <p:cNvSpPr>
-            <a:spLocks noGrp="1"/>
-          </p:cNvSpPr>
-          <p:nvPr>
-            <p:ph/>
-          </p:nvPr>
-        </p:nvSpPr>
-        <p:spPr>
-          <a:xfrm>
-            <a:off x="504000" y="3044520"/>
-            <a:ext cx="2921040" cy="1568520"/>
-          </a:xfrm>
-          <a:prstGeom prst="rect">
-            <a:avLst/>
-          </a:prstGeom>
-          <a:noFill/>
-          <a:ln w="0">
-            <a:noFill/>
-          </a:ln>
-        </p:spPr>
-        <p:txBody>
-          <a:bodyPr lIns="0" rIns="0" tIns="0" bIns="0" anchor="t">
-            <a:normAutofit/>
-          </a:bodyPr>
-          <a:p>
-            <a:endParaRPr b="0" lang="en-US" sz="3200" spc="-1" strike="noStrike">
-              <a:latin typeface="Arial"/>
-            </a:endParaRPr>
-          </a:p>
-        </p:txBody>
-      </p:sp>
-      <p:sp>
-        <p:nvSpPr>
-          <p:cNvPr id="182" name="PlaceHolder 6"/>
-          <p:cNvSpPr>
-            <a:spLocks noGrp="1"/>
-          </p:cNvSpPr>
-          <p:nvPr>
-            <p:ph/>
-          </p:nvPr>
-        </p:nvSpPr>
-        <p:spPr>
-          <a:xfrm>
-            <a:off x="3571560" y="3044520"/>
-            <a:ext cx="2921040" cy="1568520"/>
-          </a:xfrm>
-          <a:prstGeom prst="rect">
-            <a:avLst/>
-          </a:prstGeom>
-          <a:noFill/>
-          <a:ln w="0">
-            <a:noFill/>
-          </a:ln>
-        </p:spPr>
-        <p:txBody>
-          <a:bodyPr lIns="0" rIns="0" tIns="0" bIns="0" anchor="t">
-            <a:normAutofit/>
-          </a:bodyPr>
-          <a:p>
-            <a:endParaRPr b="0" lang="en-US" sz="3200" spc="-1" strike="noStrike">
-              <a:latin typeface="Arial"/>
-            </a:endParaRPr>
-          </a:p>
-        </p:txBody>
-      </p:sp>
-      <p:sp>
-        <p:nvSpPr>
-          <p:cNvPr id="183" name="PlaceHolder 7"/>
-          <p:cNvSpPr>
-            <a:spLocks noGrp="1"/>
-          </p:cNvSpPr>
-          <p:nvPr>
-            <p:ph/>
-          </p:nvPr>
-        </p:nvSpPr>
-        <p:spPr>
-          <a:xfrm>
-            <a:off x="6639120" y="3044520"/>
-            <a:ext cx="2921040" cy="1568520"/>
-          </a:xfrm>
-          <a:prstGeom prst="rect">
-            <a:avLst/>
-          </a:prstGeom>
-          <a:noFill/>
-          <a:ln w="0">
-            <a:noFill/>
-          </a:ln>
-        </p:spPr>
-        <p:txBody>
-          <a:bodyPr lIns="0" rIns="0" tIns="0" bIns="0" anchor="t">
-            <a:normAutofit/>
-          </a:bodyPr>
-          <a:p>
             <a:endParaRPr b="0" lang="en-US" sz="3200" spc="-1" strike="noStrike">
               <a:latin typeface="Arial"/>
             </a:endParaRPr>
@@ -3088,7 +1563,7 @@
         <p:spPr>
           <a:xfrm>
             <a:off x="-54000" y="18720"/>
-            <a:ext cx="700920" cy="700920"/>
+            <a:ext cx="700200" cy="700200"/>
           </a:xfrm>
           <a:custGeom>
             <a:avLst/>
@@ -3148,7 +1623,7 @@
         <p:spPr>
           <a:xfrm>
             <a:off x="-414000" y="558720"/>
-            <a:ext cx="700920" cy="700920"/>
+            <a:ext cx="700200" cy="700200"/>
           </a:xfrm>
           <a:custGeom>
             <a:avLst/>
@@ -3208,7 +1683,7 @@
         <p:spPr>
           <a:xfrm>
             <a:off x="1350000" y="18720"/>
-            <a:ext cx="700920" cy="700920"/>
+            <a:ext cx="700200" cy="700200"/>
           </a:xfrm>
           <a:custGeom>
             <a:avLst/>
@@ -3268,7 +1743,7 @@
         <p:spPr>
           <a:xfrm>
             <a:off x="648000" y="18720"/>
-            <a:ext cx="700920" cy="700920"/>
+            <a:ext cx="700200" cy="700200"/>
           </a:xfrm>
           <a:custGeom>
             <a:avLst/>
@@ -3328,7 +1803,7 @@
         <p:spPr>
           <a:xfrm>
             <a:off x="990000" y="558720"/>
-            <a:ext cx="700920" cy="700920"/>
+            <a:ext cx="700200" cy="700200"/>
           </a:xfrm>
           <a:custGeom>
             <a:avLst/>
@@ -3388,7 +1863,7 @@
         <p:spPr>
           <a:xfrm>
             <a:off x="2394000" y="558720"/>
-            <a:ext cx="700920" cy="700920"/>
+            <a:ext cx="700200" cy="700200"/>
           </a:xfrm>
           <a:custGeom>
             <a:avLst/>
@@ -3448,7 +1923,7 @@
         <p:spPr>
           <a:xfrm>
             <a:off x="1692000" y="558720"/>
-            <a:ext cx="700920" cy="700920"/>
+            <a:ext cx="700200" cy="700200"/>
           </a:xfrm>
           <a:custGeom>
             <a:avLst/>
@@ -3508,7 +1983,7 @@
         <p:spPr>
           <a:xfrm>
             <a:off x="2754000" y="18720"/>
-            <a:ext cx="700920" cy="700920"/>
+            <a:ext cx="700200" cy="700200"/>
           </a:xfrm>
           <a:custGeom>
             <a:avLst/>
@@ -3568,7 +2043,7 @@
         <p:spPr>
           <a:xfrm>
             <a:off x="2052000" y="720"/>
-            <a:ext cx="700920" cy="700920"/>
+            <a:ext cx="700200" cy="700200"/>
           </a:xfrm>
           <a:custGeom>
             <a:avLst/>
@@ -3628,7 +2103,7 @@
         <p:spPr>
           <a:xfrm>
             <a:off x="3456000" y="18720"/>
-            <a:ext cx="700920" cy="700920"/>
+            <a:ext cx="700200" cy="700200"/>
           </a:xfrm>
           <a:custGeom>
             <a:avLst/>
@@ -3688,7 +2163,7 @@
         <p:spPr>
           <a:xfrm>
             <a:off x="3096000" y="558720"/>
-            <a:ext cx="700920" cy="700920"/>
+            <a:ext cx="700200" cy="700200"/>
           </a:xfrm>
           <a:custGeom>
             <a:avLst/>
@@ -3748,7 +2223,7 @@
         <p:spPr>
           <a:xfrm>
             <a:off x="4140000" y="18720"/>
-            <a:ext cx="700920" cy="700920"/>
+            <a:ext cx="700200" cy="700200"/>
           </a:xfrm>
           <a:custGeom>
             <a:avLst/>
@@ -3808,7 +2283,7 @@
         <p:spPr>
           <a:xfrm>
             <a:off x="4500000" y="558720"/>
-            <a:ext cx="700920" cy="700920"/>
+            <a:ext cx="700200" cy="700200"/>
           </a:xfrm>
           <a:custGeom>
             <a:avLst/>
@@ -3868,7 +2343,7 @@
         <p:spPr>
           <a:xfrm>
             <a:off x="3798000" y="558720"/>
-            <a:ext cx="700920" cy="700920"/>
+            <a:ext cx="700200" cy="700200"/>
           </a:xfrm>
           <a:custGeom>
             <a:avLst/>
@@ -3928,7 +2403,7 @@
         <p:spPr>
           <a:xfrm>
             <a:off x="5526000" y="18720"/>
-            <a:ext cx="700920" cy="700920"/>
+            <a:ext cx="700200" cy="700200"/>
           </a:xfrm>
           <a:custGeom>
             <a:avLst/>
@@ -3988,7 +2463,7 @@
         <p:spPr>
           <a:xfrm>
             <a:off x="4842000" y="18720"/>
-            <a:ext cx="700920" cy="700920"/>
+            <a:ext cx="700200" cy="700200"/>
           </a:xfrm>
           <a:custGeom>
             <a:avLst/>
@@ -4048,7 +2523,7 @@
         <p:spPr>
           <a:xfrm>
             <a:off x="5202000" y="558720"/>
-            <a:ext cx="700920" cy="700920"/>
+            <a:ext cx="700200" cy="700200"/>
           </a:xfrm>
           <a:custGeom>
             <a:avLst/>
@@ -4108,7 +2583,7 @@
         <p:spPr>
           <a:xfrm>
             <a:off x="6606000" y="558720"/>
-            <a:ext cx="700920" cy="700920"/>
+            <a:ext cx="700200" cy="700200"/>
           </a:xfrm>
           <a:custGeom>
             <a:avLst/>
@@ -4168,7 +2643,7 @@
         <p:spPr>
           <a:xfrm>
             <a:off x="5904000" y="558720"/>
-            <a:ext cx="700920" cy="700920"/>
+            <a:ext cx="700200" cy="700200"/>
           </a:xfrm>
           <a:custGeom>
             <a:avLst/>
@@ -4228,7 +2703,7 @@
         <p:spPr>
           <a:xfrm>
             <a:off x="6930000" y="18720"/>
-            <a:ext cx="700920" cy="700920"/>
+            <a:ext cx="700200" cy="700200"/>
           </a:xfrm>
           <a:custGeom>
             <a:avLst/>
@@ -4288,7 +2763,7 @@
         <p:spPr>
           <a:xfrm>
             <a:off x="6228000" y="18720"/>
-            <a:ext cx="700920" cy="700920"/>
+            <a:ext cx="700200" cy="700200"/>
           </a:xfrm>
           <a:custGeom>
             <a:avLst/>
@@ -4348,7 +2823,7 @@
         <p:spPr>
           <a:xfrm>
             <a:off x="7632000" y="18720"/>
-            <a:ext cx="700920" cy="700920"/>
+            <a:ext cx="700200" cy="700200"/>
           </a:xfrm>
           <a:custGeom>
             <a:avLst/>
@@ -4408,7 +2883,7 @@
         <p:spPr>
           <a:xfrm>
             <a:off x="7308000" y="558720"/>
-            <a:ext cx="700920" cy="700920"/>
+            <a:ext cx="700200" cy="700200"/>
           </a:xfrm>
           <a:custGeom>
             <a:avLst/>
@@ -4468,7 +2943,7 @@
         <p:spPr>
           <a:xfrm>
             <a:off x="8334000" y="19080"/>
-            <a:ext cx="700920" cy="700920"/>
+            <a:ext cx="700200" cy="700200"/>
           </a:xfrm>
           <a:custGeom>
             <a:avLst/>
@@ -4528,7 +3003,7 @@
         <p:spPr>
           <a:xfrm>
             <a:off x="8010000" y="559080"/>
-            <a:ext cx="700920" cy="700920"/>
+            <a:ext cx="700200" cy="700200"/>
           </a:xfrm>
           <a:custGeom>
             <a:avLst/>
@@ -4588,7 +3063,7 @@
         <p:spPr>
           <a:xfrm>
             <a:off x="9414000" y="559080"/>
-            <a:ext cx="700920" cy="700920"/>
+            <a:ext cx="700200" cy="700200"/>
           </a:xfrm>
           <a:custGeom>
             <a:avLst/>
@@ -4648,7 +3123,7 @@
         <p:spPr>
           <a:xfrm>
             <a:off x="8712000" y="559080"/>
-            <a:ext cx="700920" cy="700920"/>
+            <a:ext cx="700200" cy="700200"/>
           </a:xfrm>
           <a:custGeom>
             <a:avLst/>
@@ -4708,7 +3183,7 @@
         <p:spPr>
           <a:xfrm>
             <a:off x="9738000" y="19080"/>
-            <a:ext cx="700920" cy="700920"/>
+            <a:ext cx="700200" cy="700200"/>
           </a:xfrm>
           <a:custGeom>
             <a:avLst/>
@@ -4768,7 +3243,7 @@
         <p:spPr>
           <a:xfrm>
             <a:off x="9036000" y="19080"/>
-            <a:ext cx="700920" cy="700920"/>
+            <a:ext cx="700200" cy="700200"/>
           </a:xfrm>
           <a:custGeom>
             <a:avLst/>
@@ -4828,7 +3303,7 @@
         <p:spPr>
           <a:xfrm>
             <a:off x="288000" y="558720"/>
-            <a:ext cx="700920" cy="700920"/>
+            <a:ext cx="700200" cy="700200"/>
           </a:xfrm>
           <a:custGeom>
             <a:avLst/>
@@ -4887,10 +3362,10 @@
         </p:nvGrpSpPr>
         <p:grpSpPr>
           <a:xfrm>
-            <a:off x="-361080" y="4895640"/>
-            <a:ext cx="10852920" cy="1259280"/>
-            <a:chOff x="-361080" y="4895640"/>
-            <a:chExt cx="10852920" cy="1259280"/>
+            <a:off x="-361800" y="4895640"/>
+            <a:ext cx="10852200" cy="1258560"/>
+            <a:chOff x="-361800" y="4895640"/>
+            <a:chExt cx="10852200" cy="1258560"/>
           </a:xfrm>
         </p:grpSpPr>
         <p:sp>
@@ -4901,8 +3376,8 @@
           </p:nvSpPr>
           <p:spPr>
             <a:xfrm flipH="1">
-              <a:off x="9430560" y="4913640"/>
-              <a:ext cx="700920" cy="700920"/>
+              <a:off x="9429840" y="4913640"/>
+              <a:ext cx="700200" cy="700200"/>
             </a:xfrm>
             <a:custGeom>
               <a:avLst/>
@@ -4961,8 +3436,8 @@
           </p:nvSpPr>
           <p:spPr>
             <a:xfrm flipH="1">
-              <a:off x="9790560" y="5453640"/>
-              <a:ext cx="700920" cy="700920"/>
+              <a:off x="9789840" y="5453640"/>
+              <a:ext cx="700200" cy="700200"/>
             </a:xfrm>
             <a:custGeom>
               <a:avLst/>
@@ -5021,8 +3496,8 @@
           </p:nvSpPr>
           <p:spPr>
             <a:xfrm flipH="1">
-              <a:off x="8026560" y="4913640"/>
-              <a:ext cx="700920" cy="700920"/>
+              <a:off x="8025840" y="4913640"/>
+              <a:ext cx="700200" cy="700200"/>
             </a:xfrm>
             <a:custGeom>
               <a:avLst/>
@@ -5081,8 +3556,8 @@
           </p:nvSpPr>
           <p:spPr>
             <a:xfrm flipH="1">
-              <a:off x="8728560" y="4913640"/>
-              <a:ext cx="700920" cy="700920"/>
+              <a:off x="8727840" y="4913640"/>
+              <a:ext cx="700200" cy="700200"/>
             </a:xfrm>
             <a:custGeom>
               <a:avLst/>
@@ -5141,8 +3616,8 @@
           </p:nvSpPr>
           <p:spPr>
             <a:xfrm flipH="1">
-              <a:off x="8386560" y="5453640"/>
-              <a:ext cx="700920" cy="700920"/>
+              <a:off x="8385840" y="5453640"/>
+              <a:ext cx="700200" cy="700200"/>
             </a:xfrm>
             <a:custGeom>
               <a:avLst/>
@@ -5201,8 +3676,8 @@
           </p:nvSpPr>
           <p:spPr>
             <a:xfrm flipH="1">
-              <a:off x="6982560" y="5453640"/>
-              <a:ext cx="700920" cy="700920"/>
+              <a:off x="6981840" y="5453640"/>
+              <a:ext cx="700200" cy="700200"/>
             </a:xfrm>
             <a:custGeom>
               <a:avLst/>
@@ -5261,8 +3736,8 @@
           </p:nvSpPr>
           <p:spPr>
             <a:xfrm flipH="1">
-              <a:off x="7684560" y="5453640"/>
-              <a:ext cx="700920" cy="700920"/>
+              <a:off x="7683840" y="5453640"/>
+              <a:ext cx="700200" cy="700200"/>
             </a:xfrm>
             <a:custGeom>
               <a:avLst/>
@@ -5321,8 +3796,8 @@
           </p:nvSpPr>
           <p:spPr>
             <a:xfrm flipH="1">
-              <a:off x="6622560" y="4913640"/>
-              <a:ext cx="700920" cy="700920"/>
+              <a:off x="6621840" y="4913640"/>
+              <a:ext cx="700200" cy="700200"/>
             </a:xfrm>
             <a:custGeom>
               <a:avLst/>
@@ -5381,8 +3856,8 @@
           </p:nvSpPr>
           <p:spPr>
             <a:xfrm flipH="1">
-              <a:off x="7324560" y="4895640"/>
-              <a:ext cx="700920" cy="700920"/>
+              <a:off x="7323840" y="4895640"/>
+              <a:ext cx="700200" cy="700200"/>
             </a:xfrm>
             <a:custGeom>
               <a:avLst/>
@@ -5441,8 +3916,8 @@
           </p:nvSpPr>
           <p:spPr>
             <a:xfrm flipH="1">
-              <a:off x="5920560" y="4913640"/>
-              <a:ext cx="700920" cy="700920"/>
+              <a:off x="5919840" y="4913640"/>
+              <a:ext cx="700200" cy="700200"/>
             </a:xfrm>
             <a:custGeom>
               <a:avLst/>
@@ -5501,8 +3976,8 @@
           </p:nvSpPr>
           <p:spPr>
             <a:xfrm flipH="1">
-              <a:off x="6280560" y="5453640"/>
-              <a:ext cx="700920" cy="700920"/>
+              <a:off x="6279840" y="5453640"/>
+              <a:ext cx="700200" cy="700200"/>
             </a:xfrm>
             <a:custGeom>
               <a:avLst/>
@@ -5561,8 +4036,8 @@
           </p:nvSpPr>
           <p:spPr>
             <a:xfrm flipH="1">
-              <a:off x="5236560" y="4913640"/>
-              <a:ext cx="700920" cy="700920"/>
+              <a:off x="5235840" y="4913640"/>
+              <a:ext cx="700200" cy="700200"/>
             </a:xfrm>
             <a:custGeom>
               <a:avLst/>
@@ -5621,8 +4096,8 @@
           </p:nvSpPr>
           <p:spPr>
             <a:xfrm flipH="1">
-              <a:off x="4876560" y="5453640"/>
-              <a:ext cx="700920" cy="700920"/>
+              <a:off x="4875840" y="5453640"/>
+              <a:ext cx="700200" cy="700200"/>
             </a:xfrm>
             <a:custGeom>
               <a:avLst/>
@@ -5681,8 +4156,8 @@
           </p:nvSpPr>
           <p:spPr>
             <a:xfrm flipH="1">
-              <a:off x="5578560" y="5453640"/>
-              <a:ext cx="700920" cy="700920"/>
+              <a:off x="5577840" y="5453640"/>
+              <a:ext cx="700200" cy="700200"/>
             </a:xfrm>
             <a:custGeom>
               <a:avLst/>
@@ -5741,8 +4216,8 @@
           </p:nvSpPr>
           <p:spPr>
             <a:xfrm flipH="1">
-              <a:off x="3850560" y="4913640"/>
-              <a:ext cx="700920" cy="700920"/>
+              <a:off x="3849840" y="4913640"/>
+              <a:ext cx="700200" cy="700200"/>
             </a:xfrm>
             <a:custGeom>
               <a:avLst/>
@@ -5801,8 +4276,8 @@
           </p:nvSpPr>
           <p:spPr>
             <a:xfrm flipH="1">
-              <a:off x="4534560" y="4913640"/>
-              <a:ext cx="700920" cy="700920"/>
+              <a:off x="4533840" y="4913640"/>
+              <a:ext cx="700200" cy="700200"/>
             </a:xfrm>
             <a:custGeom>
               <a:avLst/>
@@ -5861,8 +4336,8 @@
           </p:nvSpPr>
           <p:spPr>
             <a:xfrm flipH="1">
-              <a:off x="4174560" y="5453640"/>
-              <a:ext cx="700920" cy="700920"/>
+              <a:off x="4173840" y="5453640"/>
+              <a:ext cx="700200" cy="700200"/>
             </a:xfrm>
             <a:custGeom>
               <a:avLst/>
@@ -5921,8 +4396,8 @@
           </p:nvSpPr>
           <p:spPr>
             <a:xfrm flipH="1">
-              <a:off x="2770560" y="5453640"/>
-              <a:ext cx="700920" cy="700920"/>
+              <a:off x="2769840" y="5453640"/>
+              <a:ext cx="700200" cy="700200"/>
             </a:xfrm>
             <a:custGeom>
               <a:avLst/>
@@ -5981,8 +4456,8 @@
           </p:nvSpPr>
           <p:spPr>
             <a:xfrm flipH="1">
-              <a:off x="3472560" y="5453640"/>
-              <a:ext cx="700920" cy="700920"/>
+              <a:off x="3471840" y="5453640"/>
+              <a:ext cx="700200" cy="700200"/>
             </a:xfrm>
             <a:custGeom>
               <a:avLst/>
@@ -6041,8 +4516,8 @@
           </p:nvSpPr>
           <p:spPr>
             <a:xfrm flipH="1">
-              <a:off x="2446560" y="4913640"/>
-              <a:ext cx="700920" cy="700920"/>
+              <a:off x="2445840" y="4913640"/>
+              <a:ext cx="700200" cy="700200"/>
             </a:xfrm>
             <a:custGeom>
               <a:avLst/>
@@ -6101,8 +4576,8 @@
           </p:nvSpPr>
           <p:spPr>
             <a:xfrm flipH="1">
-              <a:off x="3148560" y="4913640"/>
-              <a:ext cx="700920" cy="700920"/>
+              <a:off x="3147840" y="4913640"/>
+              <a:ext cx="700200" cy="700200"/>
             </a:xfrm>
             <a:custGeom>
               <a:avLst/>
@@ -6161,8 +4636,8 @@
           </p:nvSpPr>
           <p:spPr>
             <a:xfrm flipH="1">
-              <a:off x="1744560" y="4913640"/>
-              <a:ext cx="700920" cy="700920"/>
+              <a:off x="1743840" y="4913640"/>
+              <a:ext cx="700200" cy="700200"/>
             </a:xfrm>
             <a:custGeom>
               <a:avLst/>
@@ -6221,8 +4696,8 @@
           </p:nvSpPr>
           <p:spPr>
             <a:xfrm flipH="1">
-              <a:off x="2068560" y="5453640"/>
-              <a:ext cx="700920" cy="700920"/>
+              <a:off x="2067840" y="5453640"/>
+              <a:ext cx="700200" cy="700200"/>
             </a:xfrm>
             <a:custGeom>
               <a:avLst/>
@@ -6281,8 +4756,8 @@
           </p:nvSpPr>
           <p:spPr>
             <a:xfrm flipH="1">
-              <a:off x="1042560" y="4914000"/>
-              <a:ext cx="700920" cy="700920"/>
+              <a:off x="1041840" y="4914000"/>
+              <a:ext cx="700200" cy="700200"/>
             </a:xfrm>
             <a:custGeom>
               <a:avLst/>
@@ -6341,8 +4816,8 @@
           </p:nvSpPr>
           <p:spPr>
             <a:xfrm flipH="1">
-              <a:off x="1366560" y="5454000"/>
-              <a:ext cx="700920" cy="700920"/>
+              <a:off x="1365840" y="5454000"/>
+              <a:ext cx="700200" cy="700200"/>
             </a:xfrm>
             <a:custGeom>
               <a:avLst/>
@@ -6401,8 +4876,8 @@
           </p:nvSpPr>
           <p:spPr>
             <a:xfrm flipH="1">
-              <a:off x="-37440" y="5454000"/>
-              <a:ext cx="700920" cy="700920"/>
+              <a:off x="-38160" y="5454000"/>
+              <a:ext cx="700200" cy="700200"/>
             </a:xfrm>
             <a:custGeom>
               <a:avLst/>
@@ -6461,8 +4936,8 @@
           </p:nvSpPr>
           <p:spPr>
             <a:xfrm flipH="1">
-              <a:off x="664560" y="5454000"/>
-              <a:ext cx="700920" cy="700920"/>
+              <a:off x="663840" y="5454000"/>
+              <a:ext cx="700200" cy="700200"/>
             </a:xfrm>
             <a:custGeom>
               <a:avLst/>
@@ -6521,8 +4996,8 @@
           </p:nvSpPr>
           <p:spPr>
             <a:xfrm flipH="1">
-              <a:off x="-361440" y="4914000"/>
-              <a:ext cx="700920" cy="700920"/>
+              <a:off x="-362160" y="4914000"/>
+              <a:ext cx="700200" cy="700200"/>
             </a:xfrm>
             <a:custGeom>
               <a:avLst/>
@@ -6581,8 +5056,8 @@
           </p:nvSpPr>
           <p:spPr>
             <a:xfrm flipH="1">
-              <a:off x="340560" y="4914000"/>
-              <a:ext cx="700920" cy="700920"/>
+              <a:off x="339840" y="4914000"/>
+              <a:ext cx="700200" cy="700200"/>
             </a:xfrm>
             <a:custGeom>
               <a:avLst/>
@@ -6641,8 +5116,8 @@
           </p:nvSpPr>
           <p:spPr>
             <a:xfrm flipH="1">
-              <a:off x="9088560" y="5453640"/>
-              <a:ext cx="700920" cy="700920"/>
+              <a:off x="9087840" y="5453640"/>
+              <a:ext cx="700200" cy="700200"/>
             </a:xfrm>
             <a:custGeom>
               <a:avLst/>
@@ -6703,7 +5178,7 @@
         <p:spPr>
           <a:xfrm>
             <a:off x="-414000" y="-520920"/>
-            <a:ext cx="700920" cy="700920"/>
+            <a:ext cx="700200" cy="700200"/>
           </a:xfrm>
           <a:custGeom>
             <a:avLst/>
@@ -6763,7 +5238,7 @@
         <p:spPr>
           <a:xfrm>
             <a:off x="990000" y="-520920"/>
-            <a:ext cx="700920" cy="700920"/>
+            <a:ext cx="700200" cy="700200"/>
           </a:xfrm>
           <a:custGeom>
             <a:avLst/>
@@ -6823,7 +5298,7 @@
         <p:spPr>
           <a:xfrm>
             <a:off x="2394000" y="-520920"/>
-            <a:ext cx="700920" cy="700920"/>
+            <a:ext cx="700200" cy="700200"/>
           </a:xfrm>
           <a:custGeom>
             <a:avLst/>
@@ -6883,7 +5358,7 @@
         <p:spPr>
           <a:xfrm>
             <a:off x="1692000" y="-520920"/>
-            <a:ext cx="700920" cy="700920"/>
+            <a:ext cx="700200" cy="700200"/>
           </a:xfrm>
           <a:custGeom>
             <a:avLst/>
@@ -6943,7 +5418,7 @@
         <p:spPr>
           <a:xfrm>
             <a:off x="3096000" y="-520920"/>
-            <a:ext cx="700920" cy="700920"/>
+            <a:ext cx="700200" cy="700200"/>
           </a:xfrm>
           <a:custGeom>
             <a:avLst/>
@@ -7003,7 +5478,7 @@
         <p:spPr>
           <a:xfrm>
             <a:off x="4500000" y="-520920"/>
-            <a:ext cx="700920" cy="700920"/>
+            <a:ext cx="700200" cy="700200"/>
           </a:xfrm>
           <a:custGeom>
             <a:avLst/>
@@ -7063,7 +5538,7 @@
         <p:spPr>
           <a:xfrm>
             <a:off x="3798000" y="-520920"/>
-            <a:ext cx="700920" cy="700920"/>
+            <a:ext cx="700200" cy="700200"/>
           </a:xfrm>
           <a:custGeom>
             <a:avLst/>
@@ -7123,7 +5598,7 @@
         <p:spPr>
           <a:xfrm>
             <a:off x="5202000" y="-520920"/>
-            <a:ext cx="700920" cy="700920"/>
+            <a:ext cx="700200" cy="700200"/>
           </a:xfrm>
           <a:custGeom>
             <a:avLst/>
@@ -7183,7 +5658,7 @@
         <p:spPr>
           <a:xfrm>
             <a:off x="6606000" y="-520920"/>
-            <a:ext cx="700920" cy="700920"/>
+            <a:ext cx="700200" cy="700200"/>
           </a:xfrm>
           <a:custGeom>
             <a:avLst/>
@@ -7243,7 +5718,7 @@
         <p:spPr>
           <a:xfrm>
             <a:off x="5904000" y="-520920"/>
-            <a:ext cx="700920" cy="700920"/>
+            <a:ext cx="700200" cy="700200"/>
           </a:xfrm>
           <a:custGeom>
             <a:avLst/>
@@ -7303,7 +5778,7 @@
         <p:spPr>
           <a:xfrm>
             <a:off x="7308000" y="-520920"/>
-            <a:ext cx="700920" cy="700920"/>
+            <a:ext cx="700200" cy="700200"/>
           </a:xfrm>
           <a:custGeom>
             <a:avLst/>
@@ -7363,7 +5838,7 @@
         <p:spPr>
           <a:xfrm>
             <a:off x="8010000" y="-520560"/>
-            <a:ext cx="700920" cy="700920"/>
+            <a:ext cx="700200" cy="700200"/>
           </a:xfrm>
           <a:custGeom>
             <a:avLst/>
@@ -7423,7 +5898,7 @@
         <p:spPr>
           <a:xfrm>
             <a:off x="9414000" y="-520560"/>
-            <a:ext cx="700920" cy="700920"/>
+            <a:ext cx="700200" cy="700200"/>
           </a:xfrm>
           <a:custGeom>
             <a:avLst/>
@@ -7483,7 +5958,7 @@
         <p:spPr>
           <a:xfrm>
             <a:off x="8712000" y="-520560"/>
-            <a:ext cx="700920" cy="700920"/>
+            <a:ext cx="700200" cy="700200"/>
           </a:xfrm>
           <a:custGeom>
             <a:avLst/>
@@ -7543,7 +6018,7 @@
         <p:spPr>
           <a:xfrm>
             <a:off x="288000" y="-520920"/>
-            <a:ext cx="700920" cy="700920"/>
+            <a:ext cx="700200" cy="700200"/>
           </a:xfrm>
           <a:custGeom>
             <a:avLst/>
@@ -7840,2014 +6315,6 @@
 </p:sldMaster>
 </file>
 
-<file path=ppt/slideMasters/slideMaster2.xml><?xml version="1.0" encoding="utf-8"?>
-<p:sldMaster xmlns:a="http://schemas.openxmlformats.org/drawingml/2006/main" xmlns:p="http://schemas.openxmlformats.org/presentationml/2006/main" xmlns:r="http://schemas.openxmlformats.org/officeDocument/2006/relationships" xmlns:p14="http://schemas.microsoft.com/office/powerpoint/2010/main" xmlns:p15="http://schemas.microsoft.com/office/powerpoint/2012/main" xmlns:mc="http://schemas.openxmlformats.org/markup-compatibility/2006">
-  <p:cSld>
-    <p:spTree>
-      <p:nvGrpSpPr>
-        <p:cNvPr id="1" name=""/>
-        <p:cNvGrpSpPr/>
-        <p:nvPr/>
-      </p:nvGrpSpPr>
-      <p:grpSpPr>
-        <a:xfrm>
-          <a:off x="0" y="0"/>
-          <a:ext cx="0" cy="0"/>
-          <a:chOff x="0" y="0"/>
-          <a:chExt cx="0" cy="0"/>
-        </a:xfrm>
-      </p:grpSpPr>
-      <p:grpSp>
-        <p:nvGrpSpPr>
-          <p:cNvPr id="114" name=""/>
-          <p:cNvGrpSpPr/>
-          <p:nvPr/>
-        </p:nvGrpSpPr>
-        <p:grpSpPr>
-          <a:xfrm>
-            <a:off x="-361080" y="4896000"/>
-            <a:ext cx="10852920" cy="1259280"/>
-            <a:chOff x="-361080" y="4896000"/>
-            <a:chExt cx="10852920" cy="1259280"/>
-          </a:xfrm>
-        </p:grpSpPr>
-        <p:sp>
-          <p:nvSpPr>
-            <p:cNvPr id="115" name=""/>
-            <p:cNvSpPr/>
-            <p:nvPr/>
-          </p:nvSpPr>
-          <p:spPr>
-            <a:xfrm flipH="1">
-              <a:off x="9430560" y="4914000"/>
-              <a:ext cx="700920" cy="700920"/>
-            </a:xfrm>
-            <a:custGeom>
-              <a:avLst/>
-              <a:gdLst/>
-              <a:ahLst/>
-              <a:rect l="l" t="t" r="r" b="b"/>
-              <a:pathLst>
-                <a:path w="1506471" h="1310630">
-                  <a:moveTo>
-                    <a:pt x="753236" y="0"/>
-                  </a:moveTo>
-                  <a:lnTo>
-                    <a:pt x="1506470" y="285063"/>
-                  </a:lnTo>
-                  <a:lnTo>
-                    <a:pt x="1506470" y="1025568"/>
-                  </a:lnTo>
-                  <a:lnTo>
-                    <a:pt x="753236" y="1310630"/>
-                  </a:lnTo>
-                  <a:lnTo>
-                    <a:pt x="1" y="1025568"/>
-                  </a:lnTo>
-                  <a:lnTo>
-                    <a:pt x="1" y="285063"/>
-                  </a:lnTo>
-                  <a:lnTo>
-                    <a:pt x="753236" y="0"/>
-                  </a:lnTo>
-                  <a:close/>
-                </a:path>
-              </a:pathLst>
-            </a:custGeom>
-            <a:solidFill>
-              <a:srgbClr val="fff5ce"/>
-            </a:solidFill>
-            <a:ln cap="rnd" w="36000">
-              <a:solidFill>
-                <a:srgbClr val="ffde59"/>
-              </a:solidFill>
-              <a:round/>
-            </a:ln>
-          </p:spPr>
-          <p:style>
-            <a:lnRef idx="0"/>
-            <a:fillRef idx="0"/>
-            <a:effectRef idx="0"/>
-            <a:fontRef idx="minor"/>
-          </p:style>
-        </p:sp>
-        <p:sp>
-          <p:nvSpPr>
-            <p:cNvPr id="116" name=""/>
-            <p:cNvSpPr/>
-            <p:nvPr/>
-          </p:nvSpPr>
-          <p:spPr>
-            <a:xfrm flipH="1">
-              <a:off x="9790560" y="5454000"/>
-              <a:ext cx="700920" cy="700920"/>
-            </a:xfrm>
-            <a:custGeom>
-              <a:avLst/>
-              <a:gdLst/>
-              <a:ahLst/>
-              <a:rect l="l" t="t" r="r" b="b"/>
-              <a:pathLst>
-                <a:path w="1506471" h="1310630">
-                  <a:moveTo>
-                    <a:pt x="753236" y="0"/>
-                  </a:moveTo>
-                  <a:lnTo>
-                    <a:pt x="1506470" y="285063"/>
-                  </a:lnTo>
-                  <a:lnTo>
-                    <a:pt x="1506470" y="1025568"/>
-                  </a:lnTo>
-                  <a:lnTo>
-                    <a:pt x="753236" y="1310630"/>
-                  </a:lnTo>
-                  <a:lnTo>
-                    <a:pt x="1" y="1025568"/>
-                  </a:lnTo>
-                  <a:lnTo>
-                    <a:pt x="1" y="285063"/>
-                  </a:lnTo>
-                  <a:lnTo>
-                    <a:pt x="753236" y="0"/>
-                  </a:lnTo>
-                  <a:close/>
-                </a:path>
-              </a:pathLst>
-            </a:custGeom>
-            <a:solidFill>
-              <a:srgbClr val="fff5ce"/>
-            </a:solidFill>
-            <a:ln cap="rnd" w="36000">
-              <a:solidFill>
-                <a:srgbClr val="ffde59"/>
-              </a:solidFill>
-              <a:round/>
-            </a:ln>
-          </p:spPr>
-          <p:style>
-            <a:lnRef idx="0"/>
-            <a:fillRef idx="0"/>
-            <a:effectRef idx="0"/>
-            <a:fontRef idx="minor"/>
-          </p:style>
-        </p:sp>
-        <p:sp>
-          <p:nvSpPr>
-            <p:cNvPr id="117" name=""/>
-            <p:cNvSpPr/>
-            <p:nvPr/>
-          </p:nvSpPr>
-          <p:spPr>
-            <a:xfrm flipH="1">
-              <a:off x="8026560" y="4914000"/>
-              <a:ext cx="700920" cy="700920"/>
-            </a:xfrm>
-            <a:custGeom>
-              <a:avLst/>
-              <a:gdLst/>
-              <a:ahLst/>
-              <a:rect l="l" t="t" r="r" b="b"/>
-              <a:pathLst>
-                <a:path w="1506471" h="1310630">
-                  <a:moveTo>
-                    <a:pt x="753236" y="0"/>
-                  </a:moveTo>
-                  <a:lnTo>
-                    <a:pt x="1506470" y="285063"/>
-                  </a:lnTo>
-                  <a:lnTo>
-                    <a:pt x="1506470" y="1025568"/>
-                  </a:lnTo>
-                  <a:lnTo>
-                    <a:pt x="753236" y="1310630"/>
-                  </a:lnTo>
-                  <a:lnTo>
-                    <a:pt x="1" y="1025568"/>
-                  </a:lnTo>
-                  <a:lnTo>
-                    <a:pt x="1" y="285063"/>
-                  </a:lnTo>
-                  <a:lnTo>
-                    <a:pt x="753236" y="0"/>
-                  </a:lnTo>
-                  <a:close/>
-                </a:path>
-              </a:pathLst>
-            </a:custGeom>
-            <a:solidFill>
-              <a:srgbClr val="fff5ce"/>
-            </a:solidFill>
-            <a:ln cap="rnd" w="36000">
-              <a:solidFill>
-                <a:srgbClr val="ffde59"/>
-              </a:solidFill>
-              <a:round/>
-            </a:ln>
-          </p:spPr>
-          <p:style>
-            <a:lnRef idx="0"/>
-            <a:fillRef idx="0"/>
-            <a:effectRef idx="0"/>
-            <a:fontRef idx="minor"/>
-          </p:style>
-        </p:sp>
-        <p:sp>
-          <p:nvSpPr>
-            <p:cNvPr id="118" name=""/>
-            <p:cNvSpPr/>
-            <p:nvPr/>
-          </p:nvSpPr>
-          <p:spPr>
-            <a:xfrm flipH="1">
-              <a:off x="8728560" y="4914000"/>
-              <a:ext cx="700920" cy="700920"/>
-            </a:xfrm>
-            <a:custGeom>
-              <a:avLst/>
-              <a:gdLst/>
-              <a:ahLst/>
-              <a:rect l="l" t="t" r="r" b="b"/>
-              <a:pathLst>
-                <a:path w="1506471" h="1310630">
-                  <a:moveTo>
-                    <a:pt x="753236" y="0"/>
-                  </a:moveTo>
-                  <a:lnTo>
-                    <a:pt x="1506470" y="285063"/>
-                  </a:lnTo>
-                  <a:lnTo>
-                    <a:pt x="1506470" y="1025568"/>
-                  </a:lnTo>
-                  <a:lnTo>
-                    <a:pt x="753236" y="1310630"/>
-                  </a:lnTo>
-                  <a:lnTo>
-                    <a:pt x="1" y="1025568"/>
-                  </a:lnTo>
-                  <a:lnTo>
-                    <a:pt x="1" y="285063"/>
-                  </a:lnTo>
-                  <a:lnTo>
-                    <a:pt x="753236" y="0"/>
-                  </a:lnTo>
-                  <a:close/>
-                </a:path>
-              </a:pathLst>
-            </a:custGeom>
-            <a:solidFill>
-              <a:srgbClr val="ffde59"/>
-            </a:solidFill>
-            <a:ln cap="rnd" w="36000">
-              <a:solidFill>
-                <a:srgbClr val="ffde59"/>
-              </a:solidFill>
-              <a:round/>
-            </a:ln>
-          </p:spPr>
-          <p:style>
-            <a:lnRef idx="0"/>
-            <a:fillRef idx="0"/>
-            <a:effectRef idx="0"/>
-            <a:fontRef idx="minor"/>
-          </p:style>
-        </p:sp>
-        <p:sp>
-          <p:nvSpPr>
-            <p:cNvPr id="119" name=""/>
-            <p:cNvSpPr/>
-            <p:nvPr/>
-          </p:nvSpPr>
-          <p:spPr>
-            <a:xfrm flipH="1">
-              <a:off x="8386560" y="5454000"/>
-              <a:ext cx="700920" cy="700920"/>
-            </a:xfrm>
-            <a:custGeom>
-              <a:avLst/>
-              <a:gdLst/>
-              <a:ahLst/>
-              <a:rect l="l" t="t" r="r" b="b"/>
-              <a:pathLst>
-                <a:path w="1506471" h="1310630">
-                  <a:moveTo>
-                    <a:pt x="753236" y="0"/>
-                  </a:moveTo>
-                  <a:lnTo>
-                    <a:pt x="1506470" y="285063"/>
-                  </a:lnTo>
-                  <a:lnTo>
-                    <a:pt x="1506470" y="1025568"/>
-                  </a:lnTo>
-                  <a:lnTo>
-                    <a:pt x="753236" y="1310630"/>
-                  </a:lnTo>
-                  <a:lnTo>
-                    <a:pt x="1" y="1025568"/>
-                  </a:lnTo>
-                  <a:lnTo>
-                    <a:pt x="1" y="285063"/>
-                  </a:lnTo>
-                  <a:lnTo>
-                    <a:pt x="753236" y="0"/>
-                  </a:lnTo>
-                  <a:close/>
-                </a:path>
-              </a:pathLst>
-            </a:custGeom>
-            <a:solidFill>
-              <a:srgbClr val="fff5ce"/>
-            </a:solidFill>
-            <a:ln cap="rnd" w="36000">
-              <a:solidFill>
-                <a:srgbClr val="ffde59"/>
-              </a:solidFill>
-              <a:round/>
-            </a:ln>
-          </p:spPr>
-          <p:style>
-            <a:lnRef idx="0"/>
-            <a:fillRef idx="0"/>
-            <a:effectRef idx="0"/>
-            <a:fontRef idx="minor"/>
-          </p:style>
-        </p:sp>
-        <p:sp>
-          <p:nvSpPr>
-            <p:cNvPr id="120" name=""/>
-            <p:cNvSpPr/>
-            <p:nvPr/>
-          </p:nvSpPr>
-          <p:spPr>
-            <a:xfrm flipH="1">
-              <a:off x="6982560" y="5454000"/>
-              <a:ext cx="700920" cy="700920"/>
-            </a:xfrm>
-            <a:custGeom>
-              <a:avLst/>
-              <a:gdLst/>
-              <a:ahLst/>
-              <a:rect l="l" t="t" r="r" b="b"/>
-              <a:pathLst>
-                <a:path w="1506471" h="1310630">
-                  <a:moveTo>
-                    <a:pt x="753236" y="0"/>
-                  </a:moveTo>
-                  <a:lnTo>
-                    <a:pt x="1506470" y="285063"/>
-                  </a:lnTo>
-                  <a:lnTo>
-                    <a:pt x="1506470" y="1025568"/>
-                  </a:lnTo>
-                  <a:lnTo>
-                    <a:pt x="753236" y="1310630"/>
-                  </a:lnTo>
-                  <a:lnTo>
-                    <a:pt x="1" y="1025568"/>
-                  </a:lnTo>
-                  <a:lnTo>
-                    <a:pt x="1" y="285063"/>
-                  </a:lnTo>
-                  <a:lnTo>
-                    <a:pt x="753236" y="0"/>
-                  </a:lnTo>
-                  <a:close/>
-                </a:path>
-              </a:pathLst>
-            </a:custGeom>
-            <a:solidFill>
-              <a:srgbClr val="fff5ce"/>
-            </a:solidFill>
-            <a:ln cap="rnd" w="36000">
-              <a:solidFill>
-                <a:srgbClr val="ffde59"/>
-              </a:solidFill>
-              <a:round/>
-            </a:ln>
-          </p:spPr>
-          <p:style>
-            <a:lnRef idx="0"/>
-            <a:fillRef idx="0"/>
-            <a:effectRef idx="0"/>
-            <a:fontRef idx="minor"/>
-          </p:style>
-        </p:sp>
-        <p:sp>
-          <p:nvSpPr>
-            <p:cNvPr id="121" name=""/>
-            <p:cNvSpPr/>
-            <p:nvPr/>
-          </p:nvSpPr>
-          <p:spPr>
-            <a:xfrm flipH="1">
-              <a:off x="7684560" y="5454000"/>
-              <a:ext cx="700920" cy="700920"/>
-            </a:xfrm>
-            <a:custGeom>
-              <a:avLst/>
-              <a:gdLst/>
-              <a:ahLst/>
-              <a:rect l="l" t="t" r="r" b="b"/>
-              <a:pathLst>
-                <a:path w="1506471" h="1310630">
-                  <a:moveTo>
-                    <a:pt x="753236" y="0"/>
-                  </a:moveTo>
-                  <a:lnTo>
-                    <a:pt x="1506470" y="285063"/>
-                  </a:lnTo>
-                  <a:lnTo>
-                    <a:pt x="1506470" y="1025568"/>
-                  </a:lnTo>
-                  <a:lnTo>
-                    <a:pt x="753236" y="1310630"/>
-                  </a:lnTo>
-                  <a:lnTo>
-                    <a:pt x="1" y="1025568"/>
-                  </a:lnTo>
-                  <a:lnTo>
-                    <a:pt x="1" y="285063"/>
-                  </a:lnTo>
-                  <a:lnTo>
-                    <a:pt x="753236" y="0"/>
-                  </a:lnTo>
-                  <a:close/>
-                </a:path>
-              </a:pathLst>
-            </a:custGeom>
-            <a:solidFill>
-              <a:srgbClr val="fff5ce"/>
-            </a:solidFill>
-            <a:ln cap="rnd" w="36000">
-              <a:solidFill>
-                <a:srgbClr val="ffde59"/>
-              </a:solidFill>
-              <a:round/>
-            </a:ln>
-          </p:spPr>
-          <p:style>
-            <a:lnRef idx="0"/>
-            <a:fillRef idx="0"/>
-            <a:effectRef idx="0"/>
-            <a:fontRef idx="minor"/>
-          </p:style>
-        </p:sp>
-        <p:sp>
-          <p:nvSpPr>
-            <p:cNvPr id="122" name=""/>
-            <p:cNvSpPr/>
-            <p:nvPr/>
-          </p:nvSpPr>
-          <p:spPr>
-            <a:xfrm flipH="1">
-              <a:off x="6622560" y="4914000"/>
-              <a:ext cx="700920" cy="700920"/>
-            </a:xfrm>
-            <a:custGeom>
-              <a:avLst/>
-              <a:gdLst/>
-              <a:ahLst/>
-              <a:rect l="l" t="t" r="r" b="b"/>
-              <a:pathLst>
-                <a:path w="1506471" h="1310630">
-                  <a:moveTo>
-                    <a:pt x="753236" y="0"/>
-                  </a:moveTo>
-                  <a:lnTo>
-                    <a:pt x="1506470" y="285063"/>
-                  </a:lnTo>
-                  <a:lnTo>
-                    <a:pt x="1506470" y="1025568"/>
-                  </a:lnTo>
-                  <a:lnTo>
-                    <a:pt x="753236" y="1310630"/>
-                  </a:lnTo>
-                  <a:lnTo>
-                    <a:pt x="1" y="1025568"/>
-                  </a:lnTo>
-                  <a:lnTo>
-                    <a:pt x="1" y="285063"/>
-                  </a:lnTo>
-                  <a:lnTo>
-                    <a:pt x="753236" y="0"/>
-                  </a:lnTo>
-                  <a:close/>
-                </a:path>
-              </a:pathLst>
-            </a:custGeom>
-            <a:solidFill>
-              <a:srgbClr val="fff5ce"/>
-            </a:solidFill>
-            <a:ln cap="rnd" w="36000">
-              <a:solidFill>
-                <a:srgbClr val="ffde59"/>
-              </a:solidFill>
-              <a:round/>
-            </a:ln>
-          </p:spPr>
-          <p:style>
-            <a:lnRef idx="0"/>
-            <a:fillRef idx="0"/>
-            <a:effectRef idx="0"/>
-            <a:fontRef idx="minor"/>
-          </p:style>
-        </p:sp>
-        <p:sp>
-          <p:nvSpPr>
-            <p:cNvPr id="123" name=""/>
-            <p:cNvSpPr/>
-            <p:nvPr/>
-          </p:nvSpPr>
-          <p:spPr>
-            <a:xfrm flipH="1">
-              <a:off x="7324560" y="4896000"/>
-              <a:ext cx="700920" cy="700920"/>
-            </a:xfrm>
-            <a:custGeom>
-              <a:avLst/>
-              <a:gdLst/>
-              <a:ahLst/>
-              <a:rect l="l" t="t" r="r" b="b"/>
-              <a:pathLst>
-                <a:path w="1506471" h="1310630">
-                  <a:moveTo>
-                    <a:pt x="753236" y="0"/>
-                  </a:moveTo>
-                  <a:lnTo>
-                    <a:pt x="1506470" y="285063"/>
-                  </a:lnTo>
-                  <a:lnTo>
-                    <a:pt x="1506470" y="1025568"/>
-                  </a:lnTo>
-                  <a:lnTo>
-                    <a:pt x="753236" y="1310630"/>
-                  </a:lnTo>
-                  <a:lnTo>
-                    <a:pt x="1" y="1025568"/>
-                  </a:lnTo>
-                  <a:lnTo>
-                    <a:pt x="1" y="285063"/>
-                  </a:lnTo>
-                  <a:lnTo>
-                    <a:pt x="753236" y="0"/>
-                  </a:lnTo>
-                  <a:close/>
-                </a:path>
-              </a:pathLst>
-            </a:custGeom>
-            <a:solidFill>
-              <a:srgbClr val="fff5ce"/>
-            </a:solidFill>
-            <a:ln cap="rnd" w="36000">
-              <a:solidFill>
-                <a:srgbClr val="ffde59"/>
-              </a:solidFill>
-              <a:round/>
-            </a:ln>
-          </p:spPr>
-          <p:style>
-            <a:lnRef idx="0"/>
-            <a:fillRef idx="0"/>
-            <a:effectRef idx="0"/>
-            <a:fontRef idx="minor"/>
-          </p:style>
-        </p:sp>
-        <p:sp>
-          <p:nvSpPr>
-            <p:cNvPr id="124" name=""/>
-            <p:cNvSpPr/>
-            <p:nvPr/>
-          </p:nvSpPr>
-          <p:spPr>
-            <a:xfrm flipH="1">
-              <a:off x="5920560" y="4914000"/>
-              <a:ext cx="700920" cy="700920"/>
-            </a:xfrm>
-            <a:custGeom>
-              <a:avLst/>
-              <a:gdLst/>
-              <a:ahLst/>
-              <a:rect l="l" t="t" r="r" b="b"/>
-              <a:pathLst>
-                <a:path w="1506471" h="1310630">
-                  <a:moveTo>
-                    <a:pt x="753236" y="0"/>
-                  </a:moveTo>
-                  <a:lnTo>
-                    <a:pt x="1506470" y="285063"/>
-                  </a:lnTo>
-                  <a:lnTo>
-                    <a:pt x="1506470" y="1025568"/>
-                  </a:lnTo>
-                  <a:lnTo>
-                    <a:pt x="753236" y="1310630"/>
-                  </a:lnTo>
-                  <a:lnTo>
-                    <a:pt x="1" y="1025568"/>
-                  </a:lnTo>
-                  <a:lnTo>
-                    <a:pt x="1" y="285063"/>
-                  </a:lnTo>
-                  <a:lnTo>
-                    <a:pt x="753236" y="0"/>
-                  </a:lnTo>
-                  <a:close/>
-                </a:path>
-              </a:pathLst>
-            </a:custGeom>
-            <a:solidFill>
-              <a:srgbClr val="fff5ce"/>
-            </a:solidFill>
-            <a:ln cap="rnd" w="36000">
-              <a:solidFill>
-                <a:srgbClr val="ffde59"/>
-              </a:solidFill>
-              <a:round/>
-            </a:ln>
-          </p:spPr>
-          <p:style>
-            <a:lnRef idx="0"/>
-            <a:fillRef idx="0"/>
-            <a:effectRef idx="0"/>
-            <a:fontRef idx="minor"/>
-          </p:style>
-        </p:sp>
-        <p:sp>
-          <p:nvSpPr>
-            <p:cNvPr id="125" name=""/>
-            <p:cNvSpPr/>
-            <p:nvPr/>
-          </p:nvSpPr>
-          <p:spPr>
-            <a:xfrm flipH="1">
-              <a:off x="6280560" y="5454000"/>
-              <a:ext cx="700920" cy="700920"/>
-            </a:xfrm>
-            <a:custGeom>
-              <a:avLst/>
-              <a:gdLst/>
-              <a:ahLst/>
-              <a:rect l="l" t="t" r="r" b="b"/>
-              <a:pathLst>
-                <a:path w="1506471" h="1310630">
-                  <a:moveTo>
-                    <a:pt x="753236" y="0"/>
-                  </a:moveTo>
-                  <a:lnTo>
-                    <a:pt x="1506470" y="285063"/>
-                  </a:lnTo>
-                  <a:lnTo>
-                    <a:pt x="1506470" y="1025568"/>
-                  </a:lnTo>
-                  <a:lnTo>
-                    <a:pt x="753236" y="1310630"/>
-                  </a:lnTo>
-                  <a:lnTo>
-                    <a:pt x="1" y="1025568"/>
-                  </a:lnTo>
-                  <a:lnTo>
-                    <a:pt x="1" y="285063"/>
-                  </a:lnTo>
-                  <a:lnTo>
-                    <a:pt x="753236" y="0"/>
-                  </a:lnTo>
-                  <a:close/>
-                </a:path>
-              </a:pathLst>
-            </a:custGeom>
-            <a:solidFill>
-              <a:srgbClr val="fff5ce"/>
-            </a:solidFill>
-            <a:ln cap="rnd" w="36000">
-              <a:solidFill>
-                <a:srgbClr val="ffde59"/>
-              </a:solidFill>
-              <a:round/>
-            </a:ln>
-          </p:spPr>
-          <p:style>
-            <a:lnRef idx="0"/>
-            <a:fillRef idx="0"/>
-            <a:effectRef idx="0"/>
-            <a:fontRef idx="minor"/>
-          </p:style>
-        </p:sp>
-        <p:sp>
-          <p:nvSpPr>
-            <p:cNvPr id="126" name=""/>
-            <p:cNvSpPr/>
-            <p:nvPr/>
-          </p:nvSpPr>
-          <p:spPr>
-            <a:xfrm flipH="1">
-              <a:off x="5236560" y="4914000"/>
-              <a:ext cx="700920" cy="700920"/>
-            </a:xfrm>
-            <a:custGeom>
-              <a:avLst/>
-              <a:gdLst/>
-              <a:ahLst/>
-              <a:rect l="l" t="t" r="r" b="b"/>
-              <a:pathLst>
-                <a:path w="1506471" h="1310630">
-                  <a:moveTo>
-                    <a:pt x="753236" y="0"/>
-                  </a:moveTo>
-                  <a:lnTo>
-                    <a:pt x="1506470" y="285063"/>
-                  </a:lnTo>
-                  <a:lnTo>
-                    <a:pt x="1506470" y="1025568"/>
-                  </a:lnTo>
-                  <a:lnTo>
-                    <a:pt x="753236" y="1310630"/>
-                  </a:lnTo>
-                  <a:lnTo>
-                    <a:pt x="1" y="1025568"/>
-                  </a:lnTo>
-                  <a:lnTo>
-                    <a:pt x="1" y="285063"/>
-                  </a:lnTo>
-                  <a:lnTo>
-                    <a:pt x="753236" y="0"/>
-                  </a:lnTo>
-                  <a:close/>
-                </a:path>
-              </a:pathLst>
-            </a:custGeom>
-            <a:solidFill>
-              <a:srgbClr val="fff5ce"/>
-            </a:solidFill>
-            <a:ln cap="rnd" w="36000">
-              <a:solidFill>
-                <a:srgbClr val="ffde59"/>
-              </a:solidFill>
-              <a:round/>
-            </a:ln>
-          </p:spPr>
-          <p:style>
-            <a:lnRef idx="0"/>
-            <a:fillRef idx="0"/>
-            <a:effectRef idx="0"/>
-            <a:fontRef idx="minor"/>
-          </p:style>
-        </p:sp>
-        <p:sp>
-          <p:nvSpPr>
-            <p:cNvPr id="127" name=""/>
-            <p:cNvSpPr/>
-            <p:nvPr/>
-          </p:nvSpPr>
-          <p:spPr>
-            <a:xfrm flipH="1">
-              <a:off x="4876560" y="5454000"/>
-              <a:ext cx="700920" cy="700920"/>
-            </a:xfrm>
-            <a:custGeom>
-              <a:avLst/>
-              <a:gdLst/>
-              <a:ahLst/>
-              <a:rect l="l" t="t" r="r" b="b"/>
-              <a:pathLst>
-                <a:path w="1506471" h="1310630">
-                  <a:moveTo>
-                    <a:pt x="753236" y="0"/>
-                  </a:moveTo>
-                  <a:lnTo>
-                    <a:pt x="1506470" y="285063"/>
-                  </a:lnTo>
-                  <a:lnTo>
-                    <a:pt x="1506470" y="1025568"/>
-                  </a:lnTo>
-                  <a:lnTo>
-                    <a:pt x="753236" y="1310630"/>
-                  </a:lnTo>
-                  <a:lnTo>
-                    <a:pt x="1" y="1025568"/>
-                  </a:lnTo>
-                  <a:lnTo>
-                    <a:pt x="1" y="285063"/>
-                  </a:lnTo>
-                  <a:lnTo>
-                    <a:pt x="753236" y="0"/>
-                  </a:lnTo>
-                  <a:close/>
-                </a:path>
-              </a:pathLst>
-            </a:custGeom>
-            <a:solidFill>
-              <a:srgbClr val="fff5ce"/>
-            </a:solidFill>
-            <a:ln cap="rnd" w="36000">
-              <a:solidFill>
-                <a:srgbClr val="ffde59"/>
-              </a:solidFill>
-              <a:round/>
-            </a:ln>
-          </p:spPr>
-          <p:style>
-            <a:lnRef idx="0"/>
-            <a:fillRef idx="0"/>
-            <a:effectRef idx="0"/>
-            <a:fontRef idx="minor"/>
-          </p:style>
-        </p:sp>
-        <p:sp>
-          <p:nvSpPr>
-            <p:cNvPr id="128" name=""/>
-            <p:cNvSpPr/>
-            <p:nvPr/>
-          </p:nvSpPr>
-          <p:spPr>
-            <a:xfrm flipH="1">
-              <a:off x="5578560" y="5454000"/>
-              <a:ext cx="700920" cy="700920"/>
-            </a:xfrm>
-            <a:custGeom>
-              <a:avLst/>
-              <a:gdLst/>
-              <a:ahLst/>
-              <a:rect l="l" t="t" r="r" b="b"/>
-              <a:pathLst>
-                <a:path w="1506471" h="1310630">
-                  <a:moveTo>
-                    <a:pt x="753236" y="0"/>
-                  </a:moveTo>
-                  <a:lnTo>
-                    <a:pt x="1506470" y="285063"/>
-                  </a:lnTo>
-                  <a:lnTo>
-                    <a:pt x="1506470" y="1025568"/>
-                  </a:lnTo>
-                  <a:lnTo>
-                    <a:pt x="753236" y="1310630"/>
-                  </a:lnTo>
-                  <a:lnTo>
-                    <a:pt x="1" y="1025568"/>
-                  </a:lnTo>
-                  <a:lnTo>
-                    <a:pt x="1" y="285063"/>
-                  </a:lnTo>
-                  <a:lnTo>
-                    <a:pt x="753236" y="0"/>
-                  </a:lnTo>
-                  <a:close/>
-                </a:path>
-              </a:pathLst>
-            </a:custGeom>
-            <a:solidFill>
-              <a:srgbClr val="fff5ce"/>
-            </a:solidFill>
-            <a:ln cap="rnd" w="36000">
-              <a:solidFill>
-                <a:srgbClr val="ffde59"/>
-              </a:solidFill>
-              <a:round/>
-            </a:ln>
-          </p:spPr>
-          <p:style>
-            <a:lnRef idx="0"/>
-            <a:fillRef idx="0"/>
-            <a:effectRef idx="0"/>
-            <a:fontRef idx="minor"/>
-          </p:style>
-        </p:sp>
-        <p:sp>
-          <p:nvSpPr>
-            <p:cNvPr id="129" name=""/>
-            <p:cNvSpPr/>
-            <p:nvPr/>
-          </p:nvSpPr>
-          <p:spPr>
-            <a:xfrm flipH="1">
-              <a:off x="3850560" y="4914000"/>
-              <a:ext cx="700920" cy="700920"/>
-            </a:xfrm>
-            <a:custGeom>
-              <a:avLst/>
-              <a:gdLst/>
-              <a:ahLst/>
-              <a:rect l="l" t="t" r="r" b="b"/>
-              <a:pathLst>
-                <a:path w="1506471" h="1310630">
-                  <a:moveTo>
-                    <a:pt x="753236" y="0"/>
-                  </a:moveTo>
-                  <a:lnTo>
-                    <a:pt x="1506470" y="285063"/>
-                  </a:lnTo>
-                  <a:lnTo>
-                    <a:pt x="1506470" y="1025568"/>
-                  </a:lnTo>
-                  <a:lnTo>
-                    <a:pt x="753236" y="1310630"/>
-                  </a:lnTo>
-                  <a:lnTo>
-                    <a:pt x="1" y="1025568"/>
-                  </a:lnTo>
-                  <a:lnTo>
-                    <a:pt x="1" y="285063"/>
-                  </a:lnTo>
-                  <a:lnTo>
-                    <a:pt x="753236" y="0"/>
-                  </a:lnTo>
-                  <a:close/>
-                </a:path>
-              </a:pathLst>
-            </a:custGeom>
-            <a:solidFill>
-              <a:srgbClr val="fff5ce"/>
-            </a:solidFill>
-            <a:ln cap="rnd" w="36000">
-              <a:solidFill>
-                <a:srgbClr val="ffde59"/>
-              </a:solidFill>
-              <a:round/>
-            </a:ln>
-          </p:spPr>
-          <p:style>
-            <a:lnRef idx="0"/>
-            <a:fillRef idx="0"/>
-            <a:effectRef idx="0"/>
-            <a:fontRef idx="minor"/>
-          </p:style>
-        </p:sp>
-        <p:sp>
-          <p:nvSpPr>
-            <p:cNvPr id="130" name=""/>
-            <p:cNvSpPr/>
-            <p:nvPr/>
-          </p:nvSpPr>
-          <p:spPr>
-            <a:xfrm flipH="1">
-              <a:off x="4534560" y="4914000"/>
-              <a:ext cx="700920" cy="700920"/>
-            </a:xfrm>
-            <a:custGeom>
-              <a:avLst/>
-              <a:gdLst/>
-              <a:ahLst/>
-              <a:rect l="l" t="t" r="r" b="b"/>
-              <a:pathLst>
-                <a:path w="1506471" h="1310630">
-                  <a:moveTo>
-                    <a:pt x="753236" y="0"/>
-                  </a:moveTo>
-                  <a:lnTo>
-                    <a:pt x="1506470" y="285063"/>
-                  </a:lnTo>
-                  <a:lnTo>
-                    <a:pt x="1506470" y="1025568"/>
-                  </a:lnTo>
-                  <a:lnTo>
-                    <a:pt x="753236" y="1310630"/>
-                  </a:lnTo>
-                  <a:lnTo>
-                    <a:pt x="1" y="1025568"/>
-                  </a:lnTo>
-                  <a:lnTo>
-                    <a:pt x="1" y="285063"/>
-                  </a:lnTo>
-                  <a:lnTo>
-                    <a:pt x="753236" y="0"/>
-                  </a:lnTo>
-                  <a:close/>
-                </a:path>
-              </a:pathLst>
-            </a:custGeom>
-            <a:solidFill>
-              <a:srgbClr val="fff5ce"/>
-            </a:solidFill>
-            <a:ln cap="rnd" w="36000">
-              <a:solidFill>
-                <a:srgbClr val="ffde59"/>
-              </a:solidFill>
-              <a:round/>
-            </a:ln>
-          </p:spPr>
-          <p:style>
-            <a:lnRef idx="0"/>
-            <a:fillRef idx="0"/>
-            <a:effectRef idx="0"/>
-            <a:fontRef idx="minor"/>
-          </p:style>
-        </p:sp>
-        <p:sp>
-          <p:nvSpPr>
-            <p:cNvPr id="131" name=""/>
-            <p:cNvSpPr/>
-            <p:nvPr/>
-          </p:nvSpPr>
-          <p:spPr>
-            <a:xfrm flipH="1">
-              <a:off x="4174560" y="5454000"/>
-              <a:ext cx="700920" cy="700920"/>
-            </a:xfrm>
-            <a:custGeom>
-              <a:avLst/>
-              <a:gdLst/>
-              <a:ahLst/>
-              <a:rect l="l" t="t" r="r" b="b"/>
-              <a:pathLst>
-                <a:path w="1506471" h="1310630">
-                  <a:moveTo>
-                    <a:pt x="753236" y="0"/>
-                  </a:moveTo>
-                  <a:lnTo>
-                    <a:pt x="1506470" y="285063"/>
-                  </a:lnTo>
-                  <a:lnTo>
-                    <a:pt x="1506470" y="1025568"/>
-                  </a:lnTo>
-                  <a:lnTo>
-                    <a:pt x="753236" y="1310630"/>
-                  </a:lnTo>
-                  <a:lnTo>
-                    <a:pt x="1" y="1025568"/>
-                  </a:lnTo>
-                  <a:lnTo>
-                    <a:pt x="1" y="285063"/>
-                  </a:lnTo>
-                  <a:lnTo>
-                    <a:pt x="753236" y="0"/>
-                  </a:lnTo>
-                  <a:close/>
-                </a:path>
-              </a:pathLst>
-            </a:custGeom>
-            <a:solidFill>
-              <a:srgbClr val="fff5ce"/>
-            </a:solidFill>
-            <a:ln cap="rnd" w="36000">
-              <a:solidFill>
-                <a:srgbClr val="ffde59"/>
-              </a:solidFill>
-              <a:round/>
-            </a:ln>
-          </p:spPr>
-          <p:style>
-            <a:lnRef idx="0"/>
-            <a:fillRef idx="0"/>
-            <a:effectRef idx="0"/>
-            <a:fontRef idx="minor"/>
-          </p:style>
-        </p:sp>
-        <p:sp>
-          <p:nvSpPr>
-            <p:cNvPr id="132" name=""/>
-            <p:cNvSpPr/>
-            <p:nvPr/>
-          </p:nvSpPr>
-          <p:spPr>
-            <a:xfrm flipH="1">
-              <a:off x="2770560" y="5454000"/>
-              <a:ext cx="700920" cy="700920"/>
-            </a:xfrm>
-            <a:custGeom>
-              <a:avLst/>
-              <a:gdLst/>
-              <a:ahLst/>
-              <a:rect l="l" t="t" r="r" b="b"/>
-              <a:pathLst>
-                <a:path w="1506471" h="1310630">
-                  <a:moveTo>
-                    <a:pt x="753236" y="0"/>
-                  </a:moveTo>
-                  <a:lnTo>
-                    <a:pt x="1506470" y="285063"/>
-                  </a:lnTo>
-                  <a:lnTo>
-                    <a:pt x="1506470" y="1025568"/>
-                  </a:lnTo>
-                  <a:lnTo>
-                    <a:pt x="753236" y="1310630"/>
-                  </a:lnTo>
-                  <a:lnTo>
-                    <a:pt x="1" y="1025568"/>
-                  </a:lnTo>
-                  <a:lnTo>
-                    <a:pt x="1" y="285063"/>
-                  </a:lnTo>
-                  <a:lnTo>
-                    <a:pt x="753236" y="0"/>
-                  </a:lnTo>
-                  <a:close/>
-                </a:path>
-              </a:pathLst>
-            </a:custGeom>
-            <a:solidFill>
-              <a:srgbClr val="fff5ce"/>
-            </a:solidFill>
-            <a:ln cap="rnd" w="36000">
-              <a:solidFill>
-                <a:srgbClr val="ffde59"/>
-              </a:solidFill>
-              <a:round/>
-            </a:ln>
-          </p:spPr>
-          <p:style>
-            <a:lnRef idx="0"/>
-            <a:fillRef idx="0"/>
-            <a:effectRef idx="0"/>
-            <a:fontRef idx="minor"/>
-          </p:style>
-        </p:sp>
-        <p:sp>
-          <p:nvSpPr>
-            <p:cNvPr id="133" name=""/>
-            <p:cNvSpPr/>
-            <p:nvPr/>
-          </p:nvSpPr>
-          <p:spPr>
-            <a:xfrm flipH="1">
-              <a:off x="3472560" y="5454000"/>
-              <a:ext cx="700920" cy="700920"/>
-            </a:xfrm>
-            <a:custGeom>
-              <a:avLst/>
-              <a:gdLst/>
-              <a:ahLst/>
-              <a:rect l="l" t="t" r="r" b="b"/>
-              <a:pathLst>
-                <a:path w="1506471" h="1310630">
-                  <a:moveTo>
-                    <a:pt x="753236" y="0"/>
-                  </a:moveTo>
-                  <a:lnTo>
-                    <a:pt x="1506470" y="285063"/>
-                  </a:lnTo>
-                  <a:lnTo>
-                    <a:pt x="1506470" y="1025568"/>
-                  </a:lnTo>
-                  <a:lnTo>
-                    <a:pt x="753236" y="1310630"/>
-                  </a:lnTo>
-                  <a:lnTo>
-                    <a:pt x="1" y="1025568"/>
-                  </a:lnTo>
-                  <a:lnTo>
-                    <a:pt x="1" y="285063"/>
-                  </a:lnTo>
-                  <a:lnTo>
-                    <a:pt x="753236" y="0"/>
-                  </a:lnTo>
-                  <a:close/>
-                </a:path>
-              </a:pathLst>
-            </a:custGeom>
-            <a:solidFill>
-              <a:srgbClr val="fff5ce"/>
-            </a:solidFill>
-            <a:ln cap="rnd" w="36000">
-              <a:solidFill>
-                <a:srgbClr val="ffde59"/>
-              </a:solidFill>
-              <a:round/>
-            </a:ln>
-          </p:spPr>
-          <p:style>
-            <a:lnRef idx="0"/>
-            <a:fillRef idx="0"/>
-            <a:effectRef idx="0"/>
-            <a:fontRef idx="minor"/>
-          </p:style>
-        </p:sp>
-        <p:sp>
-          <p:nvSpPr>
-            <p:cNvPr id="134" name=""/>
-            <p:cNvSpPr/>
-            <p:nvPr/>
-          </p:nvSpPr>
-          <p:spPr>
-            <a:xfrm flipH="1">
-              <a:off x="2446560" y="4914000"/>
-              <a:ext cx="700920" cy="700920"/>
-            </a:xfrm>
-            <a:custGeom>
-              <a:avLst/>
-              <a:gdLst/>
-              <a:ahLst/>
-              <a:rect l="l" t="t" r="r" b="b"/>
-              <a:pathLst>
-                <a:path w="1506471" h="1310630">
-                  <a:moveTo>
-                    <a:pt x="753236" y="0"/>
-                  </a:moveTo>
-                  <a:lnTo>
-                    <a:pt x="1506470" y="285063"/>
-                  </a:lnTo>
-                  <a:lnTo>
-                    <a:pt x="1506470" y="1025568"/>
-                  </a:lnTo>
-                  <a:lnTo>
-                    <a:pt x="753236" y="1310630"/>
-                  </a:lnTo>
-                  <a:lnTo>
-                    <a:pt x="1" y="1025568"/>
-                  </a:lnTo>
-                  <a:lnTo>
-                    <a:pt x="1" y="285063"/>
-                  </a:lnTo>
-                  <a:lnTo>
-                    <a:pt x="753236" y="0"/>
-                  </a:lnTo>
-                  <a:close/>
-                </a:path>
-              </a:pathLst>
-            </a:custGeom>
-            <a:solidFill>
-              <a:srgbClr val="fff5ce"/>
-            </a:solidFill>
-            <a:ln cap="rnd" w="36000">
-              <a:solidFill>
-                <a:srgbClr val="ffde59"/>
-              </a:solidFill>
-              <a:round/>
-            </a:ln>
-          </p:spPr>
-          <p:style>
-            <a:lnRef idx="0"/>
-            <a:fillRef idx="0"/>
-            <a:effectRef idx="0"/>
-            <a:fontRef idx="minor"/>
-          </p:style>
-        </p:sp>
-        <p:sp>
-          <p:nvSpPr>
-            <p:cNvPr id="135" name=""/>
-            <p:cNvSpPr/>
-            <p:nvPr/>
-          </p:nvSpPr>
-          <p:spPr>
-            <a:xfrm flipH="1">
-              <a:off x="3148560" y="4914000"/>
-              <a:ext cx="700920" cy="700920"/>
-            </a:xfrm>
-            <a:custGeom>
-              <a:avLst/>
-              <a:gdLst/>
-              <a:ahLst/>
-              <a:rect l="l" t="t" r="r" b="b"/>
-              <a:pathLst>
-                <a:path w="1506471" h="1310630">
-                  <a:moveTo>
-                    <a:pt x="753236" y="0"/>
-                  </a:moveTo>
-                  <a:lnTo>
-                    <a:pt x="1506470" y="285063"/>
-                  </a:lnTo>
-                  <a:lnTo>
-                    <a:pt x="1506470" y="1025568"/>
-                  </a:lnTo>
-                  <a:lnTo>
-                    <a:pt x="753236" y="1310630"/>
-                  </a:lnTo>
-                  <a:lnTo>
-                    <a:pt x="1" y="1025568"/>
-                  </a:lnTo>
-                  <a:lnTo>
-                    <a:pt x="1" y="285063"/>
-                  </a:lnTo>
-                  <a:lnTo>
-                    <a:pt x="753236" y="0"/>
-                  </a:lnTo>
-                  <a:close/>
-                </a:path>
-              </a:pathLst>
-            </a:custGeom>
-            <a:solidFill>
-              <a:srgbClr val="fff5ce"/>
-            </a:solidFill>
-            <a:ln cap="rnd" w="36000">
-              <a:solidFill>
-                <a:srgbClr val="ffde59"/>
-              </a:solidFill>
-              <a:round/>
-            </a:ln>
-          </p:spPr>
-          <p:style>
-            <a:lnRef idx="0"/>
-            <a:fillRef idx="0"/>
-            <a:effectRef idx="0"/>
-            <a:fontRef idx="minor"/>
-          </p:style>
-        </p:sp>
-        <p:sp>
-          <p:nvSpPr>
-            <p:cNvPr id="136" name=""/>
-            <p:cNvSpPr/>
-            <p:nvPr/>
-          </p:nvSpPr>
-          <p:spPr>
-            <a:xfrm flipH="1">
-              <a:off x="1744560" y="4914000"/>
-              <a:ext cx="700920" cy="700920"/>
-            </a:xfrm>
-            <a:custGeom>
-              <a:avLst/>
-              <a:gdLst/>
-              <a:ahLst/>
-              <a:rect l="l" t="t" r="r" b="b"/>
-              <a:pathLst>
-                <a:path w="1506471" h="1310630">
-                  <a:moveTo>
-                    <a:pt x="753236" y="0"/>
-                  </a:moveTo>
-                  <a:lnTo>
-                    <a:pt x="1506470" y="285063"/>
-                  </a:lnTo>
-                  <a:lnTo>
-                    <a:pt x="1506470" y="1025568"/>
-                  </a:lnTo>
-                  <a:lnTo>
-                    <a:pt x="753236" y="1310630"/>
-                  </a:lnTo>
-                  <a:lnTo>
-                    <a:pt x="1" y="1025568"/>
-                  </a:lnTo>
-                  <a:lnTo>
-                    <a:pt x="1" y="285063"/>
-                  </a:lnTo>
-                  <a:lnTo>
-                    <a:pt x="753236" y="0"/>
-                  </a:lnTo>
-                  <a:close/>
-                </a:path>
-              </a:pathLst>
-            </a:custGeom>
-            <a:solidFill>
-              <a:srgbClr val="fff5ce"/>
-            </a:solidFill>
-            <a:ln cap="rnd" w="36000">
-              <a:solidFill>
-                <a:srgbClr val="ffde59"/>
-              </a:solidFill>
-              <a:round/>
-            </a:ln>
-          </p:spPr>
-          <p:style>
-            <a:lnRef idx="0"/>
-            <a:fillRef idx="0"/>
-            <a:effectRef idx="0"/>
-            <a:fontRef idx="minor"/>
-          </p:style>
-        </p:sp>
-        <p:sp>
-          <p:nvSpPr>
-            <p:cNvPr id="137" name=""/>
-            <p:cNvSpPr/>
-            <p:nvPr/>
-          </p:nvSpPr>
-          <p:spPr>
-            <a:xfrm flipH="1">
-              <a:off x="2068560" y="5454000"/>
-              <a:ext cx="700920" cy="700920"/>
-            </a:xfrm>
-            <a:custGeom>
-              <a:avLst/>
-              <a:gdLst/>
-              <a:ahLst/>
-              <a:rect l="l" t="t" r="r" b="b"/>
-              <a:pathLst>
-                <a:path w="1506471" h="1310630">
-                  <a:moveTo>
-                    <a:pt x="753236" y="0"/>
-                  </a:moveTo>
-                  <a:lnTo>
-                    <a:pt x="1506470" y="285063"/>
-                  </a:lnTo>
-                  <a:lnTo>
-                    <a:pt x="1506470" y="1025568"/>
-                  </a:lnTo>
-                  <a:lnTo>
-                    <a:pt x="753236" y="1310630"/>
-                  </a:lnTo>
-                  <a:lnTo>
-                    <a:pt x="1" y="1025568"/>
-                  </a:lnTo>
-                  <a:lnTo>
-                    <a:pt x="1" y="285063"/>
-                  </a:lnTo>
-                  <a:lnTo>
-                    <a:pt x="753236" y="0"/>
-                  </a:lnTo>
-                  <a:close/>
-                </a:path>
-              </a:pathLst>
-            </a:custGeom>
-            <a:solidFill>
-              <a:srgbClr val="fff5ce"/>
-            </a:solidFill>
-            <a:ln cap="rnd" w="36000">
-              <a:solidFill>
-                <a:srgbClr val="ffde59"/>
-              </a:solidFill>
-              <a:round/>
-            </a:ln>
-          </p:spPr>
-          <p:style>
-            <a:lnRef idx="0"/>
-            <a:fillRef idx="0"/>
-            <a:effectRef idx="0"/>
-            <a:fontRef idx="minor"/>
-          </p:style>
-        </p:sp>
-        <p:sp>
-          <p:nvSpPr>
-            <p:cNvPr id="138" name=""/>
-            <p:cNvSpPr/>
-            <p:nvPr/>
-          </p:nvSpPr>
-          <p:spPr>
-            <a:xfrm flipH="1">
-              <a:off x="1042560" y="4914360"/>
-              <a:ext cx="700920" cy="700920"/>
-            </a:xfrm>
-            <a:custGeom>
-              <a:avLst/>
-              <a:gdLst/>
-              <a:ahLst/>
-              <a:rect l="l" t="t" r="r" b="b"/>
-              <a:pathLst>
-                <a:path w="1506471" h="1310630">
-                  <a:moveTo>
-                    <a:pt x="753236" y="0"/>
-                  </a:moveTo>
-                  <a:lnTo>
-                    <a:pt x="1506470" y="285063"/>
-                  </a:lnTo>
-                  <a:lnTo>
-                    <a:pt x="1506470" y="1025568"/>
-                  </a:lnTo>
-                  <a:lnTo>
-                    <a:pt x="753236" y="1310630"/>
-                  </a:lnTo>
-                  <a:lnTo>
-                    <a:pt x="1" y="1025568"/>
-                  </a:lnTo>
-                  <a:lnTo>
-                    <a:pt x="1" y="285063"/>
-                  </a:lnTo>
-                  <a:lnTo>
-                    <a:pt x="753236" y="0"/>
-                  </a:lnTo>
-                  <a:close/>
-                </a:path>
-              </a:pathLst>
-            </a:custGeom>
-            <a:solidFill>
-              <a:srgbClr val="fff5ce"/>
-            </a:solidFill>
-            <a:ln cap="rnd" w="36000">
-              <a:solidFill>
-                <a:srgbClr val="ffde59"/>
-              </a:solidFill>
-              <a:round/>
-            </a:ln>
-          </p:spPr>
-          <p:style>
-            <a:lnRef idx="0"/>
-            <a:fillRef idx="0"/>
-            <a:effectRef idx="0"/>
-            <a:fontRef idx="minor"/>
-          </p:style>
-        </p:sp>
-        <p:sp>
-          <p:nvSpPr>
-            <p:cNvPr id="139" name=""/>
-            <p:cNvSpPr/>
-            <p:nvPr/>
-          </p:nvSpPr>
-          <p:spPr>
-            <a:xfrm flipH="1">
-              <a:off x="1366560" y="5454360"/>
-              <a:ext cx="700920" cy="700920"/>
-            </a:xfrm>
-            <a:custGeom>
-              <a:avLst/>
-              <a:gdLst/>
-              <a:ahLst/>
-              <a:rect l="l" t="t" r="r" b="b"/>
-              <a:pathLst>
-                <a:path w="1506471" h="1310630">
-                  <a:moveTo>
-                    <a:pt x="753236" y="0"/>
-                  </a:moveTo>
-                  <a:lnTo>
-                    <a:pt x="1506470" y="285063"/>
-                  </a:lnTo>
-                  <a:lnTo>
-                    <a:pt x="1506470" y="1025568"/>
-                  </a:lnTo>
-                  <a:lnTo>
-                    <a:pt x="753236" y="1310630"/>
-                  </a:lnTo>
-                  <a:lnTo>
-                    <a:pt x="1" y="1025568"/>
-                  </a:lnTo>
-                  <a:lnTo>
-                    <a:pt x="1" y="285063"/>
-                  </a:lnTo>
-                  <a:lnTo>
-                    <a:pt x="753236" y="0"/>
-                  </a:lnTo>
-                  <a:close/>
-                </a:path>
-              </a:pathLst>
-            </a:custGeom>
-            <a:solidFill>
-              <a:srgbClr val="fff5ce"/>
-            </a:solidFill>
-            <a:ln cap="rnd" w="36000">
-              <a:solidFill>
-                <a:srgbClr val="ffde59"/>
-              </a:solidFill>
-              <a:round/>
-            </a:ln>
-          </p:spPr>
-          <p:style>
-            <a:lnRef idx="0"/>
-            <a:fillRef idx="0"/>
-            <a:effectRef idx="0"/>
-            <a:fontRef idx="minor"/>
-          </p:style>
-        </p:sp>
-        <p:sp>
-          <p:nvSpPr>
-            <p:cNvPr id="140" name=""/>
-            <p:cNvSpPr/>
-            <p:nvPr/>
-          </p:nvSpPr>
-          <p:spPr>
-            <a:xfrm flipH="1">
-              <a:off x="-37440" y="5454360"/>
-              <a:ext cx="700920" cy="700920"/>
-            </a:xfrm>
-            <a:custGeom>
-              <a:avLst/>
-              <a:gdLst/>
-              <a:ahLst/>
-              <a:rect l="l" t="t" r="r" b="b"/>
-              <a:pathLst>
-                <a:path w="1506471" h="1310630">
-                  <a:moveTo>
-                    <a:pt x="753236" y="0"/>
-                  </a:moveTo>
-                  <a:lnTo>
-                    <a:pt x="1506470" y="285063"/>
-                  </a:lnTo>
-                  <a:lnTo>
-                    <a:pt x="1506470" y="1025568"/>
-                  </a:lnTo>
-                  <a:lnTo>
-                    <a:pt x="753236" y="1310630"/>
-                  </a:lnTo>
-                  <a:lnTo>
-                    <a:pt x="1" y="1025568"/>
-                  </a:lnTo>
-                  <a:lnTo>
-                    <a:pt x="1" y="285063"/>
-                  </a:lnTo>
-                  <a:lnTo>
-                    <a:pt x="753236" y="0"/>
-                  </a:lnTo>
-                  <a:close/>
-                </a:path>
-              </a:pathLst>
-            </a:custGeom>
-            <a:solidFill>
-              <a:srgbClr val="fff5ce"/>
-            </a:solidFill>
-            <a:ln cap="rnd" w="36000">
-              <a:solidFill>
-                <a:srgbClr val="ffde59"/>
-              </a:solidFill>
-              <a:round/>
-            </a:ln>
-          </p:spPr>
-          <p:style>
-            <a:lnRef idx="0"/>
-            <a:fillRef idx="0"/>
-            <a:effectRef idx="0"/>
-            <a:fontRef idx="minor"/>
-          </p:style>
-        </p:sp>
-        <p:sp>
-          <p:nvSpPr>
-            <p:cNvPr id="141" name=""/>
-            <p:cNvSpPr/>
-            <p:nvPr/>
-          </p:nvSpPr>
-          <p:spPr>
-            <a:xfrm flipH="1">
-              <a:off x="664560" y="5454360"/>
-              <a:ext cx="700920" cy="700920"/>
-            </a:xfrm>
-            <a:custGeom>
-              <a:avLst/>
-              <a:gdLst/>
-              <a:ahLst/>
-              <a:rect l="l" t="t" r="r" b="b"/>
-              <a:pathLst>
-                <a:path w="1506471" h="1310630">
-                  <a:moveTo>
-                    <a:pt x="753236" y="0"/>
-                  </a:moveTo>
-                  <a:lnTo>
-                    <a:pt x="1506470" y="285063"/>
-                  </a:lnTo>
-                  <a:lnTo>
-                    <a:pt x="1506470" y="1025568"/>
-                  </a:lnTo>
-                  <a:lnTo>
-                    <a:pt x="753236" y="1310630"/>
-                  </a:lnTo>
-                  <a:lnTo>
-                    <a:pt x="1" y="1025568"/>
-                  </a:lnTo>
-                  <a:lnTo>
-                    <a:pt x="1" y="285063"/>
-                  </a:lnTo>
-                  <a:lnTo>
-                    <a:pt x="753236" y="0"/>
-                  </a:lnTo>
-                  <a:close/>
-                </a:path>
-              </a:pathLst>
-            </a:custGeom>
-            <a:solidFill>
-              <a:srgbClr val="fff5ce"/>
-            </a:solidFill>
-            <a:ln cap="rnd" w="36000">
-              <a:solidFill>
-                <a:srgbClr val="ffde59"/>
-              </a:solidFill>
-              <a:round/>
-            </a:ln>
-          </p:spPr>
-          <p:style>
-            <a:lnRef idx="0"/>
-            <a:fillRef idx="0"/>
-            <a:effectRef idx="0"/>
-            <a:fontRef idx="minor"/>
-          </p:style>
-        </p:sp>
-        <p:sp>
-          <p:nvSpPr>
-            <p:cNvPr id="142" name=""/>
-            <p:cNvSpPr/>
-            <p:nvPr/>
-          </p:nvSpPr>
-          <p:spPr>
-            <a:xfrm flipH="1">
-              <a:off x="-361440" y="4914360"/>
-              <a:ext cx="700920" cy="700920"/>
-            </a:xfrm>
-            <a:custGeom>
-              <a:avLst/>
-              <a:gdLst/>
-              <a:ahLst/>
-              <a:rect l="l" t="t" r="r" b="b"/>
-              <a:pathLst>
-                <a:path w="1506471" h="1310630">
-                  <a:moveTo>
-                    <a:pt x="753236" y="0"/>
-                  </a:moveTo>
-                  <a:lnTo>
-                    <a:pt x="1506470" y="285063"/>
-                  </a:lnTo>
-                  <a:lnTo>
-                    <a:pt x="1506470" y="1025568"/>
-                  </a:lnTo>
-                  <a:lnTo>
-                    <a:pt x="753236" y="1310630"/>
-                  </a:lnTo>
-                  <a:lnTo>
-                    <a:pt x="1" y="1025568"/>
-                  </a:lnTo>
-                  <a:lnTo>
-                    <a:pt x="1" y="285063"/>
-                  </a:lnTo>
-                  <a:lnTo>
-                    <a:pt x="753236" y="0"/>
-                  </a:lnTo>
-                  <a:close/>
-                </a:path>
-              </a:pathLst>
-            </a:custGeom>
-            <a:solidFill>
-              <a:srgbClr val="fff5ce"/>
-            </a:solidFill>
-            <a:ln cap="rnd" w="36000">
-              <a:solidFill>
-                <a:srgbClr val="ffde59"/>
-              </a:solidFill>
-              <a:round/>
-            </a:ln>
-          </p:spPr>
-          <p:style>
-            <a:lnRef idx="0"/>
-            <a:fillRef idx="0"/>
-            <a:effectRef idx="0"/>
-            <a:fontRef idx="minor"/>
-          </p:style>
-        </p:sp>
-        <p:sp>
-          <p:nvSpPr>
-            <p:cNvPr id="143" name=""/>
-            <p:cNvSpPr/>
-            <p:nvPr/>
-          </p:nvSpPr>
-          <p:spPr>
-            <a:xfrm flipH="1">
-              <a:off x="340560" y="4914360"/>
-              <a:ext cx="700920" cy="700920"/>
-            </a:xfrm>
-            <a:custGeom>
-              <a:avLst/>
-              <a:gdLst/>
-              <a:ahLst/>
-              <a:rect l="l" t="t" r="r" b="b"/>
-              <a:pathLst>
-                <a:path w="1506471" h="1310630">
-                  <a:moveTo>
-                    <a:pt x="753236" y="0"/>
-                  </a:moveTo>
-                  <a:lnTo>
-                    <a:pt x="1506470" y="285063"/>
-                  </a:lnTo>
-                  <a:lnTo>
-                    <a:pt x="1506470" y="1025568"/>
-                  </a:lnTo>
-                  <a:lnTo>
-                    <a:pt x="753236" y="1310630"/>
-                  </a:lnTo>
-                  <a:lnTo>
-                    <a:pt x="1" y="1025568"/>
-                  </a:lnTo>
-                  <a:lnTo>
-                    <a:pt x="1" y="285063"/>
-                  </a:lnTo>
-                  <a:lnTo>
-                    <a:pt x="753236" y="0"/>
-                  </a:lnTo>
-                  <a:close/>
-                </a:path>
-              </a:pathLst>
-            </a:custGeom>
-            <a:solidFill>
-              <a:srgbClr val="ffde59"/>
-            </a:solidFill>
-            <a:ln cap="rnd" w="36000">
-              <a:solidFill>
-                <a:srgbClr val="ffde59"/>
-              </a:solidFill>
-              <a:round/>
-            </a:ln>
-          </p:spPr>
-          <p:style>
-            <a:lnRef idx="0"/>
-            <a:fillRef idx="0"/>
-            <a:effectRef idx="0"/>
-            <a:fontRef idx="minor"/>
-          </p:style>
-        </p:sp>
-        <p:sp>
-          <p:nvSpPr>
-            <p:cNvPr id="144" name=""/>
-            <p:cNvSpPr/>
-            <p:nvPr/>
-          </p:nvSpPr>
-          <p:spPr>
-            <a:xfrm flipH="1">
-              <a:off x="9088560" y="5454000"/>
-              <a:ext cx="700920" cy="700920"/>
-            </a:xfrm>
-            <a:custGeom>
-              <a:avLst/>
-              <a:gdLst/>
-              <a:ahLst/>
-              <a:rect l="l" t="t" r="r" b="b"/>
-              <a:pathLst>
-                <a:path w="1506471" h="1310630">
-                  <a:moveTo>
-                    <a:pt x="753236" y="0"/>
-                  </a:moveTo>
-                  <a:lnTo>
-                    <a:pt x="1506470" y="285063"/>
-                  </a:lnTo>
-                  <a:lnTo>
-                    <a:pt x="1506470" y="1025568"/>
-                  </a:lnTo>
-                  <a:lnTo>
-                    <a:pt x="753236" y="1310630"/>
-                  </a:lnTo>
-                  <a:lnTo>
-                    <a:pt x="1" y="1025568"/>
-                  </a:lnTo>
-                  <a:lnTo>
-                    <a:pt x="1" y="285063"/>
-                  </a:lnTo>
-                  <a:lnTo>
-                    <a:pt x="753236" y="0"/>
-                  </a:lnTo>
-                  <a:close/>
-                </a:path>
-              </a:pathLst>
-            </a:custGeom>
-            <a:solidFill>
-              <a:srgbClr val="fff5ce"/>
-            </a:solidFill>
-            <a:ln cap="rnd" w="36000">
-              <a:solidFill>
-                <a:srgbClr val="ffde59"/>
-              </a:solidFill>
-              <a:round/>
-            </a:ln>
-          </p:spPr>
-          <p:style>
-            <a:lnRef idx="0"/>
-            <a:fillRef idx="0"/>
-            <a:effectRef idx="0"/>
-            <a:fontRef idx="minor"/>
-          </p:style>
-        </p:sp>
-      </p:grpSp>
-      <p:sp>
-        <p:nvSpPr>
-          <p:cNvPr id="145" name=""/>
-          <p:cNvSpPr/>
-          <p:nvPr/>
-        </p:nvSpPr>
-        <p:spPr>
-          <a:xfrm>
-            <a:off x="342000" y="4914360"/>
-            <a:ext cx="2400120" cy="700920"/>
-          </a:xfrm>
-          <a:prstGeom prst="rect">
-            <a:avLst/>
-          </a:prstGeom>
-          <a:noFill/>
-          <a:ln w="0">
-            <a:noFill/>
-          </a:ln>
-        </p:spPr>
-        <p:style>
-          <a:lnRef idx="0"/>
-          <a:fillRef idx="0"/>
-          <a:effectRef idx="0"/>
-          <a:fontRef idx="minor"/>
-        </p:style>
-        <p:txBody>
-          <a:bodyPr lIns="0" rIns="0" tIns="0" bIns="0" anchor="ctr">
-            <a:noAutofit/>
-          </a:bodyPr>
-          <a:p>
-            <a:pPr>
-              <a:lnSpc>
-                <a:spcPct val="100000"/>
-              </a:lnSpc>
-              <a:buNone/>
-            </a:pPr>
-            <a:r>
-              <a:rPr b="0" lang="en-US" sz="1400" spc="-1" strike="noStrike">
-                <a:solidFill>
-                  <a:srgbClr val="000000"/>
-                </a:solidFill>
-                <a:latin typeface="Arial"/>
-                <a:ea typeface="DejaVu Sans"/>
-              </a:rPr>
-              <a:t>&lt;date/time&gt;</a:t>
-            </a:r>
-            <a:endParaRPr b="0" lang="en-US" sz="1400" spc="-1" strike="noStrike">
-              <a:latin typeface="Arial"/>
-            </a:endParaRPr>
-          </a:p>
-        </p:txBody>
-      </p:sp>
-      <p:sp>
-        <p:nvSpPr>
-          <p:cNvPr id="146" name=""/>
-          <p:cNvSpPr/>
-          <p:nvPr/>
-        </p:nvSpPr>
-        <p:spPr>
-          <a:xfrm>
-            <a:off x="2744640" y="4914000"/>
-            <a:ext cx="4579920" cy="703080"/>
-          </a:xfrm>
-          <a:prstGeom prst="rect">
-            <a:avLst/>
-          </a:prstGeom>
-          <a:noFill/>
-          <a:ln w="0">
-            <a:noFill/>
-          </a:ln>
-        </p:spPr>
-        <p:style>
-          <a:lnRef idx="0"/>
-          <a:fillRef idx="0"/>
-          <a:effectRef idx="0"/>
-          <a:fontRef idx="minor"/>
-        </p:style>
-        <p:txBody>
-          <a:bodyPr lIns="0" rIns="0" tIns="0" bIns="0" anchor="ctr">
-            <a:noAutofit/>
-          </a:bodyPr>
-          <a:p>
-            <a:pPr algn="ctr">
-              <a:lnSpc>
-                <a:spcPct val="100000"/>
-              </a:lnSpc>
-              <a:buNone/>
-            </a:pPr>
-            <a:r>
-              <a:rPr b="0" lang="en-US" sz="1400" spc="-1" strike="noStrike">
-                <a:solidFill>
-                  <a:srgbClr val="000000"/>
-                </a:solidFill>
-                <a:latin typeface="Arial"/>
-                <a:ea typeface="DejaVu Sans"/>
-              </a:rPr>
-              <a:t>&lt;footer&gt;</a:t>
-            </a:r>
-            <a:endParaRPr b="0" lang="en-US" sz="1400" spc="-1" strike="noStrike">
-              <a:latin typeface="Arial"/>
-            </a:endParaRPr>
-          </a:p>
-        </p:txBody>
-      </p:sp>
-      <p:sp>
-        <p:nvSpPr>
-          <p:cNvPr id="147" name=""/>
-          <p:cNvSpPr/>
-          <p:nvPr/>
-        </p:nvSpPr>
-        <p:spPr>
-          <a:xfrm>
-            <a:off x="8494200" y="4914000"/>
-            <a:ext cx="1141920" cy="700920"/>
-          </a:xfrm>
-          <a:prstGeom prst="rect">
-            <a:avLst/>
-          </a:prstGeom>
-          <a:noFill/>
-          <a:ln w="0">
-            <a:noFill/>
-          </a:ln>
-        </p:spPr>
-        <p:style>
-          <a:lnRef idx="0"/>
-          <a:fillRef idx="0"/>
-          <a:effectRef idx="0"/>
-          <a:fontRef idx="minor"/>
-        </p:style>
-        <p:txBody>
-          <a:bodyPr lIns="0" rIns="0" tIns="0" bIns="0" anchor="ctr">
-            <a:noAutofit/>
-          </a:bodyPr>
-          <a:p>
-            <a:pPr algn="ctr">
-              <a:lnSpc>
-                <a:spcPct val="100000"/>
-              </a:lnSpc>
-              <a:buNone/>
-            </a:pPr>
-            <a:fld id="{F317F492-F38E-4A9E-AD44-8A12172B9502}" type="slidenum">
-              <a:rPr b="0" lang="en-US" sz="1400" spc="-1" strike="noStrike">
-                <a:solidFill>
-                  <a:srgbClr val="000000"/>
-                </a:solidFill>
-                <a:latin typeface="Arial"/>
-                <a:ea typeface="DejaVu Sans"/>
-              </a:rPr>
-              <a:t>&lt;number&gt;</a:t>
-            </a:fld>
-            <a:endParaRPr b="0" lang="en-US" sz="1400" spc="-1" strike="noStrike">
-              <a:latin typeface="Arial"/>
-            </a:endParaRPr>
-          </a:p>
-        </p:txBody>
-      </p:sp>
-    </p:spTree>
-  </p:cSld>
-  <p:clrMap bg1="lt1" bg2="lt2" tx1="dk1" tx2="dk2" accent1="accent1" accent2="accent2" accent3="accent3" accent4="accent4" accent5="accent5" accent6="accent6" hlink="hlink" folHlink="folHlink"/>
-  <p:sldLayoutIdLst>
-    <p:sldLayoutId id="2147483662" r:id="rId2"/>
-    <p:sldLayoutId id="2147483663" r:id="rId3"/>
-    <p:sldLayoutId id="2147483664" r:id="rId4"/>
-    <p:sldLayoutId id="2147483665" r:id="rId5"/>
-    <p:sldLayoutId id="2147483666" r:id="rId6"/>
-    <p:sldLayoutId id="2147483667" r:id="rId7"/>
-    <p:sldLayoutId id="2147483668" r:id="rId8"/>
-    <p:sldLayoutId id="2147483669" r:id="rId9"/>
-    <p:sldLayoutId id="2147483670" r:id="rId10"/>
-    <p:sldLayoutId id="2147483671" r:id="rId11"/>
-    <p:sldLayoutId id="2147483672" r:id="rId12"/>
-    <p:sldLayoutId id="2147483673" r:id="rId13"/>
-  </p:sldLayoutIdLst>
-</p:sldMaster>
-</file>
-
 <file path=ppt/slides/slide1.xml><?xml version="1.0" encoding="utf-8"?>
 <p:sld xmlns:a="http://schemas.openxmlformats.org/drawingml/2006/main" xmlns:p="http://schemas.openxmlformats.org/presentationml/2006/main" xmlns:r="http://schemas.openxmlformats.org/officeDocument/2006/relationships" xmlns:p14="http://schemas.microsoft.com/office/powerpoint/2010/main" xmlns:p15="http://schemas.microsoft.com/office/powerpoint/2012/main" xmlns:mc="http://schemas.openxmlformats.org/markup-compatibility/2006">
   <p:cSld>
@@ -9867,7 +6334,7 @@
       </p:grpSpPr>
       <p:sp>
         <p:nvSpPr>
-          <p:cNvPr id="184" name="PlaceHolder 1"/>
+          <p:cNvPr id="114" name="PlaceHolder 1"/>
           <p:cNvSpPr>
             <a:spLocks noGrp="1"/>
           </p:cNvSpPr>
@@ -9878,7 +6345,79 @@
         <p:spPr>
           <a:xfrm>
             <a:off x="540000" y="1980000"/>
-            <a:ext cx="8998920" cy="1258920"/>
+            <a:ext cx="8998200" cy="1258200"/>
+          </a:xfrm>
+          <a:prstGeom prst="rect">
+            <a:avLst/>
+          </a:prstGeom>
+          <a:noFill/>
+          <a:ln w="0">
+            <a:noFill/>
+          </a:ln>
+        </p:spPr>
+        <p:txBody>
+          <a:bodyPr lIns="0" rIns="0" tIns="0" bIns="0" anchor="ctr">
+            <a:noAutofit/>
+          </a:bodyPr>
+          <a:p>
+            <a:pPr algn="ctr">
+              <a:lnSpc>
+                <a:spcPct val="100000"/>
+              </a:lnSpc>
+              <a:buNone/>
+            </a:pPr>
+            <a:r>
+              <a:rPr b="0" lang="en-US" sz="1500" spc="-1" strike="noStrike">
+                <a:latin typeface="Calibri"/>
+              </a:rPr>
+              <a:t>This application translates DOCX, PPTX and XLSX files using DeepL API (</a:t>
+            </a:r>
+            <a:r>
+              <a:rPr b="0" lang="en-US" sz="1500" spc="-1" strike="noStrike" u="sng">
+                <a:solidFill>
+                  <a:srgbClr val="0000ff"/>
+                </a:solidFill>
+                <a:uFillTx/>
+                <a:latin typeface="Calibri"/>
+                <a:hlinkClick r:id="rId1"/>
+              </a:rPr>
+              <a:t>https://www.deepl.com/docs-api</a:t>
+            </a:r>
+            <a:r>
+              <a:rPr b="0" lang="en-US" sz="1500" spc="-1" strike="noStrike">
+                <a:latin typeface="Calibri"/>
+              </a:rPr>
+              <a:t>).</a:t>
+            </a:r>
+            <a:br>
+              <a:rPr sz="1500"/>
+            </a:br>
+            <a:r>
+              <a:rPr b="0" lang="en-US" sz="1500" spc="-1" strike="noStrike">
+                <a:latin typeface="Calibri"/>
+              </a:rPr>
+              <a:t>You will need a DeepL API authentication key to use it.</a:t>
+            </a:r>
+            <a:endParaRPr b="0" lang="en-US" sz="1500" spc="-1" strike="noStrike">
+              <a:latin typeface="Arial"/>
+            </a:endParaRPr>
+          </a:p>
+        </p:txBody>
+      </p:sp>
+      <p:sp>
+        <p:nvSpPr>
+          <p:cNvPr id="115" name="PlaceHolder 2"/>
+          <p:cNvSpPr>
+            <a:spLocks noGrp="1"/>
+          </p:cNvSpPr>
+          <p:nvPr>
+            <p:ph type="subTitle"/>
+          </p:nvPr>
+        </p:nvSpPr>
+        <p:spPr>
+          <a:xfrm>
+            <a:off x="540000" y="3420000"/>
+            <a:ext cx="8998200" cy="898200"/>
           </a:xfrm>
           <a:prstGeom prst="rect">
             <a:avLst/>
@@ -9901,74 +6440,11 @@
             </a:pPr>
             <a:r>
               <a:rPr b="0" lang="en-US" sz="1400" spc="-1" strike="noStrike">
-                <a:latin typeface="Lucida Sans"/>
-              </a:rPr>
-              <a:t>This application translates DOCX, PPTX and XLSX files using DeepL API (</a:t>
-            </a:r>
-            <a:r>
-              <a:rPr b="0" lang="en-US" sz="1400" spc="-1" strike="noStrike" u="sng">
-                <a:solidFill>
-                  <a:srgbClr val="0000ff"/>
-                </a:solidFill>
-                <a:uFillTx/>
-                <a:latin typeface="Arial"/>
-                <a:hlinkClick r:id="rId1"/>
-              </a:rPr>
-              <a:t>https://www.deepl.com/docs-api</a:t>
-            </a:r>
-            <a:r>
-              <a:rPr b="0" lang="en-US" sz="1400" spc="-1" strike="noStrike">
-                <a:latin typeface="Lucida Sans"/>
-              </a:rPr>
-              <a:t>). You will need a DeepL API authentication key to use it.</a:t>
-            </a:r>
-            <a:endParaRPr b="0" lang="en-US" sz="1400" spc="-1" strike="noStrike">
-              <a:latin typeface="Arial"/>
-            </a:endParaRPr>
-          </a:p>
-        </p:txBody>
-      </p:sp>
-      <p:sp>
-        <p:nvSpPr>
-          <p:cNvPr id="185" name="PlaceHolder 2"/>
-          <p:cNvSpPr>
-            <a:spLocks noGrp="1"/>
-          </p:cNvSpPr>
-          <p:nvPr>
-            <p:ph type="subTitle"/>
-          </p:nvPr>
-        </p:nvSpPr>
-        <p:spPr>
-          <a:xfrm>
-            <a:off x="540000" y="3420000"/>
-            <a:ext cx="8998920" cy="898920"/>
-          </a:xfrm>
-          <a:prstGeom prst="rect">
-            <a:avLst/>
-          </a:prstGeom>
-          <a:noFill/>
-          <a:ln w="0">
-            <a:noFill/>
-          </a:ln>
-        </p:spPr>
-        <p:txBody>
-          <a:bodyPr lIns="0" rIns="0" tIns="0" bIns="0" anchor="ctr">
-            <a:noAutofit/>
-          </a:bodyPr>
-          <a:p>
-            <a:pPr algn="ctr">
-              <a:lnSpc>
-                <a:spcPct val="100000"/>
-              </a:lnSpc>
-              <a:buNone/>
-            </a:pPr>
-            <a:r>
-              <a:rPr b="0" lang="en-US" sz="1200" spc="-1" strike="noStrike">
-                <a:latin typeface="Lucida Sans"/>
+                <a:latin typeface="Calibri"/>
               </a:rPr>
               <a:t>Only the DeepL text-translation API and not the DeepL document translation API is used. That saves translation costs because with the document translation API “you are billed a minimum of 50,000 characters with the DeepL API plan, no matter how many characters are included in the document”, and allows translation of XLSX files that is not supported by the DeepL document translation API currently.</a:t>
             </a:r>
-            <a:endParaRPr b="0" lang="en-US" sz="1200" spc="-1" strike="noStrike">
+            <a:endParaRPr b="0" lang="en-US" sz="1400" spc="-1" strike="noStrike">
               <a:latin typeface="Arial"/>
             </a:endParaRPr>
           </a:p>
@@ -10006,7 +6482,7 @@
       </p:grpSpPr>
       <p:sp>
         <p:nvSpPr>
-          <p:cNvPr id="186" name="PlaceHolder 1"/>
+          <p:cNvPr id="116" name="PlaceHolder 1"/>
           <p:cNvSpPr>
             <a:spLocks noGrp="1"/>
           </p:cNvSpPr>
@@ -10017,7 +6493,7 @@
         <p:spPr>
           <a:xfrm>
             <a:off x="602280" y="1470240"/>
-            <a:ext cx="8998920" cy="3238920"/>
+            <a:ext cx="8998200" cy="3238200"/>
           </a:xfrm>
           <a:prstGeom prst="rect">
             <a:avLst/>
@@ -10040,7 +6516,7 @@
             </a:pPr>
             <a:r>
               <a:rPr b="0" lang="en-US" sz="1300" spc="-1" strike="noStrike">
-                <a:latin typeface="Lucida Console"/>
+                <a:latin typeface="Cascadia Mono"/>
               </a:rPr>
               <a:t>Syntax: TranslateOoxml sourceFile targetLanguage</a:t>
             </a:r>
@@ -10068,7 +6544,7 @@
             </a:pPr>
             <a:r>
               <a:rPr b="0" lang="en-US" sz="1300" spc="-1" strike="noStrike">
-                <a:latin typeface="Lucida Console"/>
+                <a:latin typeface="Cascadia Mono"/>
               </a:rPr>
               <a:t>The source file can be a .docx, .pptx, or .xlsx one.</a:t>
             </a:r>
@@ -10096,7 +6572,7 @@
             </a:pPr>
             <a:r>
               <a:rPr b="0" lang="en-US" sz="1300" spc="-1" strike="noStrike">
-                <a:latin typeface="Lucida Console"/>
+                <a:latin typeface="Cascadia Mono"/>
               </a:rPr>
               <a:t>The target file will appear in the same folder where the source file resides.</a:t>
             </a:r>
@@ -10113,7 +6589,7 @@
             </a:pPr>
             <a:r>
               <a:rPr b="0" lang="en-US" sz="1300" spc="-1" strike="noStrike">
-                <a:latin typeface="Lucida Console"/>
+                <a:latin typeface="Cascadia Mono"/>
               </a:rPr>
               <a:t>The target file name will have the target language as a suffix.</a:t>
             </a:r>
@@ -10141,7 +6617,7 @@
             </a:pPr>
             <a:r>
               <a:rPr b="0" lang="en-US" sz="1300" spc="-1" strike="noStrike">
-                <a:latin typeface="Lucida Console"/>
+                <a:latin typeface="Cascadia Mono"/>
               </a:rPr>
               <a:t>The environment variable DEEPL_AUTH_KEY should be set.</a:t>
             </a:r>
@@ -10190,12 +6666,12 @@
               <a:buNone/>
             </a:pPr>
             <a:r>
-              <a:rPr b="0" lang="en-US" sz="1300" spc="-1" strike="noStrike">
-                <a:latin typeface="Lucida Sans"/>
+              <a:rPr b="0" lang="en-US" sz="1400" spc="-1" strike="noStrike">
+                <a:latin typeface="Calibri"/>
               </a:rPr>
               <a:t>The following files in this folder are machine translations to German:</a:t>
             </a:r>
-            <a:endParaRPr b="0" lang="en-US" sz="1300" spc="-1" strike="noStrike">
+            <a:endParaRPr b="0" lang="en-US" sz="1400" spc="-1" strike="noStrike">
               <a:latin typeface="Arial"/>
             </a:endParaRPr>
           </a:p>
@@ -10219,7 +6695,7 @@
             </a:pPr>
             <a:r>
               <a:rPr b="0" lang="en-US" sz="1300" spc="-1" strike="noStrike">
-                <a:latin typeface="Lucida Console"/>
+                <a:latin typeface="Cascadia Mono"/>
               </a:rPr>
               <a:t>Info_DE.docx</a:t>
             </a:r>
@@ -10236,7 +6712,7 @@
             </a:pPr>
             <a:r>
               <a:rPr b="0" lang="en-US" sz="1300" spc="-1" strike="noStrike">
-                <a:latin typeface="Lucida Console"/>
+                <a:latin typeface="Cascadia Mono"/>
               </a:rPr>
               <a:t>Info_DE.pptx</a:t>
             </a:r>
@@ -10253,7 +6729,7 @@
             </a:pPr>
             <a:r>
               <a:rPr b="0" lang="en-US" sz="1300" spc="-1" strike="noStrike">
-                <a:latin typeface="Lucida Console"/>
+                <a:latin typeface="Cascadia Mono"/>
               </a:rPr>
               <a:t>Info_DE.xlsx</a:t>
             </a:r>
@@ -10500,230 +6976,4 @@
     </a:fmtScheme>
   </a:themeElements>
 </a:theme>
-</file>
-
-<file path=ppt/theme/theme2.xml><?xml version="1.0" encoding="utf-8"?>
-<a:theme xmlns:a="http://schemas.openxmlformats.org/drawingml/2006/main" name="Office Theme">
-  <a:themeElements>
-    <a:clrScheme name="Office">
-      <a:dk1>
-        <a:sysClr val="windowText" lastClr="000000"/>
-      </a:dk1>
-      <a:lt1>
-        <a:sysClr val="window" lastClr="FFFFFF"/>
-      </a:lt1>
-      <a:dk2>
-        <a:srgbClr val="1f497d"/>
-      </a:dk2>
-      <a:lt2>
-        <a:srgbClr val="eeece1"/>
-      </a:lt2>
-      <a:accent1>
-        <a:srgbClr val="4f81bd"/>
-      </a:accent1>
-      <a:accent2>
-        <a:srgbClr val="c0504d"/>
-      </a:accent2>
-      <a:accent3>
-        <a:srgbClr val="9bbb59"/>
-      </a:accent3>
-      <a:accent4>
-        <a:srgbClr val="8064a2"/>
-      </a:accent4>
-      <a:accent5>
-        <a:srgbClr val="4bacc6"/>
-      </a:accent5>
-      <a:accent6>
-        <a:srgbClr val="f79646"/>
-      </a:accent6>
-      <a:hlink>
-        <a:srgbClr val="0000ff"/>
-      </a:hlink>
-      <a:folHlink>
-        <a:srgbClr val="800080"/>
-      </a:folHlink>
-    </a:clrScheme>
-    <a:fontScheme name="Office">
-      <a:majorFont>
-        <a:latin typeface="Arial"/>
-        <a:ea typeface="DejaVu Sans"/>
-        <a:cs typeface="DejaVu Sans"/>
-      </a:majorFont>
-      <a:minorFont>
-        <a:latin typeface="Arial"/>
-        <a:ea typeface="DejaVu Sans"/>
-        <a:cs typeface="DejaVu Sans"/>
-      </a:minorFont>
-    </a:fontScheme>
-    <a:fmtScheme name="Office">
-      <a:fillStyleLst>
-        <a:solidFill>
-          <a:schemeClr val="phClr"/>
-        </a:solidFill>
-        <a:gradFill rotWithShape="1">
-          <a:gsLst>
-            <a:gs pos="0">
-              <a:schemeClr val="phClr">
-                <a:tint val="50000"/>
-                <a:satMod val="300000"/>
-              </a:schemeClr>
-            </a:gs>
-            <a:gs pos="35000">
-              <a:schemeClr val="phClr">
-                <a:tint val="37000"/>
-                <a:satMod val="300000"/>
-              </a:schemeClr>
-            </a:gs>
-            <a:gs pos="100000">
-              <a:schemeClr val="phClr">
-                <a:tint val="15000"/>
-                <a:satMod val="350000"/>
-              </a:schemeClr>
-            </a:gs>
-          </a:gsLst>
-          <a:lin ang="16200000" scaled="1"/>
-        </a:gradFill>
-        <a:gradFill rotWithShape="1">
-          <a:gsLst>
-            <a:gs pos="0">
-              <a:schemeClr val="phClr">
-                <a:shade val="51000"/>
-                <a:satMod val="130000"/>
-              </a:schemeClr>
-            </a:gs>
-            <a:gs pos="80000">
-              <a:schemeClr val="phClr">
-                <a:shade val="93000"/>
-                <a:satMod val="130000"/>
-              </a:schemeClr>
-            </a:gs>
-            <a:gs pos="100000">
-              <a:schemeClr val="phClr">
-                <a:shade val="94000"/>
-                <a:satMod val="135000"/>
-              </a:schemeClr>
-            </a:gs>
-          </a:gsLst>
-          <a:lin ang="16200000" scaled="0"/>
-        </a:gradFill>
-      </a:fillStyleLst>
-      <a:lnStyleLst>
-        <a:ln w="9525" cap="flat" cmpd="sng" algn="ctr">
-          <a:solidFill>
-            <a:schemeClr val="phClr">
-              <a:shade val="95000"/>
-              <a:satMod val="105000"/>
-            </a:schemeClr>
-          </a:solidFill>
-          <a:prstDash val="solid"/>
-          <a:miter/>
-        </a:ln>
-        <a:ln w="25400" cap="flat" cmpd="sng" algn="ctr">
-          <a:solidFill>
-            <a:schemeClr val="phClr"/>
-          </a:solidFill>
-          <a:prstDash val="solid"/>
-          <a:miter/>
-        </a:ln>
-        <a:ln w="38100" cap="flat" cmpd="sng" algn="ctr">
-          <a:solidFill>
-            <a:schemeClr val="phClr"/>
-          </a:solidFill>
-          <a:prstDash val="solid"/>
-          <a:miter/>
-        </a:ln>
-      </a:lnStyleLst>
-      <a:effectStyleLst>
-        <a:effectStyle>
-          <a:effectLst>
-            <a:outerShdw blurRad="40000" dist="20000" dir="5400000" rotWithShape="0">
-              <a:srgbClr val="000000">
-                <a:alpha val="38000"/>
-              </a:srgbClr>
-            </a:outerShdw>
-          </a:effectLst>
-        </a:effectStyle>
-        <a:effectStyle>
-          <a:effectLst>
-            <a:outerShdw blurRad="40000" dist="23000" dir="5400000" rotWithShape="0">
-              <a:srgbClr val="000000">
-                <a:alpha val="35000"/>
-              </a:srgbClr>
-            </a:outerShdw>
-          </a:effectLst>
-        </a:effectStyle>
-        <a:effectStyle>
-          <a:effectLst>
-            <a:outerShdw blurRad="40000" dist="23000" dir="5400000" rotWithShape="0">
-              <a:srgbClr val="000000">
-                <a:alpha val="35000"/>
-              </a:srgbClr>
-            </a:outerShdw>
-          </a:effectLst>
-          <a:scene3d>
-            <a:camera prst="orthographicFront">
-              <a:rot lat="0" lon="0" rev="0"/>
-            </a:camera>
-            <a:lightRig rig="threePt" dir="t">
-              <a:rot lat="0" lon="0" rev="1200000"/>
-            </a:lightRig>
-          </a:scene3d>
-          <a:sp3d>
-            <a:bevelT w="63500" h="25400"/>
-          </a:sp3d>
-        </a:effectStyle>
-      </a:effectStyleLst>
-      <a:bgFillStyleLst>
-        <a:solidFill>
-          <a:schemeClr val="phClr"/>
-        </a:solidFill>
-        <a:gradFill rotWithShape="1">
-          <a:gsLst>
-            <a:gs pos="0">
-              <a:schemeClr val="phClr">
-                <a:tint val="40000"/>
-                <a:satMod val="350000"/>
-              </a:schemeClr>
-            </a:gs>
-            <a:gs pos="40000">
-              <a:schemeClr val="phClr">
-                <a:tint val="45000"/>
-                <a:shade val="99000"/>
-                <a:satMod val="350000"/>
-              </a:schemeClr>
-            </a:gs>
-            <a:gs pos="100000">
-              <a:schemeClr val="phClr">
-                <a:shade val="20000"/>
-                <a:satMod val="255000"/>
-              </a:schemeClr>
-            </a:gs>
-          </a:gsLst>
-          <a:path path="circle">
-            <a:fillToRect l="50000" t="-80000" r="50000" b="180000"/>
-          </a:path>
-        </a:gradFill>
-        <a:gradFill rotWithShape="1">
-          <a:gsLst>
-            <a:gs pos="0">
-              <a:schemeClr val="phClr">
-                <a:tint val="80000"/>
-                <a:satMod val="300000"/>
-              </a:schemeClr>
-            </a:gs>
-            <a:gs pos="100000">
-              <a:schemeClr val="phClr">
-                <a:shade val="30000"/>
-                <a:satMod val="200000"/>
-              </a:schemeClr>
-            </a:gs>
-          </a:gsLst>
-          <a:path path="circle">
-            <a:fillToRect l="50000" t="50000" r="50000" b="50000"/>
-          </a:path>
-        </a:gradFill>
-      </a:bgFillStyleLst>
-    </a:fmtScheme>
-  </a:themeElements>
-</a:theme>
 </file>
</xml_diff>

<commit_message>
Add language code information to the help
</commit_message>
<xml_diff>
--- a/Info.pptx
+++ b/Info.pptx
@@ -1563,7 +1563,7 @@
         <p:spPr>
           <a:xfrm>
             <a:off x="-54000" y="18720"/>
-            <a:ext cx="700200" cy="700200"/>
+            <a:ext cx="699840" cy="699840"/>
           </a:xfrm>
           <a:custGeom>
             <a:avLst/>
@@ -1623,7 +1623,7 @@
         <p:spPr>
           <a:xfrm>
             <a:off x="-414000" y="558720"/>
-            <a:ext cx="700200" cy="700200"/>
+            <a:ext cx="699840" cy="699840"/>
           </a:xfrm>
           <a:custGeom>
             <a:avLst/>
@@ -1683,7 +1683,7 @@
         <p:spPr>
           <a:xfrm>
             <a:off x="1350000" y="18720"/>
-            <a:ext cx="700200" cy="700200"/>
+            <a:ext cx="699840" cy="699840"/>
           </a:xfrm>
           <a:custGeom>
             <a:avLst/>
@@ -1743,7 +1743,7 @@
         <p:spPr>
           <a:xfrm>
             <a:off x="648000" y="18720"/>
-            <a:ext cx="700200" cy="700200"/>
+            <a:ext cx="699840" cy="699840"/>
           </a:xfrm>
           <a:custGeom>
             <a:avLst/>
@@ -1803,7 +1803,7 @@
         <p:spPr>
           <a:xfrm>
             <a:off x="990000" y="558720"/>
-            <a:ext cx="700200" cy="700200"/>
+            <a:ext cx="699840" cy="699840"/>
           </a:xfrm>
           <a:custGeom>
             <a:avLst/>
@@ -1863,7 +1863,7 @@
         <p:spPr>
           <a:xfrm>
             <a:off x="2394000" y="558720"/>
-            <a:ext cx="700200" cy="700200"/>
+            <a:ext cx="699840" cy="699840"/>
           </a:xfrm>
           <a:custGeom>
             <a:avLst/>
@@ -1923,7 +1923,7 @@
         <p:spPr>
           <a:xfrm>
             <a:off x="1692000" y="558720"/>
-            <a:ext cx="700200" cy="700200"/>
+            <a:ext cx="699840" cy="699840"/>
           </a:xfrm>
           <a:custGeom>
             <a:avLst/>
@@ -1983,7 +1983,7 @@
         <p:spPr>
           <a:xfrm>
             <a:off x="2754000" y="18720"/>
-            <a:ext cx="700200" cy="700200"/>
+            <a:ext cx="699840" cy="699840"/>
           </a:xfrm>
           <a:custGeom>
             <a:avLst/>
@@ -2043,7 +2043,7 @@
         <p:spPr>
           <a:xfrm>
             <a:off x="2052000" y="720"/>
-            <a:ext cx="700200" cy="700200"/>
+            <a:ext cx="699840" cy="699840"/>
           </a:xfrm>
           <a:custGeom>
             <a:avLst/>
@@ -2103,7 +2103,7 @@
         <p:spPr>
           <a:xfrm>
             <a:off x="3456000" y="18720"/>
-            <a:ext cx="700200" cy="700200"/>
+            <a:ext cx="699840" cy="699840"/>
           </a:xfrm>
           <a:custGeom>
             <a:avLst/>
@@ -2163,7 +2163,7 @@
         <p:spPr>
           <a:xfrm>
             <a:off x="3096000" y="558720"/>
-            <a:ext cx="700200" cy="700200"/>
+            <a:ext cx="699840" cy="699840"/>
           </a:xfrm>
           <a:custGeom>
             <a:avLst/>
@@ -2223,7 +2223,7 @@
         <p:spPr>
           <a:xfrm>
             <a:off x="4140000" y="18720"/>
-            <a:ext cx="700200" cy="700200"/>
+            <a:ext cx="699840" cy="699840"/>
           </a:xfrm>
           <a:custGeom>
             <a:avLst/>
@@ -2283,7 +2283,7 @@
         <p:spPr>
           <a:xfrm>
             <a:off x="4500000" y="558720"/>
-            <a:ext cx="700200" cy="700200"/>
+            <a:ext cx="699840" cy="699840"/>
           </a:xfrm>
           <a:custGeom>
             <a:avLst/>
@@ -2343,7 +2343,7 @@
         <p:spPr>
           <a:xfrm>
             <a:off x="3798000" y="558720"/>
-            <a:ext cx="700200" cy="700200"/>
+            <a:ext cx="699840" cy="699840"/>
           </a:xfrm>
           <a:custGeom>
             <a:avLst/>
@@ -2403,7 +2403,7 @@
         <p:spPr>
           <a:xfrm>
             <a:off x="5526000" y="18720"/>
-            <a:ext cx="700200" cy="700200"/>
+            <a:ext cx="699840" cy="699840"/>
           </a:xfrm>
           <a:custGeom>
             <a:avLst/>
@@ -2463,7 +2463,7 @@
         <p:spPr>
           <a:xfrm>
             <a:off x="4842000" y="18720"/>
-            <a:ext cx="700200" cy="700200"/>
+            <a:ext cx="699840" cy="699840"/>
           </a:xfrm>
           <a:custGeom>
             <a:avLst/>
@@ -2523,7 +2523,7 @@
         <p:spPr>
           <a:xfrm>
             <a:off x="5202000" y="558720"/>
-            <a:ext cx="700200" cy="700200"/>
+            <a:ext cx="699840" cy="699840"/>
           </a:xfrm>
           <a:custGeom>
             <a:avLst/>
@@ -2583,7 +2583,7 @@
         <p:spPr>
           <a:xfrm>
             <a:off x="6606000" y="558720"/>
-            <a:ext cx="700200" cy="700200"/>
+            <a:ext cx="699840" cy="699840"/>
           </a:xfrm>
           <a:custGeom>
             <a:avLst/>
@@ -2643,7 +2643,7 @@
         <p:spPr>
           <a:xfrm>
             <a:off x="5904000" y="558720"/>
-            <a:ext cx="700200" cy="700200"/>
+            <a:ext cx="699840" cy="699840"/>
           </a:xfrm>
           <a:custGeom>
             <a:avLst/>
@@ -2703,7 +2703,7 @@
         <p:spPr>
           <a:xfrm>
             <a:off x="6930000" y="18720"/>
-            <a:ext cx="700200" cy="700200"/>
+            <a:ext cx="699840" cy="699840"/>
           </a:xfrm>
           <a:custGeom>
             <a:avLst/>
@@ -2763,7 +2763,7 @@
         <p:spPr>
           <a:xfrm>
             <a:off x="6228000" y="18720"/>
-            <a:ext cx="700200" cy="700200"/>
+            <a:ext cx="699840" cy="699840"/>
           </a:xfrm>
           <a:custGeom>
             <a:avLst/>
@@ -2823,7 +2823,7 @@
         <p:spPr>
           <a:xfrm>
             <a:off x="7632000" y="18720"/>
-            <a:ext cx="700200" cy="700200"/>
+            <a:ext cx="699840" cy="699840"/>
           </a:xfrm>
           <a:custGeom>
             <a:avLst/>
@@ -2883,7 +2883,7 @@
         <p:spPr>
           <a:xfrm>
             <a:off x="7308000" y="558720"/>
-            <a:ext cx="700200" cy="700200"/>
+            <a:ext cx="699840" cy="699840"/>
           </a:xfrm>
           <a:custGeom>
             <a:avLst/>
@@ -2943,7 +2943,7 @@
         <p:spPr>
           <a:xfrm>
             <a:off x="8334000" y="19080"/>
-            <a:ext cx="700200" cy="700200"/>
+            <a:ext cx="699840" cy="699840"/>
           </a:xfrm>
           <a:custGeom>
             <a:avLst/>
@@ -3003,7 +3003,7 @@
         <p:spPr>
           <a:xfrm>
             <a:off x="8010000" y="559080"/>
-            <a:ext cx="700200" cy="700200"/>
+            <a:ext cx="699840" cy="699840"/>
           </a:xfrm>
           <a:custGeom>
             <a:avLst/>
@@ -3063,7 +3063,7 @@
         <p:spPr>
           <a:xfrm>
             <a:off x="9414000" y="559080"/>
-            <a:ext cx="700200" cy="700200"/>
+            <a:ext cx="699840" cy="699840"/>
           </a:xfrm>
           <a:custGeom>
             <a:avLst/>
@@ -3123,7 +3123,7 @@
         <p:spPr>
           <a:xfrm>
             <a:off x="8712000" y="559080"/>
-            <a:ext cx="700200" cy="700200"/>
+            <a:ext cx="699840" cy="699840"/>
           </a:xfrm>
           <a:custGeom>
             <a:avLst/>
@@ -3183,7 +3183,7 @@
         <p:spPr>
           <a:xfrm>
             <a:off x="9738000" y="19080"/>
-            <a:ext cx="700200" cy="700200"/>
+            <a:ext cx="699840" cy="699840"/>
           </a:xfrm>
           <a:custGeom>
             <a:avLst/>
@@ -3243,7 +3243,7 @@
         <p:spPr>
           <a:xfrm>
             <a:off x="9036000" y="19080"/>
-            <a:ext cx="700200" cy="700200"/>
+            <a:ext cx="699840" cy="699840"/>
           </a:xfrm>
           <a:custGeom>
             <a:avLst/>
@@ -3303,7 +3303,7 @@
         <p:spPr>
           <a:xfrm>
             <a:off x="288000" y="558720"/>
-            <a:ext cx="700200" cy="700200"/>
+            <a:ext cx="699840" cy="699840"/>
           </a:xfrm>
           <a:custGeom>
             <a:avLst/>
@@ -3362,10 +3362,10 @@
         </p:nvGrpSpPr>
         <p:grpSpPr>
           <a:xfrm>
-            <a:off x="-361800" y="4895640"/>
-            <a:ext cx="10852200" cy="1258560"/>
-            <a:chOff x="-361800" y="4895640"/>
-            <a:chExt cx="10852200" cy="1258560"/>
+            <a:off x="-362160" y="4895640"/>
+            <a:ext cx="10851840" cy="1258200"/>
+            <a:chOff x="-362160" y="4895640"/>
+            <a:chExt cx="10851840" cy="1258200"/>
           </a:xfrm>
         </p:grpSpPr>
         <p:sp>
@@ -3377,7 +3377,7 @@
           <p:spPr>
             <a:xfrm flipH="1">
               <a:off x="9429840" y="4913640"/>
-              <a:ext cx="700200" cy="700200"/>
+              <a:ext cx="699840" cy="699840"/>
             </a:xfrm>
             <a:custGeom>
               <a:avLst/>
@@ -3437,7 +3437,7 @@
           <p:spPr>
             <a:xfrm flipH="1">
               <a:off x="9789840" y="5453640"/>
-              <a:ext cx="700200" cy="700200"/>
+              <a:ext cx="699840" cy="699840"/>
             </a:xfrm>
             <a:custGeom>
               <a:avLst/>
@@ -3497,7 +3497,7 @@
           <p:spPr>
             <a:xfrm flipH="1">
               <a:off x="8025840" y="4913640"/>
-              <a:ext cx="700200" cy="700200"/>
+              <a:ext cx="699840" cy="699840"/>
             </a:xfrm>
             <a:custGeom>
               <a:avLst/>
@@ -3557,7 +3557,7 @@
           <p:spPr>
             <a:xfrm flipH="1">
               <a:off x="8727840" y="4913640"/>
-              <a:ext cx="700200" cy="700200"/>
+              <a:ext cx="699840" cy="699840"/>
             </a:xfrm>
             <a:custGeom>
               <a:avLst/>
@@ -3617,7 +3617,7 @@
           <p:spPr>
             <a:xfrm flipH="1">
               <a:off x="8385840" y="5453640"/>
-              <a:ext cx="700200" cy="700200"/>
+              <a:ext cx="699840" cy="699840"/>
             </a:xfrm>
             <a:custGeom>
               <a:avLst/>
@@ -3677,7 +3677,7 @@
           <p:spPr>
             <a:xfrm flipH="1">
               <a:off x="6981840" y="5453640"/>
-              <a:ext cx="700200" cy="700200"/>
+              <a:ext cx="699840" cy="699840"/>
             </a:xfrm>
             <a:custGeom>
               <a:avLst/>
@@ -3737,7 +3737,7 @@
           <p:spPr>
             <a:xfrm flipH="1">
               <a:off x="7683840" y="5453640"/>
-              <a:ext cx="700200" cy="700200"/>
+              <a:ext cx="699840" cy="699840"/>
             </a:xfrm>
             <a:custGeom>
               <a:avLst/>
@@ -3797,7 +3797,7 @@
           <p:spPr>
             <a:xfrm flipH="1">
               <a:off x="6621840" y="4913640"/>
-              <a:ext cx="700200" cy="700200"/>
+              <a:ext cx="699840" cy="699840"/>
             </a:xfrm>
             <a:custGeom>
               <a:avLst/>
@@ -3857,7 +3857,7 @@
           <p:spPr>
             <a:xfrm flipH="1">
               <a:off x="7323840" y="4895640"/>
-              <a:ext cx="700200" cy="700200"/>
+              <a:ext cx="699840" cy="699840"/>
             </a:xfrm>
             <a:custGeom>
               <a:avLst/>
@@ -3917,7 +3917,7 @@
           <p:spPr>
             <a:xfrm flipH="1">
               <a:off x="5919840" y="4913640"/>
-              <a:ext cx="700200" cy="700200"/>
+              <a:ext cx="699840" cy="699840"/>
             </a:xfrm>
             <a:custGeom>
               <a:avLst/>
@@ -3977,7 +3977,7 @@
           <p:spPr>
             <a:xfrm flipH="1">
               <a:off x="6279840" y="5453640"/>
-              <a:ext cx="700200" cy="700200"/>
+              <a:ext cx="699840" cy="699840"/>
             </a:xfrm>
             <a:custGeom>
               <a:avLst/>
@@ -4037,7 +4037,7 @@
           <p:spPr>
             <a:xfrm flipH="1">
               <a:off x="5235840" y="4913640"/>
-              <a:ext cx="700200" cy="700200"/>
+              <a:ext cx="699840" cy="699840"/>
             </a:xfrm>
             <a:custGeom>
               <a:avLst/>
@@ -4097,7 +4097,7 @@
           <p:spPr>
             <a:xfrm flipH="1">
               <a:off x="4875840" y="5453640"/>
-              <a:ext cx="700200" cy="700200"/>
+              <a:ext cx="699840" cy="699840"/>
             </a:xfrm>
             <a:custGeom>
               <a:avLst/>
@@ -4157,7 +4157,7 @@
           <p:spPr>
             <a:xfrm flipH="1">
               <a:off x="5577840" y="5453640"/>
-              <a:ext cx="700200" cy="700200"/>
+              <a:ext cx="699840" cy="699840"/>
             </a:xfrm>
             <a:custGeom>
               <a:avLst/>
@@ -4217,7 +4217,7 @@
           <p:spPr>
             <a:xfrm flipH="1">
               <a:off x="3849840" y="4913640"/>
-              <a:ext cx="700200" cy="700200"/>
+              <a:ext cx="699840" cy="699840"/>
             </a:xfrm>
             <a:custGeom>
               <a:avLst/>
@@ -4277,7 +4277,7 @@
           <p:spPr>
             <a:xfrm flipH="1">
               <a:off x="4533840" y="4913640"/>
-              <a:ext cx="700200" cy="700200"/>
+              <a:ext cx="699840" cy="699840"/>
             </a:xfrm>
             <a:custGeom>
               <a:avLst/>
@@ -4337,7 +4337,7 @@
           <p:spPr>
             <a:xfrm flipH="1">
               <a:off x="4173840" y="5453640"/>
-              <a:ext cx="700200" cy="700200"/>
+              <a:ext cx="699840" cy="699840"/>
             </a:xfrm>
             <a:custGeom>
               <a:avLst/>
@@ -4397,7 +4397,7 @@
           <p:spPr>
             <a:xfrm flipH="1">
               <a:off x="2769840" y="5453640"/>
-              <a:ext cx="700200" cy="700200"/>
+              <a:ext cx="699840" cy="699840"/>
             </a:xfrm>
             <a:custGeom>
               <a:avLst/>
@@ -4457,7 +4457,7 @@
           <p:spPr>
             <a:xfrm flipH="1">
               <a:off x="3471840" y="5453640"/>
-              <a:ext cx="700200" cy="700200"/>
+              <a:ext cx="699840" cy="699840"/>
             </a:xfrm>
             <a:custGeom>
               <a:avLst/>
@@ -4517,7 +4517,7 @@
           <p:spPr>
             <a:xfrm flipH="1">
               <a:off x="2445840" y="4913640"/>
-              <a:ext cx="700200" cy="700200"/>
+              <a:ext cx="699840" cy="699840"/>
             </a:xfrm>
             <a:custGeom>
               <a:avLst/>
@@ -4577,7 +4577,7 @@
           <p:spPr>
             <a:xfrm flipH="1">
               <a:off x="3147840" y="4913640"/>
-              <a:ext cx="700200" cy="700200"/>
+              <a:ext cx="699840" cy="699840"/>
             </a:xfrm>
             <a:custGeom>
               <a:avLst/>
@@ -4637,7 +4637,7 @@
           <p:spPr>
             <a:xfrm flipH="1">
               <a:off x="1743840" y="4913640"/>
-              <a:ext cx="700200" cy="700200"/>
+              <a:ext cx="699840" cy="699840"/>
             </a:xfrm>
             <a:custGeom>
               <a:avLst/>
@@ -4697,7 +4697,7 @@
           <p:spPr>
             <a:xfrm flipH="1">
               <a:off x="2067840" y="5453640"/>
-              <a:ext cx="700200" cy="700200"/>
+              <a:ext cx="699840" cy="699840"/>
             </a:xfrm>
             <a:custGeom>
               <a:avLst/>
@@ -4757,7 +4757,7 @@
           <p:spPr>
             <a:xfrm flipH="1">
               <a:off x="1041840" y="4914000"/>
-              <a:ext cx="700200" cy="700200"/>
+              <a:ext cx="699840" cy="699840"/>
             </a:xfrm>
             <a:custGeom>
               <a:avLst/>
@@ -4817,7 +4817,7 @@
           <p:spPr>
             <a:xfrm flipH="1">
               <a:off x="1365840" y="5454000"/>
-              <a:ext cx="700200" cy="700200"/>
+              <a:ext cx="699840" cy="699840"/>
             </a:xfrm>
             <a:custGeom>
               <a:avLst/>
@@ -4877,7 +4877,7 @@
           <p:spPr>
             <a:xfrm flipH="1">
               <a:off x="-38160" y="5454000"/>
-              <a:ext cx="700200" cy="700200"/>
+              <a:ext cx="699840" cy="699840"/>
             </a:xfrm>
             <a:custGeom>
               <a:avLst/>
@@ -4937,7 +4937,7 @@
           <p:spPr>
             <a:xfrm flipH="1">
               <a:off x="663840" y="5454000"/>
-              <a:ext cx="700200" cy="700200"/>
+              <a:ext cx="699840" cy="699840"/>
             </a:xfrm>
             <a:custGeom>
               <a:avLst/>
@@ -4997,7 +4997,7 @@
           <p:spPr>
             <a:xfrm flipH="1">
               <a:off x="-362160" y="4914000"/>
-              <a:ext cx="700200" cy="700200"/>
+              <a:ext cx="699840" cy="699840"/>
             </a:xfrm>
             <a:custGeom>
               <a:avLst/>
@@ -5057,7 +5057,7 @@
           <p:spPr>
             <a:xfrm flipH="1">
               <a:off x="339840" y="4914000"/>
-              <a:ext cx="700200" cy="700200"/>
+              <a:ext cx="699840" cy="699840"/>
             </a:xfrm>
             <a:custGeom>
               <a:avLst/>
@@ -5117,7 +5117,7 @@
           <p:spPr>
             <a:xfrm flipH="1">
               <a:off x="9087840" y="5453640"/>
-              <a:ext cx="700200" cy="700200"/>
+              <a:ext cx="699840" cy="699840"/>
             </a:xfrm>
             <a:custGeom>
               <a:avLst/>
@@ -5178,7 +5178,7 @@
         <p:spPr>
           <a:xfrm>
             <a:off x="-414000" y="-520920"/>
-            <a:ext cx="700200" cy="700200"/>
+            <a:ext cx="699840" cy="699840"/>
           </a:xfrm>
           <a:custGeom>
             <a:avLst/>
@@ -5238,7 +5238,7 @@
         <p:spPr>
           <a:xfrm>
             <a:off x="990000" y="-520920"/>
-            <a:ext cx="700200" cy="700200"/>
+            <a:ext cx="699840" cy="699840"/>
           </a:xfrm>
           <a:custGeom>
             <a:avLst/>
@@ -5298,7 +5298,7 @@
         <p:spPr>
           <a:xfrm>
             <a:off x="2394000" y="-520920"/>
-            <a:ext cx="700200" cy="700200"/>
+            <a:ext cx="699840" cy="699840"/>
           </a:xfrm>
           <a:custGeom>
             <a:avLst/>
@@ -5358,7 +5358,7 @@
         <p:spPr>
           <a:xfrm>
             <a:off x="1692000" y="-520920"/>
-            <a:ext cx="700200" cy="700200"/>
+            <a:ext cx="699840" cy="699840"/>
           </a:xfrm>
           <a:custGeom>
             <a:avLst/>
@@ -5418,7 +5418,7 @@
         <p:spPr>
           <a:xfrm>
             <a:off x="3096000" y="-520920"/>
-            <a:ext cx="700200" cy="700200"/>
+            <a:ext cx="699840" cy="699840"/>
           </a:xfrm>
           <a:custGeom>
             <a:avLst/>
@@ -5478,7 +5478,7 @@
         <p:spPr>
           <a:xfrm>
             <a:off x="4500000" y="-520920"/>
-            <a:ext cx="700200" cy="700200"/>
+            <a:ext cx="699840" cy="699840"/>
           </a:xfrm>
           <a:custGeom>
             <a:avLst/>
@@ -5538,7 +5538,7 @@
         <p:spPr>
           <a:xfrm>
             <a:off x="3798000" y="-520920"/>
-            <a:ext cx="700200" cy="700200"/>
+            <a:ext cx="699840" cy="699840"/>
           </a:xfrm>
           <a:custGeom>
             <a:avLst/>
@@ -5598,7 +5598,7 @@
         <p:spPr>
           <a:xfrm>
             <a:off x="5202000" y="-520920"/>
-            <a:ext cx="700200" cy="700200"/>
+            <a:ext cx="699840" cy="699840"/>
           </a:xfrm>
           <a:custGeom>
             <a:avLst/>
@@ -5658,7 +5658,7 @@
         <p:spPr>
           <a:xfrm>
             <a:off x="6606000" y="-520920"/>
-            <a:ext cx="700200" cy="700200"/>
+            <a:ext cx="699840" cy="699840"/>
           </a:xfrm>
           <a:custGeom>
             <a:avLst/>
@@ -5718,7 +5718,7 @@
         <p:spPr>
           <a:xfrm>
             <a:off x="5904000" y="-520920"/>
-            <a:ext cx="700200" cy="700200"/>
+            <a:ext cx="699840" cy="699840"/>
           </a:xfrm>
           <a:custGeom>
             <a:avLst/>
@@ -5778,7 +5778,7 @@
         <p:spPr>
           <a:xfrm>
             <a:off x="7308000" y="-520920"/>
-            <a:ext cx="700200" cy="700200"/>
+            <a:ext cx="699840" cy="699840"/>
           </a:xfrm>
           <a:custGeom>
             <a:avLst/>
@@ -5838,7 +5838,7 @@
         <p:spPr>
           <a:xfrm>
             <a:off x="8010000" y="-520560"/>
-            <a:ext cx="700200" cy="700200"/>
+            <a:ext cx="699840" cy="699840"/>
           </a:xfrm>
           <a:custGeom>
             <a:avLst/>
@@ -5898,7 +5898,7 @@
         <p:spPr>
           <a:xfrm>
             <a:off x="9414000" y="-520560"/>
-            <a:ext cx="700200" cy="700200"/>
+            <a:ext cx="699840" cy="699840"/>
           </a:xfrm>
           <a:custGeom>
             <a:avLst/>
@@ -5958,7 +5958,7 @@
         <p:spPr>
           <a:xfrm>
             <a:off x="8712000" y="-520560"/>
-            <a:ext cx="700200" cy="700200"/>
+            <a:ext cx="699840" cy="699840"/>
           </a:xfrm>
           <a:custGeom>
             <a:avLst/>
@@ -6018,7 +6018,7 @@
         <p:spPr>
           <a:xfrm>
             <a:off x="288000" y="-520920"/>
-            <a:ext cx="700200" cy="700200"/>
+            <a:ext cx="699840" cy="699840"/>
           </a:xfrm>
           <a:custGeom>
             <a:avLst/>
@@ -6345,7 +6345,7 @@
         <p:spPr>
           <a:xfrm>
             <a:off x="540000" y="1980000"/>
-            <a:ext cx="8998200" cy="1258200"/>
+            <a:ext cx="8997840" cy="1257840"/>
           </a:xfrm>
           <a:prstGeom prst="rect">
             <a:avLst/>
@@ -6417,7 +6417,7 @@
         <p:spPr>
           <a:xfrm>
             <a:off x="540000" y="3420000"/>
-            <a:ext cx="8998200" cy="898200"/>
+            <a:ext cx="8997840" cy="897840"/>
           </a:xfrm>
           <a:prstGeom prst="rect">
             <a:avLst/>
@@ -6493,7 +6493,7 @@
         <p:spPr>
           <a:xfrm>
             <a:off x="602280" y="1470240"/>
-            <a:ext cx="8998200" cy="3238200"/>
+            <a:ext cx="8997840" cy="3237840"/>
           </a:xfrm>
           <a:prstGeom prst="rect">
             <a:avLst/>
@@ -6505,7 +6505,7 @@
         </p:spPr>
         <p:txBody>
           <a:bodyPr lIns="0" rIns="0" tIns="0" bIns="0" anchor="t">
-            <a:normAutofit/>
+            <a:normAutofit fontScale="90000"/>
           </a:bodyPr>
           <a:p>
             <a:pPr>
@@ -6592,6 +6592,34 @@
                 <a:latin typeface="Cascadia Mono"/>
               </a:rPr>
               <a:t>The target file name will have the target language as a suffix.</a:t>
+            </a:r>
+            <a:endParaRPr b="0" lang="en-US" sz="1300" spc="-1" strike="noStrike">
+              <a:latin typeface="Arial"/>
+            </a:endParaRPr>
+          </a:p>
+          <a:p>
+            <a:pPr>
+              <a:lnSpc>
+                <a:spcPct val="100000"/>
+              </a:lnSpc>
+              <a:buNone/>
+            </a:pPr>
+            <a:endParaRPr b="0" lang="en-US" sz="1300" spc="-1" strike="noStrike">
+              <a:latin typeface="Arial"/>
+            </a:endParaRPr>
+          </a:p>
+          <a:p>
+            <a:pPr>
+              <a:lnSpc>
+                <a:spcPct val="100000"/>
+              </a:lnSpc>
+              <a:buNone/>
+            </a:pPr>
+            <a:r>
+              <a:rPr b="0" lang="en-US" sz="1300" spc="-1" strike="noStrike">
+                <a:latin typeface="Cascadia Mono"/>
+              </a:rPr>
+              <a:t>Language codes: https://www.deepl.com/docs-api/translate-text/translate-text/</a:t>
             </a:r>
             <a:endParaRPr b="0" lang="en-US" sz="1300" spc="-1" strike="noStrike">
               <a:latin typeface="Arial"/>

</xml_diff>

<commit_message>
Add 'code' after 'target language'
</commit_message>
<xml_diff>
--- a/Info.pptx
+++ b/Info.pptx
@@ -1563,7 +1563,7 @@
         <p:spPr>
           <a:xfrm>
             <a:off x="-54000" y="18720"/>
-            <a:ext cx="699840" cy="699840"/>
+            <a:ext cx="699480" cy="699480"/>
           </a:xfrm>
           <a:custGeom>
             <a:avLst/>
@@ -1623,7 +1623,7 @@
         <p:spPr>
           <a:xfrm>
             <a:off x="-414000" y="558720"/>
-            <a:ext cx="699840" cy="699840"/>
+            <a:ext cx="699480" cy="699480"/>
           </a:xfrm>
           <a:custGeom>
             <a:avLst/>
@@ -1683,7 +1683,7 @@
         <p:spPr>
           <a:xfrm>
             <a:off x="1350000" y="18720"/>
-            <a:ext cx="699840" cy="699840"/>
+            <a:ext cx="699480" cy="699480"/>
           </a:xfrm>
           <a:custGeom>
             <a:avLst/>
@@ -1743,7 +1743,7 @@
         <p:spPr>
           <a:xfrm>
             <a:off x="648000" y="18720"/>
-            <a:ext cx="699840" cy="699840"/>
+            <a:ext cx="699480" cy="699480"/>
           </a:xfrm>
           <a:custGeom>
             <a:avLst/>
@@ -1803,7 +1803,7 @@
         <p:spPr>
           <a:xfrm>
             <a:off x="990000" y="558720"/>
-            <a:ext cx="699840" cy="699840"/>
+            <a:ext cx="699480" cy="699480"/>
           </a:xfrm>
           <a:custGeom>
             <a:avLst/>
@@ -1863,7 +1863,7 @@
         <p:spPr>
           <a:xfrm>
             <a:off x="2394000" y="558720"/>
-            <a:ext cx="699840" cy="699840"/>
+            <a:ext cx="699480" cy="699480"/>
           </a:xfrm>
           <a:custGeom>
             <a:avLst/>
@@ -1923,7 +1923,7 @@
         <p:spPr>
           <a:xfrm>
             <a:off x="1692000" y="558720"/>
-            <a:ext cx="699840" cy="699840"/>
+            <a:ext cx="699480" cy="699480"/>
           </a:xfrm>
           <a:custGeom>
             <a:avLst/>
@@ -1983,7 +1983,7 @@
         <p:spPr>
           <a:xfrm>
             <a:off x="2754000" y="18720"/>
-            <a:ext cx="699840" cy="699840"/>
+            <a:ext cx="699480" cy="699480"/>
           </a:xfrm>
           <a:custGeom>
             <a:avLst/>
@@ -2043,7 +2043,7 @@
         <p:spPr>
           <a:xfrm>
             <a:off x="2052000" y="720"/>
-            <a:ext cx="699840" cy="699840"/>
+            <a:ext cx="699480" cy="699480"/>
           </a:xfrm>
           <a:custGeom>
             <a:avLst/>
@@ -2103,7 +2103,7 @@
         <p:spPr>
           <a:xfrm>
             <a:off x="3456000" y="18720"/>
-            <a:ext cx="699840" cy="699840"/>
+            <a:ext cx="699480" cy="699480"/>
           </a:xfrm>
           <a:custGeom>
             <a:avLst/>
@@ -2163,7 +2163,7 @@
         <p:spPr>
           <a:xfrm>
             <a:off x="3096000" y="558720"/>
-            <a:ext cx="699840" cy="699840"/>
+            <a:ext cx="699480" cy="699480"/>
           </a:xfrm>
           <a:custGeom>
             <a:avLst/>
@@ -2223,7 +2223,7 @@
         <p:spPr>
           <a:xfrm>
             <a:off x="4140000" y="18720"/>
-            <a:ext cx="699840" cy="699840"/>
+            <a:ext cx="699480" cy="699480"/>
           </a:xfrm>
           <a:custGeom>
             <a:avLst/>
@@ -2283,7 +2283,7 @@
         <p:spPr>
           <a:xfrm>
             <a:off x="4500000" y="558720"/>
-            <a:ext cx="699840" cy="699840"/>
+            <a:ext cx="699480" cy="699480"/>
           </a:xfrm>
           <a:custGeom>
             <a:avLst/>
@@ -2343,7 +2343,7 @@
         <p:spPr>
           <a:xfrm>
             <a:off x="3798000" y="558720"/>
-            <a:ext cx="699840" cy="699840"/>
+            <a:ext cx="699480" cy="699480"/>
           </a:xfrm>
           <a:custGeom>
             <a:avLst/>
@@ -2403,7 +2403,7 @@
         <p:spPr>
           <a:xfrm>
             <a:off x="5526000" y="18720"/>
-            <a:ext cx="699840" cy="699840"/>
+            <a:ext cx="699480" cy="699480"/>
           </a:xfrm>
           <a:custGeom>
             <a:avLst/>
@@ -2463,7 +2463,7 @@
         <p:spPr>
           <a:xfrm>
             <a:off x="4842000" y="18720"/>
-            <a:ext cx="699840" cy="699840"/>
+            <a:ext cx="699480" cy="699480"/>
           </a:xfrm>
           <a:custGeom>
             <a:avLst/>
@@ -2523,7 +2523,7 @@
         <p:spPr>
           <a:xfrm>
             <a:off x="5202000" y="558720"/>
-            <a:ext cx="699840" cy="699840"/>
+            <a:ext cx="699480" cy="699480"/>
           </a:xfrm>
           <a:custGeom>
             <a:avLst/>
@@ -2583,7 +2583,7 @@
         <p:spPr>
           <a:xfrm>
             <a:off x="6606000" y="558720"/>
-            <a:ext cx="699840" cy="699840"/>
+            <a:ext cx="699480" cy="699480"/>
           </a:xfrm>
           <a:custGeom>
             <a:avLst/>
@@ -2643,7 +2643,7 @@
         <p:spPr>
           <a:xfrm>
             <a:off x="5904000" y="558720"/>
-            <a:ext cx="699840" cy="699840"/>
+            <a:ext cx="699480" cy="699480"/>
           </a:xfrm>
           <a:custGeom>
             <a:avLst/>
@@ -2703,7 +2703,7 @@
         <p:spPr>
           <a:xfrm>
             <a:off x="6930000" y="18720"/>
-            <a:ext cx="699840" cy="699840"/>
+            <a:ext cx="699480" cy="699480"/>
           </a:xfrm>
           <a:custGeom>
             <a:avLst/>
@@ -2763,7 +2763,7 @@
         <p:spPr>
           <a:xfrm>
             <a:off x="6228000" y="18720"/>
-            <a:ext cx="699840" cy="699840"/>
+            <a:ext cx="699480" cy="699480"/>
           </a:xfrm>
           <a:custGeom>
             <a:avLst/>
@@ -2823,7 +2823,7 @@
         <p:spPr>
           <a:xfrm>
             <a:off x="7632000" y="18720"/>
-            <a:ext cx="699840" cy="699840"/>
+            <a:ext cx="699480" cy="699480"/>
           </a:xfrm>
           <a:custGeom>
             <a:avLst/>
@@ -2883,7 +2883,7 @@
         <p:spPr>
           <a:xfrm>
             <a:off x="7308000" y="558720"/>
-            <a:ext cx="699840" cy="699840"/>
+            <a:ext cx="699480" cy="699480"/>
           </a:xfrm>
           <a:custGeom>
             <a:avLst/>
@@ -2943,7 +2943,7 @@
         <p:spPr>
           <a:xfrm>
             <a:off x="8334000" y="19080"/>
-            <a:ext cx="699840" cy="699840"/>
+            <a:ext cx="699480" cy="699480"/>
           </a:xfrm>
           <a:custGeom>
             <a:avLst/>
@@ -3003,7 +3003,7 @@
         <p:spPr>
           <a:xfrm>
             <a:off x="8010000" y="559080"/>
-            <a:ext cx="699840" cy="699840"/>
+            <a:ext cx="699480" cy="699480"/>
           </a:xfrm>
           <a:custGeom>
             <a:avLst/>
@@ -3063,7 +3063,7 @@
         <p:spPr>
           <a:xfrm>
             <a:off x="9414000" y="559080"/>
-            <a:ext cx="699840" cy="699840"/>
+            <a:ext cx="699480" cy="699480"/>
           </a:xfrm>
           <a:custGeom>
             <a:avLst/>
@@ -3123,7 +3123,7 @@
         <p:spPr>
           <a:xfrm>
             <a:off x="8712000" y="559080"/>
-            <a:ext cx="699840" cy="699840"/>
+            <a:ext cx="699480" cy="699480"/>
           </a:xfrm>
           <a:custGeom>
             <a:avLst/>
@@ -3183,7 +3183,7 @@
         <p:spPr>
           <a:xfrm>
             <a:off x="9738000" y="19080"/>
-            <a:ext cx="699840" cy="699840"/>
+            <a:ext cx="699480" cy="699480"/>
           </a:xfrm>
           <a:custGeom>
             <a:avLst/>
@@ -3243,7 +3243,7 @@
         <p:spPr>
           <a:xfrm>
             <a:off x="9036000" y="19080"/>
-            <a:ext cx="699840" cy="699840"/>
+            <a:ext cx="699480" cy="699480"/>
           </a:xfrm>
           <a:custGeom>
             <a:avLst/>
@@ -3303,7 +3303,7 @@
         <p:spPr>
           <a:xfrm>
             <a:off x="288000" y="558720"/>
-            <a:ext cx="699840" cy="699840"/>
+            <a:ext cx="699480" cy="699480"/>
           </a:xfrm>
           <a:custGeom>
             <a:avLst/>
@@ -3362,10 +3362,10 @@
         </p:nvGrpSpPr>
         <p:grpSpPr>
           <a:xfrm>
-            <a:off x="-362160" y="4895640"/>
-            <a:ext cx="10851840" cy="1258200"/>
-            <a:chOff x="-362160" y="4895640"/>
-            <a:chExt cx="10851840" cy="1258200"/>
+            <a:off x="-362520" y="4895640"/>
+            <a:ext cx="10851480" cy="1257840"/>
+            <a:chOff x="-362520" y="4895640"/>
+            <a:chExt cx="10851480" cy="1257840"/>
           </a:xfrm>
         </p:grpSpPr>
         <p:sp>
@@ -3376,8 +3376,8 @@
           </p:nvSpPr>
           <p:spPr>
             <a:xfrm flipH="1">
-              <a:off x="9429840" y="4913640"/>
-              <a:ext cx="699840" cy="699840"/>
+              <a:off x="9429120" y="4913640"/>
+              <a:ext cx="699480" cy="699480"/>
             </a:xfrm>
             <a:custGeom>
               <a:avLst/>
@@ -3436,8 +3436,8 @@
           </p:nvSpPr>
           <p:spPr>
             <a:xfrm flipH="1">
-              <a:off x="9789840" y="5453640"/>
-              <a:ext cx="699840" cy="699840"/>
+              <a:off x="9789120" y="5453640"/>
+              <a:ext cx="699480" cy="699480"/>
             </a:xfrm>
             <a:custGeom>
               <a:avLst/>
@@ -3496,8 +3496,8 @@
           </p:nvSpPr>
           <p:spPr>
             <a:xfrm flipH="1">
-              <a:off x="8025840" y="4913640"/>
-              <a:ext cx="699840" cy="699840"/>
+              <a:off x="8025120" y="4913640"/>
+              <a:ext cx="699480" cy="699480"/>
             </a:xfrm>
             <a:custGeom>
               <a:avLst/>
@@ -3556,8 +3556,8 @@
           </p:nvSpPr>
           <p:spPr>
             <a:xfrm flipH="1">
-              <a:off x="8727840" y="4913640"/>
-              <a:ext cx="699840" cy="699840"/>
+              <a:off x="8727120" y="4913640"/>
+              <a:ext cx="699480" cy="699480"/>
             </a:xfrm>
             <a:custGeom>
               <a:avLst/>
@@ -3616,8 +3616,8 @@
           </p:nvSpPr>
           <p:spPr>
             <a:xfrm flipH="1">
-              <a:off x="8385840" y="5453640"/>
-              <a:ext cx="699840" cy="699840"/>
+              <a:off x="8385120" y="5453640"/>
+              <a:ext cx="699480" cy="699480"/>
             </a:xfrm>
             <a:custGeom>
               <a:avLst/>
@@ -3676,8 +3676,8 @@
           </p:nvSpPr>
           <p:spPr>
             <a:xfrm flipH="1">
-              <a:off x="6981840" y="5453640"/>
-              <a:ext cx="699840" cy="699840"/>
+              <a:off x="6981120" y="5453640"/>
+              <a:ext cx="699480" cy="699480"/>
             </a:xfrm>
             <a:custGeom>
               <a:avLst/>
@@ -3736,8 +3736,8 @@
           </p:nvSpPr>
           <p:spPr>
             <a:xfrm flipH="1">
-              <a:off x="7683840" y="5453640"/>
-              <a:ext cx="699840" cy="699840"/>
+              <a:off x="7683120" y="5453640"/>
+              <a:ext cx="699480" cy="699480"/>
             </a:xfrm>
             <a:custGeom>
               <a:avLst/>
@@ -3796,8 +3796,8 @@
           </p:nvSpPr>
           <p:spPr>
             <a:xfrm flipH="1">
-              <a:off x="6621840" y="4913640"/>
-              <a:ext cx="699840" cy="699840"/>
+              <a:off x="6621120" y="4913640"/>
+              <a:ext cx="699480" cy="699480"/>
             </a:xfrm>
             <a:custGeom>
               <a:avLst/>
@@ -3856,8 +3856,8 @@
           </p:nvSpPr>
           <p:spPr>
             <a:xfrm flipH="1">
-              <a:off x="7323840" y="4895640"/>
-              <a:ext cx="699840" cy="699840"/>
+              <a:off x="7323120" y="4895640"/>
+              <a:ext cx="699480" cy="699480"/>
             </a:xfrm>
             <a:custGeom>
               <a:avLst/>
@@ -3916,8 +3916,8 @@
           </p:nvSpPr>
           <p:spPr>
             <a:xfrm flipH="1">
-              <a:off x="5919840" y="4913640"/>
-              <a:ext cx="699840" cy="699840"/>
+              <a:off x="5919120" y="4913640"/>
+              <a:ext cx="699480" cy="699480"/>
             </a:xfrm>
             <a:custGeom>
               <a:avLst/>
@@ -3976,8 +3976,8 @@
           </p:nvSpPr>
           <p:spPr>
             <a:xfrm flipH="1">
-              <a:off x="6279840" y="5453640"/>
-              <a:ext cx="699840" cy="699840"/>
+              <a:off x="6279120" y="5453640"/>
+              <a:ext cx="699480" cy="699480"/>
             </a:xfrm>
             <a:custGeom>
               <a:avLst/>
@@ -4036,8 +4036,8 @@
           </p:nvSpPr>
           <p:spPr>
             <a:xfrm flipH="1">
-              <a:off x="5235840" y="4913640"/>
-              <a:ext cx="699840" cy="699840"/>
+              <a:off x="5235120" y="4913640"/>
+              <a:ext cx="699480" cy="699480"/>
             </a:xfrm>
             <a:custGeom>
               <a:avLst/>
@@ -4096,8 +4096,8 @@
           </p:nvSpPr>
           <p:spPr>
             <a:xfrm flipH="1">
-              <a:off x="4875840" y="5453640"/>
-              <a:ext cx="699840" cy="699840"/>
+              <a:off x="4875120" y="5453640"/>
+              <a:ext cx="699480" cy="699480"/>
             </a:xfrm>
             <a:custGeom>
               <a:avLst/>
@@ -4156,8 +4156,8 @@
           </p:nvSpPr>
           <p:spPr>
             <a:xfrm flipH="1">
-              <a:off x="5577840" y="5453640"/>
-              <a:ext cx="699840" cy="699840"/>
+              <a:off x="5577120" y="5453640"/>
+              <a:ext cx="699480" cy="699480"/>
             </a:xfrm>
             <a:custGeom>
               <a:avLst/>
@@ -4216,8 +4216,8 @@
           </p:nvSpPr>
           <p:spPr>
             <a:xfrm flipH="1">
-              <a:off x="3849840" y="4913640"/>
-              <a:ext cx="699840" cy="699840"/>
+              <a:off x="3849120" y="4913640"/>
+              <a:ext cx="699480" cy="699480"/>
             </a:xfrm>
             <a:custGeom>
               <a:avLst/>
@@ -4276,8 +4276,8 @@
           </p:nvSpPr>
           <p:spPr>
             <a:xfrm flipH="1">
-              <a:off x="4533840" y="4913640"/>
-              <a:ext cx="699840" cy="699840"/>
+              <a:off x="4533120" y="4913640"/>
+              <a:ext cx="699480" cy="699480"/>
             </a:xfrm>
             <a:custGeom>
               <a:avLst/>
@@ -4336,8 +4336,8 @@
           </p:nvSpPr>
           <p:spPr>
             <a:xfrm flipH="1">
-              <a:off x="4173840" y="5453640"/>
-              <a:ext cx="699840" cy="699840"/>
+              <a:off x="4173120" y="5453640"/>
+              <a:ext cx="699480" cy="699480"/>
             </a:xfrm>
             <a:custGeom>
               <a:avLst/>
@@ -4396,8 +4396,8 @@
           </p:nvSpPr>
           <p:spPr>
             <a:xfrm flipH="1">
-              <a:off x="2769840" y="5453640"/>
-              <a:ext cx="699840" cy="699840"/>
+              <a:off x="2769120" y="5453640"/>
+              <a:ext cx="699480" cy="699480"/>
             </a:xfrm>
             <a:custGeom>
               <a:avLst/>
@@ -4456,8 +4456,8 @@
           </p:nvSpPr>
           <p:spPr>
             <a:xfrm flipH="1">
-              <a:off x="3471840" y="5453640"/>
-              <a:ext cx="699840" cy="699840"/>
+              <a:off x="3471120" y="5453640"/>
+              <a:ext cx="699480" cy="699480"/>
             </a:xfrm>
             <a:custGeom>
               <a:avLst/>
@@ -4516,8 +4516,8 @@
           </p:nvSpPr>
           <p:spPr>
             <a:xfrm flipH="1">
-              <a:off x="2445840" y="4913640"/>
-              <a:ext cx="699840" cy="699840"/>
+              <a:off x="2445120" y="4913640"/>
+              <a:ext cx="699480" cy="699480"/>
             </a:xfrm>
             <a:custGeom>
               <a:avLst/>
@@ -4576,8 +4576,8 @@
           </p:nvSpPr>
           <p:spPr>
             <a:xfrm flipH="1">
-              <a:off x="3147840" y="4913640"/>
-              <a:ext cx="699840" cy="699840"/>
+              <a:off x="3147120" y="4913640"/>
+              <a:ext cx="699480" cy="699480"/>
             </a:xfrm>
             <a:custGeom>
               <a:avLst/>
@@ -4636,8 +4636,8 @@
           </p:nvSpPr>
           <p:spPr>
             <a:xfrm flipH="1">
-              <a:off x="1743840" y="4913640"/>
-              <a:ext cx="699840" cy="699840"/>
+              <a:off x="1743120" y="4913640"/>
+              <a:ext cx="699480" cy="699480"/>
             </a:xfrm>
             <a:custGeom>
               <a:avLst/>
@@ -4696,8 +4696,8 @@
           </p:nvSpPr>
           <p:spPr>
             <a:xfrm flipH="1">
-              <a:off x="2067840" y="5453640"/>
-              <a:ext cx="699840" cy="699840"/>
+              <a:off x="2067120" y="5453640"/>
+              <a:ext cx="699480" cy="699480"/>
             </a:xfrm>
             <a:custGeom>
               <a:avLst/>
@@ -4756,8 +4756,8 @@
           </p:nvSpPr>
           <p:spPr>
             <a:xfrm flipH="1">
-              <a:off x="1041840" y="4914000"/>
-              <a:ext cx="699840" cy="699840"/>
+              <a:off x="1041120" y="4914000"/>
+              <a:ext cx="699480" cy="699480"/>
             </a:xfrm>
             <a:custGeom>
               <a:avLst/>
@@ -4816,8 +4816,8 @@
           </p:nvSpPr>
           <p:spPr>
             <a:xfrm flipH="1">
-              <a:off x="1365840" y="5454000"/>
-              <a:ext cx="699840" cy="699840"/>
+              <a:off x="1365120" y="5454000"/>
+              <a:ext cx="699480" cy="699480"/>
             </a:xfrm>
             <a:custGeom>
               <a:avLst/>
@@ -4876,8 +4876,8 @@
           </p:nvSpPr>
           <p:spPr>
             <a:xfrm flipH="1">
-              <a:off x="-38160" y="5454000"/>
-              <a:ext cx="699840" cy="699840"/>
+              <a:off x="-38880" y="5454000"/>
+              <a:ext cx="699480" cy="699480"/>
             </a:xfrm>
             <a:custGeom>
               <a:avLst/>
@@ -4936,8 +4936,8 @@
           </p:nvSpPr>
           <p:spPr>
             <a:xfrm flipH="1">
-              <a:off x="663840" y="5454000"/>
-              <a:ext cx="699840" cy="699840"/>
+              <a:off x="663120" y="5454000"/>
+              <a:ext cx="699480" cy="699480"/>
             </a:xfrm>
             <a:custGeom>
               <a:avLst/>
@@ -4996,8 +4996,8 @@
           </p:nvSpPr>
           <p:spPr>
             <a:xfrm flipH="1">
-              <a:off x="-362160" y="4914000"/>
-              <a:ext cx="699840" cy="699840"/>
+              <a:off x="-362880" y="4914000"/>
+              <a:ext cx="699480" cy="699480"/>
             </a:xfrm>
             <a:custGeom>
               <a:avLst/>
@@ -5056,8 +5056,8 @@
           </p:nvSpPr>
           <p:spPr>
             <a:xfrm flipH="1">
-              <a:off x="339840" y="4914000"/>
-              <a:ext cx="699840" cy="699840"/>
+              <a:off x="339120" y="4914000"/>
+              <a:ext cx="699480" cy="699480"/>
             </a:xfrm>
             <a:custGeom>
               <a:avLst/>
@@ -5116,8 +5116,8 @@
           </p:nvSpPr>
           <p:spPr>
             <a:xfrm flipH="1">
-              <a:off x="9087840" y="5453640"/>
-              <a:ext cx="699840" cy="699840"/>
+              <a:off x="9087120" y="5453640"/>
+              <a:ext cx="699480" cy="699480"/>
             </a:xfrm>
             <a:custGeom>
               <a:avLst/>
@@ -5178,7 +5178,7 @@
         <p:spPr>
           <a:xfrm>
             <a:off x="-414000" y="-520920"/>
-            <a:ext cx="699840" cy="699840"/>
+            <a:ext cx="699480" cy="699480"/>
           </a:xfrm>
           <a:custGeom>
             <a:avLst/>
@@ -5238,7 +5238,7 @@
         <p:spPr>
           <a:xfrm>
             <a:off x="990000" y="-520920"/>
-            <a:ext cx="699840" cy="699840"/>
+            <a:ext cx="699480" cy="699480"/>
           </a:xfrm>
           <a:custGeom>
             <a:avLst/>
@@ -5298,7 +5298,7 @@
         <p:spPr>
           <a:xfrm>
             <a:off x="2394000" y="-520920"/>
-            <a:ext cx="699840" cy="699840"/>
+            <a:ext cx="699480" cy="699480"/>
           </a:xfrm>
           <a:custGeom>
             <a:avLst/>
@@ -5358,7 +5358,7 @@
         <p:spPr>
           <a:xfrm>
             <a:off x="1692000" y="-520920"/>
-            <a:ext cx="699840" cy="699840"/>
+            <a:ext cx="699480" cy="699480"/>
           </a:xfrm>
           <a:custGeom>
             <a:avLst/>
@@ -5418,7 +5418,7 @@
         <p:spPr>
           <a:xfrm>
             <a:off x="3096000" y="-520920"/>
-            <a:ext cx="699840" cy="699840"/>
+            <a:ext cx="699480" cy="699480"/>
           </a:xfrm>
           <a:custGeom>
             <a:avLst/>
@@ -5478,7 +5478,7 @@
         <p:spPr>
           <a:xfrm>
             <a:off x="4500000" y="-520920"/>
-            <a:ext cx="699840" cy="699840"/>
+            <a:ext cx="699480" cy="699480"/>
           </a:xfrm>
           <a:custGeom>
             <a:avLst/>
@@ -5538,7 +5538,7 @@
         <p:spPr>
           <a:xfrm>
             <a:off x="3798000" y="-520920"/>
-            <a:ext cx="699840" cy="699840"/>
+            <a:ext cx="699480" cy="699480"/>
           </a:xfrm>
           <a:custGeom>
             <a:avLst/>
@@ -5598,7 +5598,7 @@
         <p:spPr>
           <a:xfrm>
             <a:off x="5202000" y="-520920"/>
-            <a:ext cx="699840" cy="699840"/>
+            <a:ext cx="699480" cy="699480"/>
           </a:xfrm>
           <a:custGeom>
             <a:avLst/>
@@ -5658,7 +5658,7 @@
         <p:spPr>
           <a:xfrm>
             <a:off x="6606000" y="-520920"/>
-            <a:ext cx="699840" cy="699840"/>
+            <a:ext cx="699480" cy="699480"/>
           </a:xfrm>
           <a:custGeom>
             <a:avLst/>
@@ -5718,7 +5718,7 @@
         <p:spPr>
           <a:xfrm>
             <a:off x="5904000" y="-520920"/>
-            <a:ext cx="699840" cy="699840"/>
+            <a:ext cx="699480" cy="699480"/>
           </a:xfrm>
           <a:custGeom>
             <a:avLst/>
@@ -5778,7 +5778,7 @@
         <p:spPr>
           <a:xfrm>
             <a:off x="7308000" y="-520920"/>
-            <a:ext cx="699840" cy="699840"/>
+            <a:ext cx="699480" cy="699480"/>
           </a:xfrm>
           <a:custGeom>
             <a:avLst/>
@@ -5838,7 +5838,7 @@
         <p:spPr>
           <a:xfrm>
             <a:off x="8010000" y="-520560"/>
-            <a:ext cx="699840" cy="699840"/>
+            <a:ext cx="699480" cy="699480"/>
           </a:xfrm>
           <a:custGeom>
             <a:avLst/>
@@ -5898,7 +5898,7 @@
         <p:spPr>
           <a:xfrm>
             <a:off x="9414000" y="-520560"/>
-            <a:ext cx="699840" cy="699840"/>
+            <a:ext cx="699480" cy="699480"/>
           </a:xfrm>
           <a:custGeom>
             <a:avLst/>
@@ -5958,7 +5958,7 @@
         <p:spPr>
           <a:xfrm>
             <a:off x="8712000" y="-520560"/>
-            <a:ext cx="699840" cy="699840"/>
+            <a:ext cx="699480" cy="699480"/>
           </a:xfrm>
           <a:custGeom>
             <a:avLst/>
@@ -6018,7 +6018,7 @@
         <p:spPr>
           <a:xfrm>
             <a:off x="288000" y="-520920"/>
-            <a:ext cx="699840" cy="699840"/>
+            <a:ext cx="699480" cy="699480"/>
           </a:xfrm>
           <a:custGeom>
             <a:avLst/>
@@ -6345,7 +6345,7 @@
         <p:spPr>
           <a:xfrm>
             <a:off x="540000" y="1980000"/>
-            <a:ext cx="8997840" cy="1257840"/>
+            <a:ext cx="8997480" cy="1257480"/>
           </a:xfrm>
           <a:prstGeom prst="rect">
             <a:avLst/>
@@ -6417,7 +6417,7 @@
         <p:spPr>
           <a:xfrm>
             <a:off x="540000" y="3420000"/>
-            <a:ext cx="8997840" cy="897840"/>
+            <a:ext cx="8997480" cy="897480"/>
           </a:xfrm>
           <a:prstGeom prst="rect">
             <a:avLst/>
@@ -6493,7 +6493,7 @@
         <p:spPr>
           <a:xfrm>
             <a:off x="602280" y="1470240"/>
-            <a:ext cx="8997840" cy="3237840"/>
+            <a:ext cx="8997480" cy="3237480"/>
           </a:xfrm>
           <a:prstGeom prst="rect">
             <a:avLst/>
@@ -6591,7 +6591,7 @@
               <a:rPr b="0" lang="en-US" sz="1300" spc="-1" strike="noStrike">
                 <a:latin typeface="Cascadia Mono"/>
               </a:rPr>
-              <a:t>The target file name will have the target language as a suffix.</a:t>
+              <a:t>The target file name will have the target language code as a suffix.</a:t>
             </a:r>
             <a:endParaRPr b="0" lang="en-US" sz="1300" spc="-1" strike="noStrike">
               <a:latin typeface="Arial"/>

</xml_diff>